<commit_message>
Updated materials for W3S2-3.
</commit_message>
<xml_diff>
--- a/W3/2. W3S2 final/W3S2.pptx
+++ b/W3/2. W3S2 final/W3S2.pptx
@@ -231,7 +231,7 @@
 <file path=ppt/revisionInfo.xml><?xml version="1.0" encoding="utf-8"?>
 <p1510:revInfo xmlns:a="http://schemas.openxmlformats.org/drawingml/2006/main" xmlns:r="http://schemas.openxmlformats.org/officeDocument/2006/relationships" xmlns:p1510="http://schemas.microsoft.com/office/powerpoint/2015/10/main">
   <p1510:revLst>
-    <p1510:client id="{CD3BCE5D-F1D9-409A-9E6B-AD5ABB34863C}" v="14" dt="2023-02-07T02:34:13.486"/>
+    <p1510:client id="{851712E7-4765-4026-AAE1-C7179918B94D}" v="17" dt="2023-06-22T06:23:29.777"/>
   </p1510:revLst>
 </p1510:revInfo>
 </file>
@@ -4654,6 +4654,240 @@
           </ac:spMkLst>
         </pc:spChg>
       </pc:sldMasterChg>
+    </pc:docChg>
+  </pc:docChgLst>
+  <pc:docChgLst>
+    <pc:chgData name="Matthieu De Mari" userId="dfb708c9-d8dc-439f-9a3b-c772bf4a311c" providerId="ADAL" clId="{851712E7-4765-4026-AAE1-C7179918B94D}"/>
+    <pc:docChg chg="custSel modSld">
+      <pc:chgData name="Matthieu De Mari" userId="dfb708c9-d8dc-439f-9a3b-c772bf4a311c" providerId="ADAL" clId="{851712E7-4765-4026-AAE1-C7179918B94D}" dt="2023-06-22T06:25:12.048" v="476" actId="20577"/>
+      <pc:docMkLst>
+        <pc:docMk/>
+      </pc:docMkLst>
+      <pc:sldChg chg="modSp mod">
+        <pc:chgData name="Matthieu De Mari" userId="dfb708c9-d8dc-439f-9a3b-c772bf4a311c" providerId="ADAL" clId="{851712E7-4765-4026-AAE1-C7179918B94D}" dt="2023-06-22T06:16:08.154" v="32" actId="20577"/>
+        <pc:sldMkLst>
+          <pc:docMk/>
+          <pc:sldMk cId="2474697269" sldId="387"/>
+        </pc:sldMkLst>
+        <pc:spChg chg="mod">
+          <ac:chgData name="Matthieu De Mari" userId="dfb708c9-d8dc-439f-9a3b-c772bf4a311c" providerId="ADAL" clId="{851712E7-4765-4026-AAE1-C7179918B94D}" dt="2023-06-22T06:16:08.154" v="32" actId="20577"/>
+          <ac:spMkLst>
+            <pc:docMk/>
+            <pc:sldMk cId="2474697269" sldId="387"/>
+            <ac:spMk id="3" creationId="{C7732CA9-163D-B4B0-71B2-AEA1EC81E0E6}"/>
+          </ac:spMkLst>
+        </pc:spChg>
+      </pc:sldChg>
+      <pc:sldChg chg="modSp mod">
+        <pc:chgData name="Matthieu De Mari" userId="dfb708c9-d8dc-439f-9a3b-c772bf4a311c" providerId="ADAL" clId="{851712E7-4765-4026-AAE1-C7179918B94D}" dt="2023-06-22T06:19:47.086" v="196" actId="20577"/>
+        <pc:sldMkLst>
+          <pc:docMk/>
+          <pc:sldMk cId="481628505" sldId="389"/>
+        </pc:sldMkLst>
+        <pc:spChg chg="mod">
+          <ac:chgData name="Matthieu De Mari" userId="dfb708c9-d8dc-439f-9a3b-c772bf4a311c" providerId="ADAL" clId="{851712E7-4765-4026-AAE1-C7179918B94D}" dt="2023-06-22T06:19:47.086" v="196" actId="20577"/>
+          <ac:spMkLst>
+            <pc:docMk/>
+            <pc:sldMk cId="481628505" sldId="389"/>
+            <ac:spMk id="3" creationId="{6C4142A3-3578-C842-742A-3495AD72B776}"/>
+          </ac:spMkLst>
+        </pc:spChg>
+      </pc:sldChg>
+      <pc:sldChg chg="modSp mod">
+        <pc:chgData name="Matthieu De Mari" userId="dfb708c9-d8dc-439f-9a3b-c772bf4a311c" providerId="ADAL" clId="{851712E7-4765-4026-AAE1-C7179918B94D}" dt="2023-06-22T06:22:05.105" v="314" actId="20577"/>
+        <pc:sldMkLst>
+          <pc:docMk/>
+          <pc:sldMk cId="1283478655" sldId="391"/>
+        </pc:sldMkLst>
+        <pc:spChg chg="mod">
+          <ac:chgData name="Matthieu De Mari" userId="dfb708c9-d8dc-439f-9a3b-c772bf4a311c" providerId="ADAL" clId="{851712E7-4765-4026-AAE1-C7179918B94D}" dt="2023-06-22T06:22:05.105" v="314" actId="20577"/>
+          <ac:spMkLst>
+            <pc:docMk/>
+            <pc:sldMk cId="1283478655" sldId="391"/>
+            <ac:spMk id="3" creationId="{EDC87932-752D-FABC-76EF-38023409D8D8}"/>
+          </ac:spMkLst>
+        </pc:spChg>
+      </pc:sldChg>
+      <pc:sldChg chg="modSp mod">
+        <pc:chgData name="Matthieu De Mari" userId="dfb708c9-d8dc-439f-9a3b-c772bf4a311c" providerId="ADAL" clId="{851712E7-4765-4026-AAE1-C7179918B94D}" dt="2023-06-22T06:24:28.011" v="466" actId="20577"/>
+        <pc:sldMkLst>
+          <pc:docMk/>
+          <pc:sldMk cId="164097668" sldId="394"/>
+        </pc:sldMkLst>
+        <pc:spChg chg="mod">
+          <ac:chgData name="Matthieu De Mari" userId="dfb708c9-d8dc-439f-9a3b-c772bf4a311c" providerId="ADAL" clId="{851712E7-4765-4026-AAE1-C7179918B94D}" dt="2023-06-22T06:24:28.011" v="466" actId="20577"/>
+          <ac:spMkLst>
+            <pc:docMk/>
+            <pc:sldMk cId="164097668" sldId="394"/>
+            <ac:spMk id="4" creationId="{7B27ED01-4B43-7115-3D3C-53FF72E7590A}"/>
+          </ac:spMkLst>
+        </pc:spChg>
+      </pc:sldChg>
+      <pc:sldChg chg="modSp mod">
+        <pc:chgData name="Matthieu De Mari" userId="dfb708c9-d8dc-439f-9a3b-c772bf4a311c" providerId="ADAL" clId="{851712E7-4765-4026-AAE1-C7179918B94D}" dt="2023-06-22T06:16:18.530" v="33" actId="5793"/>
+        <pc:sldMkLst>
+          <pc:docMk/>
+          <pc:sldMk cId="3339699406" sldId="761"/>
+        </pc:sldMkLst>
+        <pc:spChg chg="mod">
+          <ac:chgData name="Matthieu De Mari" userId="dfb708c9-d8dc-439f-9a3b-c772bf4a311c" providerId="ADAL" clId="{851712E7-4765-4026-AAE1-C7179918B94D}" dt="2023-06-22T06:16:18.530" v="33" actId="5793"/>
+          <ac:spMkLst>
+            <pc:docMk/>
+            <pc:sldMk cId="3339699406" sldId="761"/>
+            <ac:spMk id="11" creationId="{0EEC07FE-D839-07DF-7C1A-CDBE72FE6BB9}"/>
+          </ac:spMkLst>
+        </pc:spChg>
+      </pc:sldChg>
+      <pc:sldChg chg="modSp">
+        <pc:chgData name="Matthieu De Mari" userId="dfb708c9-d8dc-439f-9a3b-c772bf4a311c" providerId="ADAL" clId="{851712E7-4765-4026-AAE1-C7179918B94D}" dt="2023-06-22T06:16:31.856" v="34" actId="20577"/>
+        <pc:sldMkLst>
+          <pc:docMk/>
+          <pc:sldMk cId="1546007078" sldId="762"/>
+        </pc:sldMkLst>
+        <pc:spChg chg="mod">
+          <ac:chgData name="Matthieu De Mari" userId="dfb708c9-d8dc-439f-9a3b-c772bf4a311c" providerId="ADAL" clId="{851712E7-4765-4026-AAE1-C7179918B94D}" dt="2023-06-22T06:16:31.856" v="34" actId="20577"/>
+          <ac:spMkLst>
+            <pc:docMk/>
+            <pc:sldMk cId="1546007078" sldId="762"/>
+            <ac:spMk id="11" creationId="{0EEC07FE-D839-07DF-7C1A-CDBE72FE6BB9}"/>
+          </ac:spMkLst>
+        </pc:spChg>
+      </pc:sldChg>
+      <pc:sldChg chg="modSp mod">
+        <pc:chgData name="Matthieu De Mari" userId="dfb708c9-d8dc-439f-9a3b-c772bf4a311c" providerId="ADAL" clId="{851712E7-4765-4026-AAE1-C7179918B94D}" dt="2023-06-22T06:17:43.042" v="142" actId="20577"/>
+        <pc:sldMkLst>
+          <pc:docMk/>
+          <pc:sldMk cId="2580175991" sldId="763"/>
+        </pc:sldMkLst>
+        <pc:spChg chg="mod">
+          <ac:chgData name="Matthieu De Mari" userId="dfb708c9-d8dc-439f-9a3b-c772bf4a311c" providerId="ADAL" clId="{851712E7-4765-4026-AAE1-C7179918B94D}" dt="2023-06-22T06:17:43.042" v="142" actId="20577"/>
+          <ac:spMkLst>
+            <pc:docMk/>
+            <pc:sldMk cId="2580175991" sldId="763"/>
+            <ac:spMk id="5" creationId="{1A87BA25-5926-816A-6E16-0F90D4B62FB8}"/>
+          </ac:spMkLst>
+        </pc:spChg>
+      </pc:sldChg>
+      <pc:sldChg chg="modSp mod">
+        <pc:chgData name="Matthieu De Mari" userId="dfb708c9-d8dc-439f-9a3b-c772bf4a311c" providerId="ADAL" clId="{851712E7-4765-4026-AAE1-C7179918B94D}" dt="2023-06-22T06:17:51.599" v="143" actId="5793"/>
+        <pc:sldMkLst>
+          <pc:docMk/>
+          <pc:sldMk cId="1879463264" sldId="764"/>
+        </pc:sldMkLst>
+        <pc:spChg chg="mod">
+          <ac:chgData name="Matthieu De Mari" userId="dfb708c9-d8dc-439f-9a3b-c772bf4a311c" providerId="ADAL" clId="{851712E7-4765-4026-AAE1-C7179918B94D}" dt="2023-06-22T06:17:51.599" v="143" actId="5793"/>
+          <ac:spMkLst>
+            <pc:docMk/>
+            <pc:sldMk cId="1879463264" sldId="764"/>
+            <ac:spMk id="5" creationId="{1A87BA25-5926-816A-6E16-0F90D4B62FB8}"/>
+          </ac:spMkLst>
+        </pc:spChg>
+      </pc:sldChg>
+      <pc:sldChg chg="modSp">
+        <pc:chgData name="Matthieu De Mari" userId="dfb708c9-d8dc-439f-9a3b-c772bf4a311c" providerId="ADAL" clId="{851712E7-4765-4026-AAE1-C7179918B94D}" dt="2023-06-22T06:18:41.461" v="144" actId="20577"/>
+        <pc:sldMkLst>
+          <pc:docMk/>
+          <pc:sldMk cId="1996337912" sldId="765"/>
+        </pc:sldMkLst>
+        <pc:spChg chg="mod">
+          <ac:chgData name="Matthieu De Mari" userId="dfb708c9-d8dc-439f-9a3b-c772bf4a311c" providerId="ADAL" clId="{851712E7-4765-4026-AAE1-C7179918B94D}" dt="2023-06-22T06:18:41.461" v="144" actId="20577"/>
+          <ac:spMkLst>
+            <pc:docMk/>
+            <pc:sldMk cId="1996337912" sldId="765"/>
+            <ac:spMk id="3" creationId="{46D88AA4-084D-50F6-7F5E-69051FD9A887}"/>
+          </ac:spMkLst>
+        </pc:spChg>
+      </pc:sldChg>
+      <pc:sldChg chg="modSp mod">
+        <pc:chgData name="Matthieu De Mari" userId="dfb708c9-d8dc-439f-9a3b-c772bf4a311c" providerId="ADAL" clId="{851712E7-4765-4026-AAE1-C7179918B94D}" dt="2023-06-22T06:20:11.669" v="212" actId="113"/>
+        <pc:sldMkLst>
+          <pc:docMk/>
+          <pc:sldMk cId="1554669076" sldId="766"/>
+        </pc:sldMkLst>
+        <pc:spChg chg="mod">
+          <ac:chgData name="Matthieu De Mari" userId="dfb708c9-d8dc-439f-9a3b-c772bf4a311c" providerId="ADAL" clId="{851712E7-4765-4026-AAE1-C7179918B94D}" dt="2023-06-22T06:20:11.669" v="212" actId="113"/>
+          <ac:spMkLst>
+            <pc:docMk/>
+            <pc:sldMk cId="1554669076" sldId="766"/>
+            <ac:spMk id="3" creationId="{6C4142A3-3578-C842-742A-3495AD72B776}"/>
+          </ac:spMkLst>
+        </pc:spChg>
+      </pc:sldChg>
+      <pc:sldChg chg="modSp mod">
+        <pc:chgData name="Matthieu De Mari" userId="dfb708c9-d8dc-439f-9a3b-c772bf4a311c" providerId="ADAL" clId="{851712E7-4765-4026-AAE1-C7179918B94D}" dt="2023-06-22T06:21:19.225" v="268" actId="20577"/>
+        <pc:sldMkLst>
+          <pc:docMk/>
+          <pc:sldMk cId="2909899754" sldId="769"/>
+        </pc:sldMkLst>
+        <pc:spChg chg="mod">
+          <ac:chgData name="Matthieu De Mari" userId="dfb708c9-d8dc-439f-9a3b-c772bf4a311c" providerId="ADAL" clId="{851712E7-4765-4026-AAE1-C7179918B94D}" dt="2023-06-22T06:21:19.225" v="268" actId="20577"/>
+          <ac:spMkLst>
+            <pc:docMk/>
+            <pc:sldMk cId="2909899754" sldId="769"/>
+            <ac:spMk id="3" creationId="{70FF8A92-BFB5-623C-CBC8-C3AB284F9C4F}"/>
+          </ac:spMkLst>
+        </pc:spChg>
+      </pc:sldChg>
+      <pc:sldChg chg="modSp mod">
+        <pc:chgData name="Matthieu De Mari" userId="dfb708c9-d8dc-439f-9a3b-c772bf4a311c" providerId="ADAL" clId="{851712E7-4765-4026-AAE1-C7179918B94D}" dt="2023-06-22T06:22:41.678" v="327" actId="113"/>
+        <pc:sldMkLst>
+          <pc:docMk/>
+          <pc:sldMk cId="743119883" sldId="775"/>
+        </pc:sldMkLst>
+        <pc:spChg chg="mod">
+          <ac:chgData name="Matthieu De Mari" userId="dfb708c9-d8dc-439f-9a3b-c772bf4a311c" providerId="ADAL" clId="{851712E7-4765-4026-AAE1-C7179918B94D}" dt="2023-06-22T06:22:41.678" v="327" actId="113"/>
+          <ac:spMkLst>
+            <pc:docMk/>
+            <pc:sldMk cId="743119883" sldId="775"/>
+            <ac:spMk id="3" creationId="{EDC87932-752D-FABC-76EF-38023409D8D8}"/>
+          </ac:spMkLst>
+        </pc:spChg>
+      </pc:sldChg>
+      <pc:sldChg chg="modSp mod">
+        <pc:chgData name="Matthieu De Mari" userId="dfb708c9-d8dc-439f-9a3b-c772bf4a311c" providerId="ADAL" clId="{851712E7-4765-4026-AAE1-C7179918B94D}" dt="2023-06-22T06:23:30.838" v="392" actId="20577"/>
+        <pc:sldMkLst>
+          <pc:docMk/>
+          <pc:sldMk cId="3349972987" sldId="777"/>
+        </pc:sldMkLst>
+        <pc:spChg chg="mod">
+          <ac:chgData name="Matthieu De Mari" userId="dfb708c9-d8dc-439f-9a3b-c772bf4a311c" providerId="ADAL" clId="{851712E7-4765-4026-AAE1-C7179918B94D}" dt="2023-06-22T06:23:30.838" v="392" actId="20577"/>
+          <ac:spMkLst>
+            <pc:docMk/>
+            <pc:sldMk cId="3349972987" sldId="777"/>
+            <ac:spMk id="3" creationId="{EDC87932-752D-FABC-76EF-38023409D8D8}"/>
+          </ac:spMkLst>
+        </pc:spChg>
+      </pc:sldChg>
+      <pc:sldChg chg="modSp mod">
+        <pc:chgData name="Matthieu De Mari" userId="dfb708c9-d8dc-439f-9a3b-c772bf4a311c" providerId="ADAL" clId="{851712E7-4765-4026-AAE1-C7179918B94D}" dt="2023-06-22T06:24:34.830" v="468" actId="113"/>
+        <pc:sldMkLst>
+          <pc:docMk/>
+          <pc:sldMk cId="2678238830" sldId="780"/>
+        </pc:sldMkLst>
+        <pc:spChg chg="mod">
+          <ac:chgData name="Matthieu De Mari" userId="dfb708c9-d8dc-439f-9a3b-c772bf4a311c" providerId="ADAL" clId="{851712E7-4765-4026-AAE1-C7179918B94D}" dt="2023-06-22T06:24:34.830" v="468" actId="113"/>
+          <ac:spMkLst>
+            <pc:docMk/>
+            <pc:sldMk cId="2678238830" sldId="780"/>
+            <ac:spMk id="4" creationId="{7B27ED01-4B43-7115-3D3C-53FF72E7590A}"/>
+          </ac:spMkLst>
+        </pc:spChg>
+      </pc:sldChg>
+      <pc:sldChg chg="modSp mod">
+        <pc:chgData name="Matthieu De Mari" userId="dfb708c9-d8dc-439f-9a3b-c772bf4a311c" providerId="ADAL" clId="{851712E7-4765-4026-AAE1-C7179918B94D}" dt="2023-06-22T06:25:12.048" v="476" actId="20577"/>
+        <pc:sldMkLst>
+          <pc:docMk/>
+          <pc:sldMk cId="278531271" sldId="782"/>
+        </pc:sldMkLst>
+        <pc:spChg chg="mod">
+          <ac:chgData name="Matthieu De Mari" userId="dfb708c9-d8dc-439f-9a3b-c772bf4a311c" providerId="ADAL" clId="{851712E7-4765-4026-AAE1-C7179918B94D}" dt="2023-06-22T06:25:12.048" v="476" actId="20577"/>
+          <ac:spMkLst>
+            <pc:docMk/>
+            <pc:sldMk cId="278531271" sldId="782"/>
+            <ac:spMk id="6" creationId="{5282BC02-8C8A-BDB1-A192-B4E530ACD8B1}"/>
+          </ac:spMkLst>
+        </pc:spChg>
+      </pc:sldChg>
     </pc:docChg>
   </pc:docChgLst>
 </pc:chgInfo>
@@ -4741,7 +4975,7 @@
           <a:p>
             <a:fld id="{61478373-EB31-4867-8CF0-FA31364748A5}" type="datetimeFigureOut">
               <a:rPr lang="en-GB" smtClean="0"/>
-              <a:t>07/02/2023</a:t>
+              <a:t>22/06/2023</a:t>
             </a:fld>
             <a:endParaRPr lang="en-GB"/>
           </a:p>
@@ -5158,7 +5392,7 @@
           <a:p>
             <a:fld id="{E85DF616-B21E-4EF6-A6A5-95E2FB3EB1A1}" type="datetimeFigureOut">
               <a:rPr lang="en-GB" smtClean="0"/>
-              <a:t>07/02/2023</a:t>
+              <a:t>22/06/2023</a:t>
             </a:fld>
             <a:endParaRPr lang="en-GB"/>
           </a:p>
@@ -5358,7 +5592,7 @@
           <a:p>
             <a:fld id="{E85DF616-B21E-4EF6-A6A5-95E2FB3EB1A1}" type="datetimeFigureOut">
               <a:rPr lang="en-GB" smtClean="0"/>
-              <a:t>07/02/2023</a:t>
+              <a:t>22/06/2023</a:t>
             </a:fld>
             <a:endParaRPr lang="en-GB"/>
           </a:p>
@@ -5568,7 +5802,7 @@
           <a:p>
             <a:fld id="{E85DF616-B21E-4EF6-A6A5-95E2FB3EB1A1}" type="datetimeFigureOut">
               <a:rPr lang="en-GB" smtClean="0"/>
-              <a:t>07/02/2023</a:t>
+              <a:t>22/06/2023</a:t>
             </a:fld>
             <a:endParaRPr lang="en-GB"/>
           </a:p>
@@ -5768,7 +6002,7 @@
           <a:p>
             <a:fld id="{E85DF616-B21E-4EF6-A6A5-95E2FB3EB1A1}" type="datetimeFigureOut">
               <a:rPr lang="en-GB" smtClean="0"/>
-              <a:t>07/02/2023</a:t>
+              <a:t>22/06/2023</a:t>
             </a:fld>
             <a:endParaRPr lang="en-GB"/>
           </a:p>
@@ -6044,7 +6278,7 @@
           <a:p>
             <a:fld id="{E85DF616-B21E-4EF6-A6A5-95E2FB3EB1A1}" type="datetimeFigureOut">
               <a:rPr lang="en-GB" smtClean="0"/>
-              <a:t>07/02/2023</a:t>
+              <a:t>22/06/2023</a:t>
             </a:fld>
             <a:endParaRPr lang="en-GB"/>
           </a:p>
@@ -6312,7 +6546,7 @@
           <a:p>
             <a:fld id="{E85DF616-B21E-4EF6-A6A5-95E2FB3EB1A1}" type="datetimeFigureOut">
               <a:rPr lang="en-GB" smtClean="0"/>
-              <a:t>07/02/2023</a:t>
+              <a:t>22/06/2023</a:t>
             </a:fld>
             <a:endParaRPr lang="en-GB"/>
           </a:p>
@@ -6727,7 +6961,7 @@
           <a:p>
             <a:fld id="{E85DF616-B21E-4EF6-A6A5-95E2FB3EB1A1}" type="datetimeFigureOut">
               <a:rPr lang="en-GB" smtClean="0"/>
-              <a:t>07/02/2023</a:t>
+              <a:t>22/06/2023</a:t>
             </a:fld>
             <a:endParaRPr lang="en-GB"/>
           </a:p>
@@ -6869,7 +7103,7 @@
           <a:p>
             <a:fld id="{E85DF616-B21E-4EF6-A6A5-95E2FB3EB1A1}" type="datetimeFigureOut">
               <a:rPr lang="en-GB" smtClean="0"/>
-              <a:t>07/02/2023</a:t>
+              <a:t>22/06/2023</a:t>
             </a:fld>
             <a:endParaRPr lang="en-GB"/>
           </a:p>
@@ -6982,7 +7216,7 @@
           <a:p>
             <a:fld id="{E85DF616-B21E-4EF6-A6A5-95E2FB3EB1A1}" type="datetimeFigureOut">
               <a:rPr lang="en-GB" smtClean="0"/>
-              <a:t>07/02/2023</a:t>
+              <a:t>22/06/2023</a:t>
             </a:fld>
             <a:endParaRPr lang="en-GB"/>
           </a:p>
@@ -7295,7 +7529,7 @@
           <a:p>
             <a:fld id="{E85DF616-B21E-4EF6-A6A5-95E2FB3EB1A1}" type="datetimeFigureOut">
               <a:rPr lang="en-GB" smtClean="0"/>
-              <a:t>07/02/2023</a:t>
+              <a:t>22/06/2023</a:t>
             </a:fld>
             <a:endParaRPr lang="en-GB"/>
           </a:p>
@@ -7584,7 +7818,7 @@
           <a:p>
             <a:fld id="{E85DF616-B21E-4EF6-A6A5-95E2FB3EB1A1}" type="datetimeFigureOut">
               <a:rPr lang="en-GB" smtClean="0"/>
-              <a:t>07/02/2023</a:t>
+              <a:t>22/06/2023</a:t>
             </a:fld>
             <a:endParaRPr lang="en-GB"/>
           </a:p>
@@ -7827,7 +8061,7 @@
           <a:p>
             <a:fld id="{E85DF616-B21E-4EF6-A6A5-95E2FB3EB1A1}" type="datetimeFigureOut">
               <a:rPr lang="en-GB" smtClean="0"/>
-              <a:t>07/02/2023</a:t>
+              <a:t>22/06/2023</a:t>
             </a:fld>
             <a:endParaRPr lang="en-GB"/>
           </a:p>
@@ -8561,6 +8795,9 @@
               </a:bodyPr>
               <a:lstStyle/>
               <a:p>
+                <a:pPr marL="0" indent="0">
+                  <a:buNone/>
+                </a:pPr>
                 <a:r>
                   <a:rPr lang="en-GB" dirty="0"/>
                   <a:t>Recall Week 2 Notebook 8, the three layers model.</a:t>
@@ -8647,7 +8884,7 @@
               <a:blipFill>
                 <a:blip r:embed="rId2"/>
                 <a:stretch>
-                  <a:fillRect l="-2452" t="-1937" r="-409"/>
+                  <a:fillRect l="-2725" t="-1937" r="-136"/>
                 </a:stretch>
               </a:blipFill>
             </p:spPr>
@@ -9536,8 +9773,8 @@
           </a:p>
         </p:txBody>
       </p:sp>
-      <mc:AlternateContent xmlns:mc="http://schemas.openxmlformats.org/markup-compatibility/2006" xmlns:a14="http://schemas.microsoft.com/office/drawing/2010/main">
-        <mc:Choice Requires="a14">
+      <mc:AlternateContent xmlns:mc="http://schemas.openxmlformats.org/markup-compatibility/2006">
+        <mc:Choice xmlns:a14="http://schemas.microsoft.com/office/drawing/2010/main" Requires="a14">
           <p:sp>
             <p:nvSpPr>
               <p:cNvPr id="3" name="Content Placeholder 2">
@@ -9889,7 +10126,7 @@
                 </a14:m>
                 <a:r>
                   <a:rPr lang="en-GB" dirty="0"/>
-                  <a:t> by 1, and </a:t>
+                  <a:t> by 1 and </a:t>
                 </a:r>
                 <a:r>
                   <a:rPr lang="en-GB" b="1" dirty="0"/>
@@ -9903,7 +10140,7 @@
             </p:txBody>
           </p:sp>
         </mc:Choice>
-        <mc:Fallback xmlns="">
+        <mc:Fallback>
           <p:sp>
             <p:nvSpPr>
               <p:cNvPr id="3" name="Content Placeholder 2">
@@ -10059,7 +10296,9 @@
           </a:xfrm>
         </p:spPr>
         <p:txBody>
-          <a:bodyPr/>
+          <a:bodyPr>
+            <a:normAutofit/>
+          </a:bodyPr>
           <a:lstStyle/>
           <a:p>
             <a:pPr marL="0" indent="0">
@@ -10067,7 +10306,7 @@
             </a:pPr>
             <a:r>
               <a:rPr lang="en-GB" dirty="0"/>
-              <a:t>In order to train our Neural Network, we will rely on the power of the </a:t>
+              <a:t>In order to train our Neural Network using backprop, we rely on </a:t>
             </a:r>
             <a:r>
               <a:rPr lang="en-GB" dirty="0" err="1"/>
@@ -10075,19 +10314,13 @@
             </a:r>
             <a:r>
               <a:rPr lang="en-GB" dirty="0"/>
-              <a:t> to compute the gradient update for us automatically.</a:t>
+              <a:t> to compute the gradient updates for us automatically.</a:t>
             </a:r>
           </a:p>
           <a:p>
             <a:pPr marL="0" indent="0">
               <a:buNone/>
             </a:pPr>
-            <a:endParaRPr lang="en-GB" dirty="0"/>
-          </a:p>
-          <a:p>
-            <a:pPr marL="0" indent="0">
-              <a:buNone/>
-            </a:pPr>
             <a:r>
               <a:rPr lang="en-GB" dirty="0"/>
               <a:t>For this reason,</a:t>
@@ -10134,42 +10367,50 @@
             </a:r>
             <a:r>
               <a:rPr lang="en-GB" dirty="0"/>
-              <a:t>method will consist of several iterations of</a:t>
+              <a:t>method will now consist of several iterations of</a:t>
             </a:r>
           </a:p>
           <a:p>
             <a:pPr lvl="1"/>
             <a:r>
-              <a:rPr lang="en-GB" b="1" dirty="0"/>
+              <a:rPr lang="en-GB" sz="2800" b="1" dirty="0"/>
               <a:t>forward()</a:t>
             </a:r>
             <a:r>
-              <a:rPr lang="en-GB" dirty="0"/>
+              <a:rPr lang="en-GB" sz="2800" dirty="0"/>
               <a:t> pass and loss calculation,</a:t>
             </a:r>
           </a:p>
           <a:p>
             <a:pPr lvl="1"/>
             <a:r>
-              <a:rPr lang="en-GB" dirty="0"/>
-              <a:t>gradient computation with </a:t>
-            </a:r>
-            <a:r>
-              <a:rPr lang="en-GB" b="1" dirty="0"/>
-              <a:t>backward()</a:t>
-            </a:r>
-            <a:r>
-              <a:rPr lang="en-GB" dirty="0"/>
-              <a:t>, used on loss,</a:t>
+              <a:rPr lang="en-GB" sz="2800" dirty="0"/>
+              <a:t>gradient computation with the </a:t>
+            </a:r>
+            <a:r>
+              <a:rPr lang="en-GB" sz="2800" b="1" dirty="0"/>
+              <a:t>backward() </a:t>
+            </a:r>
+            <a:r>
+              <a:rPr lang="en-GB" sz="2800" dirty="0"/>
+              <a:t>method, used on loss,</a:t>
             </a:r>
           </a:p>
           <a:p>
             <a:pPr lvl="1"/>
             <a:r>
-              <a:rPr lang="en-GB" dirty="0"/>
-              <a:t>and gradient descent updates on trainable parameters.</a:t>
-            </a:r>
-            <a:endParaRPr lang="en-SG" dirty="0"/>
+              <a:rPr lang="en-GB" sz="2800" dirty="0"/>
+              <a:t>and </a:t>
+            </a:r>
+            <a:r>
+              <a:rPr lang="en-GB" sz="2800" b="1" dirty="0"/>
+              <a:t>gradient descent updates </a:t>
+            </a:r>
+            <a:r>
+              <a:rPr lang="en-GB" sz="2800" dirty="0"/>
+              <a:t>on trainable parameters.</a:t>
+            </a:r>
+            <a:endParaRPr lang="en-SG" sz="2800" dirty="0"/>
           </a:p>
         </p:txBody>
       </p:sp>
@@ -10289,21 +10530,29 @@
           <a:p>
             <a:r>
               <a:rPr lang="en-GB" dirty="0"/>
-              <a:t>gradient computation with </a:t>
+              <a:t>gradient computation with the </a:t>
             </a:r>
             <a:r>
               <a:rPr lang="en-GB" b="1" dirty="0"/>
-              <a:t>backward()</a:t>
-            </a:r>
-            <a:r>
-              <a:rPr lang="en-GB" dirty="0"/>
-              <a:t>, used on loss,</a:t>
-            </a:r>
-          </a:p>
-          <a:p>
-            <a:r>
-              <a:rPr lang="en-GB" dirty="0"/>
-              <a:t>and gradient descent updates on trainable parameters.</a:t>
+              <a:t>backward() </a:t>
+            </a:r>
+            <a:r>
+              <a:rPr lang="en-GB" dirty="0"/>
+              <a:t>method, used on loss,</a:t>
+            </a:r>
+          </a:p>
+          <a:p>
+            <a:r>
+              <a:rPr lang="en-GB" dirty="0"/>
+              <a:t>and </a:t>
+            </a:r>
+            <a:r>
+              <a:rPr lang="en-GB" b="1" dirty="0"/>
+              <a:t>gradient descent updates </a:t>
+            </a:r>
+            <a:r>
+              <a:rPr lang="en-GB" dirty="0"/>
+              <a:t>on trainable parameters.</a:t>
             </a:r>
             <a:endParaRPr lang="en-SG" dirty="0"/>
           </a:p>
@@ -11494,7 +11743,7 @@
             </a:r>
             <a:r>
               <a:rPr lang="en-GB" dirty="0"/>
-              <a:t>methods will therefore be replaced with the </a:t>
+              <a:t>methods will therefore be replaced with the built-in </a:t>
             </a:r>
             <a:r>
               <a:rPr lang="en-GB" b="1" dirty="0" err="1"/>
@@ -11506,7 +11755,7 @@
             </a:r>
             <a:r>
               <a:rPr lang="en-GB" dirty="0"/>
-              <a:t>function and the </a:t>
+              <a:t>and the </a:t>
             </a:r>
             <a:r>
               <a:rPr lang="en-GB" b="1" dirty="0" err="1"/>
@@ -11574,7 +11823,7 @@
             </a:r>
             <a:r>
               <a:rPr lang="en-GB" dirty="0"/>
-              <a:t> also provides a few additional losses and metrics functions, ready to use with </a:t>
+              <a:t> is a supporting library, which provides a few additional losses and metrics functions, ready to use with </a:t>
             </a:r>
             <a:r>
               <a:rPr lang="en-GB" b="1" dirty="0" err="1"/>
@@ -12011,7 +12260,12 @@
             <p:ph idx="1"/>
           </p:nvPr>
         </p:nvSpPr>
-        <p:spPr/>
+        <p:spPr>
+          <a:xfrm>
+            <a:off x="838200" y="1825624"/>
+            <a:ext cx="10515600" cy="5032375"/>
+          </a:xfrm>
+        </p:spPr>
         <p:txBody>
           <a:bodyPr/>
           <a:lstStyle/>
@@ -12021,7 +12275,15 @@
             </a:pPr>
             <a:r>
               <a:rPr lang="en-GB" dirty="0"/>
-              <a:t>Our next step is logically to replace our vanilla gradient descent with some more advanced optimizers, e.g. Adam, </a:t>
+              <a:t>Our next step is logically to </a:t>
+            </a:r>
+            <a:r>
+              <a:rPr lang="en-GB" b="1" dirty="0"/>
+              <a:t>replace our vanilla gradient descent with some more advanced optimizers</a:t>
+            </a:r>
+            <a:r>
+              <a:rPr lang="en-GB" dirty="0"/>
+              <a:t>, e.g. Adam, </a:t>
             </a:r>
             <a:r>
               <a:rPr lang="en-GB" dirty="0" err="1"/>
@@ -12075,7 +12337,15 @@
             </a:pPr>
             <a:r>
               <a:rPr lang="en-GB" dirty="0"/>
-              <a:t>Feel free to have a look at all the available optimizers, here: </a:t>
+              <a:t>Feel free to have a look at all the available built-in optimizers, available in </a:t>
+            </a:r>
+            <a:r>
+              <a:rPr lang="en-GB" dirty="0" err="1"/>
+              <a:t>PyTorch</a:t>
+            </a:r>
+            <a:r>
+              <a:rPr lang="en-GB" dirty="0"/>
+              <a:t>, here: </a:t>
             </a:r>
             <a:r>
               <a:rPr lang="en-GB" dirty="0">
@@ -12097,7 +12367,7 @@
             </a:pPr>
             <a:r>
               <a:rPr lang="en-GB" dirty="0"/>
-              <a:t>Let us discuss how to use them in our Neural Network!</a:t>
+              <a:t>Let us demonstrate how to use them in our Neural Network!</a:t>
             </a:r>
           </a:p>
           <a:p>
@@ -12197,7 +12467,15 @@
             </a:pPr>
             <a:r>
               <a:rPr lang="en-GB" dirty="0"/>
-              <a:t>Three modifications are to be considered to use Adam instead of the Vanilla gradient descent rule.</a:t>
+              <a:t>Three modifications are to be considered to use </a:t>
+            </a:r>
+            <a:r>
+              <a:rPr lang="en-GB" b="1" dirty="0"/>
+              <a:t>Adam</a:t>
+            </a:r>
+            <a:r>
+              <a:rPr lang="en-GB" dirty="0"/>
+              <a:t> instead of the Vanilla gradient descent rule.</a:t>
             </a:r>
             <a:endParaRPr lang="en-SG" dirty="0"/>
           </a:p>
@@ -12278,7 +12556,15 @@
             </a:r>
             <a:r>
               <a:rPr lang="en-GB" dirty="0"/>
-              <a:t>is used to update the V and S parameters in Adam. This also replaces the gradient rule update entirely (damn!).</a:t>
+              <a:t>is used to update the V and S parameters in Adam. This also </a:t>
+            </a:r>
+            <a:r>
+              <a:rPr lang="en-GB" b="1" dirty="0"/>
+              <a:t>replaces the gradient rule update procedure entirely</a:t>
+            </a:r>
+            <a:r>
+              <a:rPr lang="en-GB" dirty="0"/>
+              <a:t> (damn!).</a:t>
             </a:r>
           </a:p>
           <a:p>
@@ -12686,14 +12972,14 @@
             </a:pPr>
             <a:r>
               <a:rPr lang="en-GB" dirty="0"/>
-              <a:t>Feel free to also have a look at the implementation of these optimizers. You should recognize our concepts from Week 2!</a:t>
+              <a:t>Feel free to also have a look at the implementation of these optimizers. You should be able to recognize some concepts from Week 2!</a:t>
             </a:r>
             <a:br>
               <a:rPr lang="en-GB" dirty="0"/>
             </a:br>
             <a:r>
               <a:rPr lang="en-GB" dirty="0"/>
-              <a:t>These optimizers come with a few more features that might be worth exploring!</a:t>
+              <a:t>These optimizers come with a few more features that might be worth exploring (but we will consider them out-of-scope)!</a:t>
             </a:r>
           </a:p>
           <a:p>
@@ -12724,7 +13010,7 @@
             </a:r>
             <a:r>
               <a:rPr lang="en-GB" dirty="0"/>
-              <a:t>implementing your own optimizer is generally a bad idea, but feel free to have a look at the code to see what it takes!</a:t>
+              <a:t>implementing your own optimizer is generally a bad idea, but feel free to have a look at the codes to see what it takes!</a:t>
             </a:r>
           </a:p>
           <a:p>
@@ -13758,15 +14044,18 @@
         <p:spPr>
           <a:xfrm>
             <a:off x="234462" y="1825625"/>
-            <a:ext cx="2860430" cy="4351338"/>
+            <a:ext cx="3108506" cy="4351338"/>
           </a:xfrm>
         </p:spPr>
         <p:txBody>
           <a:bodyPr>
-            <a:normAutofit lnSpcReduction="10000"/>
+            <a:normAutofit/>
           </a:bodyPr>
           <a:lstStyle/>
           <a:p>
+            <a:pPr marL="0" indent="0">
+              <a:buNone/>
+            </a:pPr>
             <a:r>
               <a:rPr lang="en-GB" dirty="0"/>
               <a:t>This part is a bit tedious and relies on our own manual implementation of a random normal initializer.</a:t>
@@ -13775,7 +14064,7 @@
           <a:p>
             <a:r>
               <a:rPr lang="en-GB" b="1" dirty="0"/>
-              <a:t>Need for </a:t>
+              <a:t>Need to replace these RNG with built-in </a:t>
             </a:r>
             <a:r>
               <a:rPr lang="en-GB" b="1" dirty="0" err="1"/>
@@ -13785,7 +14074,6 @@
               <a:rPr lang="en-GB" b="1" dirty="0"/>
               <a:t> initializers!</a:t>
             </a:r>
-            <a:endParaRPr lang="en-SG" b="1" dirty="0"/>
           </a:p>
         </p:txBody>
       </p:sp>
@@ -14002,7 +14290,23 @@
           <a:p>
             <a:r>
               <a:rPr lang="en-GB" dirty="0"/>
-              <a:t>Feel free to have a look at this for additional initializers in </a:t>
+              <a:t>Feel free to have a look at this for </a:t>
+            </a:r>
+            <a:r>
+              <a:rPr lang="en-GB" b="1" dirty="0"/>
+              <a:t>additional</a:t>
+            </a:r>
+            <a:r>
+              <a:rPr lang="en-GB" dirty="0"/>
+              <a:t> </a:t>
+            </a:r>
+            <a:r>
+              <a:rPr lang="en-GB" b="1" dirty="0"/>
+              <a:t>initializers</a:t>
+            </a:r>
+            <a:r>
+              <a:rPr lang="en-GB" dirty="0"/>
+              <a:t> in </a:t>
             </a:r>
             <a:r>
               <a:rPr lang="en-GB" dirty="0" err="1"/>
@@ -14487,7 +14791,7 @@
             </a:pPr>
             <a:r>
               <a:rPr lang="en-GB" dirty="0"/>
-              <a:t>We now have a full Neural Network class, in </a:t>
+              <a:t>We now have a full Neural Network class, written in </a:t>
             </a:r>
             <a:r>
               <a:rPr lang="en-GB" dirty="0" err="1"/>
@@ -14560,21 +14864,8 @@
             </a:pPr>
             <a:r>
               <a:rPr lang="en-SG" dirty="0"/>
-              <a:t>And </a:t>
-            </a:r>
-            <a:r>
-              <a:rPr lang="en-SG"/>
-              <a:t>it runs/trains </a:t>
-            </a:r>
-            <a:r>
-              <a:rPr lang="en-SG" dirty="0"/>
-              <a:t>at the speed of light (</a:t>
-            </a:r>
-            <a:r>
-              <a:rPr lang="en-SG"/>
-              <a:t>almost…) on GPU!</a:t>
-            </a:r>
-            <a:endParaRPr lang="en-SG" dirty="0"/>
+              <a:t>And it runs/trains at the speed of light (almost…) on GPU!</a:t>
+            </a:r>
           </a:p>
         </p:txBody>
       </p:sp>
@@ -15119,8 +15410,8 @@
           </a:p>
         </p:txBody>
       </p:sp>
-      <mc:AlternateContent xmlns:mc="http://schemas.openxmlformats.org/markup-compatibility/2006" xmlns:a14="http://schemas.microsoft.com/office/drawing/2010/main">
-        <mc:Choice Requires="a14">
+      <mc:AlternateContent xmlns:mc="http://schemas.openxmlformats.org/markup-compatibility/2006">
+        <mc:Choice xmlns:a14="http://schemas.microsoft.com/office/drawing/2010/main" Requires="a14">
           <p:sp>
             <p:nvSpPr>
               <p:cNvPr id="3" name="Content Placeholder 2">
@@ -15154,7 +15445,7 @@
                 </a:pPr>
                 <a:r>
                   <a:rPr lang="en-GB" dirty="0"/>
-                  <a:t>What makes </a:t>
+                  <a:t>A feature that makes </a:t>
                 </a:r>
                 <a:r>
                   <a:rPr lang="en-GB" dirty="0" err="1"/>
@@ -15174,7 +15465,7 @@
                 </a:r>
                 <a:r>
                   <a:rPr lang="en-GB" b="1" dirty="0"/>
-                  <a:t>computational graph able to provide automatic differentiation for all operations on Tensors</a:t>
+                  <a:t>computational graph able to provide automatic differentiation for all operations made on Tensors</a:t>
                 </a:r>
                 <a:r>
                   <a:rPr lang="en-GB" dirty="0"/>
@@ -15184,7 +15475,7 @@
               <a:p>
                 <a:r>
                   <a:rPr lang="en-GB" dirty="0"/>
-                  <a:t>For instance, let us consider the function </a:t>
+                  <a:t>To demonstrate, let us consider the function </a:t>
                 </a:r>
                 <a14:m>
                   <m:oMath xmlns:m="http://schemas.openxmlformats.org/officeDocument/2006/math">
@@ -15407,7 +15698,7 @@
             </p:txBody>
           </p:sp>
         </mc:Choice>
-        <mc:Fallback xmlns="">
+        <mc:Fallback>
           <p:sp>
             <p:nvSpPr>
               <p:cNvPr id="3" name="Content Placeholder 2">
@@ -15547,8 +15838,8 @@
           </a:p>
         </p:txBody>
       </p:sp>
-      <mc:AlternateContent xmlns:mc="http://schemas.openxmlformats.org/markup-compatibility/2006" xmlns:a14="http://schemas.microsoft.com/office/drawing/2010/main">
-        <mc:Choice Requires="a14">
+      <mc:AlternateContent xmlns:mc="http://schemas.openxmlformats.org/markup-compatibility/2006">
+        <mc:Choice xmlns:a14="http://schemas.microsoft.com/office/drawing/2010/main" Requires="a14">
           <p:sp>
             <p:nvSpPr>
               <p:cNvPr id="11" name="Content Placeholder 10">
@@ -15577,6 +15868,9 @@
               </a:bodyPr>
               <a:lstStyle/>
               <a:p>
+                <a:pPr marL="0" indent="0">
+                  <a:buNone/>
+                </a:pPr>
                 <a:r>
                   <a:rPr lang="en-GB" dirty="0"/>
                   <a:t>Define our function and its derivative (for reference).</a:t>
@@ -15768,7 +16062,7 @@
             </p:txBody>
           </p:sp>
         </mc:Choice>
-        <mc:Fallback xmlns="">
+        <mc:Fallback>
           <p:sp>
             <p:nvSpPr>
               <p:cNvPr id="11" name="Content Placeholder 10">
@@ -15793,7 +16087,7 @@
               <a:blipFill>
                 <a:blip r:embed="rId3"/>
                 <a:stretch>
-                  <a:fillRect l="-2242" t="-2000" b="-875"/>
+                  <a:fillRect l="-2615" t="-2000" b="-875"/>
                 </a:stretch>
               </a:blipFill>
             </p:spPr>
@@ -15878,8 +16172,8 @@
           </a:p>
         </p:txBody>
       </p:sp>
-      <mc:AlternateContent xmlns:mc="http://schemas.openxmlformats.org/markup-compatibility/2006" xmlns:a14="http://schemas.microsoft.com/office/drawing/2010/main">
-        <mc:Choice Requires="a14">
+      <mc:AlternateContent xmlns:mc="http://schemas.openxmlformats.org/markup-compatibility/2006">
+        <mc:Choice xmlns:a14="http://schemas.microsoft.com/office/drawing/2010/main" Requires="a14">
           <p:sp>
             <p:nvSpPr>
               <p:cNvPr id="11" name="Content Placeholder 10">
@@ -15916,7 +16210,7 @@
               <a:p>
                 <a:r>
                   <a:rPr lang="en-GB" dirty="0"/>
-                  <a:t>For instance let us define a 1D tensor </a:t>
+                  <a:t>For instance, let us define a 1D tensor </a:t>
                 </a:r>
                 <a14:m>
                   <m:oMath xmlns:m="http://schemas.openxmlformats.org/officeDocument/2006/math">
@@ -16369,7 +16663,7 @@
             </p:txBody>
           </p:sp>
         </mc:Choice>
-        <mc:Fallback xmlns="">
+        <mc:Fallback>
           <p:sp>
             <p:nvSpPr>
               <p:cNvPr id="11" name="Content Placeholder 10">
@@ -16534,6 +16828,9 @@
           </a:bodyPr>
           <a:lstStyle/>
           <a:p>
+            <a:pPr marL="0" indent="0">
+              <a:buNone/>
+            </a:pPr>
             <a:r>
               <a:rPr lang="en-GB" dirty="0"/>
               <a:t>The </a:t>
@@ -16544,7 +16841,7 @@
             </a:r>
             <a:r>
               <a:rPr lang="en-GB" dirty="0"/>
-              <a:t> is the key component of </a:t>
+              <a:t> is one of the most powerful features of the </a:t>
             </a:r>
             <a:r>
               <a:rPr lang="en-GB" dirty="0" err="1"/>
@@ -16552,17 +16849,29 @@
             </a:r>
             <a:r>
               <a:rPr lang="en-GB" dirty="0"/>
-              <a:t>, and why we like it so much.</a:t>
-            </a:r>
-          </a:p>
-          <a:p>
-            <a:r>
-              <a:rPr lang="en-GB" dirty="0"/>
-              <a:t>This basically means that </a:t>
-            </a:r>
+              <a:t> </a:t>
+            </a:r>
+            <a:r>
+              <a:rPr lang="en-GB" dirty="0" err="1"/>
+              <a:t>frmework</a:t>
+            </a:r>
+            <a:r>
+              <a:rPr lang="en-GB" dirty="0"/>
+              <a:t>, and why we like it so much for training Neural Networks.</a:t>
+            </a:r>
+          </a:p>
+          <a:p>
             <a:r>
               <a:rPr lang="en-GB" b="1" dirty="0"/>
-              <a:t>we do not need to calculate the gradients for any of our future gradient descent rules, manually again! (yay!)</a:t>
+              <a:t>Thanks to </a:t>
+            </a:r>
+            <a:r>
+              <a:rPr lang="en-GB" b="1" dirty="0" err="1"/>
+              <a:t>autograd</a:t>
+            </a:r>
+            <a:r>
+              <a:rPr lang="en-GB" b="1" dirty="0"/>
+              <a:t>, we do not need to calculate the gradients for any of our future gradient descent rules, manually again! (yay!)</a:t>
             </a:r>
           </a:p>
           <a:p>
@@ -16582,7 +16891,7 @@
           <a:p>
             <a:r>
               <a:rPr lang="en-GB" dirty="0"/>
-              <a:t>You do not need to know how it implements the computation of all gradients in the background, but if you are curious, have a look at this: </a:t>
+              <a:t>You do not need to know how it implements the computation of all gradients in the background, but if you are curious, have a look at: </a:t>
             </a:r>
             <a:r>
               <a:rPr lang="en-GB" dirty="0">

</xml_diff>

<commit_message>
Final changes to W3S2 and W3S3 before lectures.
</commit_message>
<xml_diff>
--- a/W3/2. W3S2 final/W3S2.pptx
+++ b/W3/2. W3S2 final/W3S2.pptx
@@ -5,7 +5,7 @@
     <p:sldMasterId id="2147483648" r:id="rId1"/>
   </p:sldMasterIdLst>
   <p:notesMasterIdLst>
-    <p:notesMasterId r:id="rId38"/>
+    <p:notesMasterId r:id="rId39"/>
   </p:notesMasterIdLst>
   <p:sldIdLst>
     <p:sldId id="377" r:id="rId2"/>
@@ -15,35 +15,36 @@
     <p:sldId id="650" r:id="rId6"/>
     <p:sldId id="387" r:id="rId7"/>
     <p:sldId id="761" r:id="rId8"/>
-    <p:sldId id="762" r:id="rId9"/>
-    <p:sldId id="763" r:id="rId10"/>
-    <p:sldId id="764" r:id="rId11"/>
+    <p:sldId id="787" r:id="rId9"/>
+    <p:sldId id="762" r:id="rId10"/>
+    <p:sldId id="763" r:id="rId11"/>
     <p:sldId id="388" r:id="rId12"/>
     <p:sldId id="765" r:id="rId13"/>
-    <p:sldId id="389" r:id="rId14"/>
-    <p:sldId id="766" r:id="rId15"/>
-    <p:sldId id="767" r:id="rId16"/>
-    <p:sldId id="768" r:id="rId17"/>
-    <p:sldId id="390" r:id="rId18"/>
-    <p:sldId id="770" r:id="rId19"/>
-    <p:sldId id="771" r:id="rId20"/>
-    <p:sldId id="769" r:id="rId21"/>
-    <p:sldId id="772" r:id="rId22"/>
-    <p:sldId id="773" r:id="rId23"/>
-    <p:sldId id="774" r:id="rId24"/>
-    <p:sldId id="391" r:id="rId25"/>
-    <p:sldId id="775" r:id="rId26"/>
-    <p:sldId id="776" r:id="rId27"/>
-    <p:sldId id="777" r:id="rId28"/>
-    <p:sldId id="778" r:id="rId29"/>
-    <p:sldId id="779" r:id="rId30"/>
-    <p:sldId id="392" r:id="rId31"/>
-    <p:sldId id="394" r:id="rId32"/>
-    <p:sldId id="780" r:id="rId33"/>
-    <p:sldId id="395" r:id="rId34"/>
-    <p:sldId id="786" r:id="rId35"/>
-    <p:sldId id="782" r:id="rId36"/>
-    <p:sldId id="781" r:id="rId37"/>
+    <p:sldId id="764" r:id="rId14"/>
+    <p:sldId id="389" r:id="rId15"/>
+    <p:sldId id="766" r:id="rId16"/>
+    <p:sldId id="767" r:id="rId17"/>
+    <p:sldId id="768" r:id="rId18"/>
+    <p:sldId id="390" r:id="rId19"/>
+    <p:sldId id="770" r:id="rId20"/>
+    <p:sldId id="771" r:id="rId21"/>
+    <p:sldId id="769" r:id="rId22"/>
+    <p:sldId id="772" r:id="rId23"/>
+    <p:sldId id="773" r:id="rId24"/>
+    <p:sldId id="774" r:id="rId25"/>
+    <p:sldId id="391" r:id="rId26"/>
+    <p:sldId id="775" r:id="rId27"/>
+    <p:sldId id="776" r:id="rId28"/>
+    <p:sldId id="777" r:id="rId29"/>
+    <p:sldId id="778" r:id="rId30"/>
+    <p:sldId id="779" r:id="rId31"/>
+    <p:sldId id="392" r:id="rId32"/>
+    <p:sldId id="394" r:id="rId33"/>
+    <p:sldId id="780" r:id="rId34"/>
+    <p:sldId id="395" r:id="rId35"/>
+    <p:sldId id="786" r:id="rId36"/>
+    <p:sldId id="782" r:id="rId37"/>
+    <p:sldId id="781" r:id="rId38"/>
   </p:sldIdLst>
   <p:sldSz cx="12192000" cy="6858000"/>
   <p:notesSz cx="6858000" cy="9144000"/>
@@ -162,9 +163,9 @@
           <p14:sldIdLst>
             <p14:sldId id="387"/>
             <p14:sldId id="761"/>
+            <p14:sldId id="787"/>
             <p14:sldId id="762"/>
             <p14:sldId id="763"/>
-            <p14:sldId id="764"/>
           </p14:sldIdLst>
         </p14:section>
         <p14:section name="III.2. Implementing a simple gradient descent" id="{76A3535D-AB29-4E9E-8C0A-231B2FE96A38}">
@@ -175,6 +176,7 @@
         </p14:section>
         <p14:section name="III.3. Backpropagation and no_grad()" id="{CB5D7E1A-1513-4D06-AD0A-63CEC9F8E7C4}">
           <p14:sldIdLst>
+            <p14:sldId id="764"/>
             <p14:sldId id="389"/>
             <p14:sldId id="766"/>
             <p14:sldId id="767"/>
@@ -237,7 +239,7 @@
 <file path=ppt/revisionInfo.xml><?xml version="1.0" encoding="utf-8"?>
 <p1510:revInfo xmlns:a="http://schemas.openxmlformats.org/drawingml/2006/main" xmlns:r="http://schemas.openxmlformats.org/officeDocument/2006/relationships" xmlns:p1510="http://schemas.microsoft.com/office/powerpoint/2015/10/main">
   <p1510:revLst>
-    <p1510:client id="{3C5169EE-A97A-435D-9C7E-3653962501C6}" v="46" dt="2024-02-06T09:28:00.005"/>
+    <p1510:client id="{3C5169EE-A97A-435D-9C7E-3653962501C6}" v="52" dt="2024-02-07T02:57:32.286"/>
   </p1510:revLst>
 </p1510:revInfo>
 </file>
@@ -246,8 +248,8 @@
 <pc:chgInfo xmlns:a="http://schemas.openxmlformats.org/drawingml/2006/main" xmlns:r="http://schemas.openxmlformats.org/officeDocument/2006/relationships" xmlns:ac="http://schemas.microsoft.com/office/drawing/2013/main/command" xmlns:pc="http://schemas.microsoft.com/office/powerpoint/2013/main/command">
   <pc:docChgLst>
     <pc:chgData name="Matthieu De Mari" userId="dfb708c9-d8dc-439f-9a3b-c772bf4a311c" providerId="ADAL" clId="{3C5169EE-A97A-435D-9C7E-3653962501C6}"/>
-    <pc:docChg chg="custSel addSld modSld addSection modSection">
-      <pc:chgData name="Matthieu De Mari" userId="dfb708c9-d8dc-439f-9a3b-c772bf4a311c" providerId="ADAL" clId="{3C5169EE-A97A-435D-9C7E-3653962501C6}" dt="2024-02-06T09:37:33.579" v="519" actId="22"/>
+    <pc:docChg chg="custSel addSld modSld sldOrd addSection modSection">
+      <pc:chgData name="Matthieu De Mari" userId="dfb708c9-d8dc-439f-9a3b-c772bf4a311c" providerId="ADAL" clId="{3C5169EE-A97A-435D-9C7E-3653962501C6}" dt="2024-02-07T02:59:22.033" v="1066" actId="207"/>
       <pc:docMkLst>
         <pc:docMk/>
       </pc:docMkLst>
@@ -266,6 +268,21 @@
           </ac:spMkLst>
         </pc:spChg>
       </pc:sldChg>
+      <pc:sldChg chg="modSp">
+        <pc:chgData name="Matthieu De Mari" userId="dfb708c9-d8dc-439f-9a3b-c772bf4a311c" providerId="ADAL" clId="{3C5169EE-A97A-435D-9C7E-3653962501C6}" dt="2024-02-07T02:53:35.472" v="520" actId="20577"/>
+        <pc:sldMkLst>
+          <pc:docMk/>
+          <pc:sldMk cId="1546007078" sldId="762"/>
+        </pc:sldMkLst>
+        <pc:spChg chg="mod">
+          <ac:chgData name="Matthieu De Mari" userId="dfb708c9-d8dc-439f-9a3b-c772bf4a311c" providerId="ADAL" clId="{3C5169EE-A97A-435D-9C7E-3653962501C6}" dt="2024-02-07T02:53:35.472" v="520" actId="20577"/>
+          <ac:spMkLst>
+            <pc:docMk/>
+            <pc:sldMk cId="1546007078" sldId="762"/>
+            <ac:spMk id="11" creationId="{0EEC07FE-D839-07DF-7C1A-CDBE72FE6BB9}"/>
+          </ac:spMkLst>
+        </pc:spChg>
+      </pc:sldChg>
       <pc:sldChg chg="modSp mod">
         <pc:chgData name="Matthieu De Mari" userId="dfb708c9-d8dc-439f-9a3b-c772bf4a311c" providerId="ADAL" clId="{3C5169EE-A97A-435D-9C7E-3653962501C6}" dt="2024-01-21T10:07:13.728" v="0" actId="20577"/>
         <pc:sldMkLst>
@@ -281,12 +298,20 @@
           </ac:spMkLst>
         </pc:spChg>
       </pc:sldChg>
-      <pc:sldChg chg="modSp mod">
-        <pc:chgData name="Matthieu De Mari" userId="dfb708c9-d8dc-439f-9a3b-c772bf4a311c" providerId="ADAL" clId="{3C5169EE-A97A-435D-9C7E-3653962501C6}" dt="2024-02-02T09:10:08.851" v="97" actId="5793"/>
+      <pc:sldChg chg="modSp mod ord">
+        <pc:chgData name="Matthieu De Mari" userId="dfb708c9-d8dc-439f-9a3b-c772bf4a311c" providerId="ADAL" clId="{3C5169EE-A97A-435D-9C7E-3653962501C6}" dt="2024-02-07T02:54:43.303" v="539" actId="20578"/>
         <pc:sldMkLst>
           <pc:docMk/>
           <pc:sldMk cId="1879463264" sldId="764"/>
         </pc:sldMkLst>
+        <pc:spChg chg="mod">
+          <ac:chgData name="Matthieu De Mari" userId="dfb708c9-d8dc-439f-9a3b-c772bf4a311c" providerId="ADAL" clId="{3C5169EE-A97A-435D-9C7E-3653962501C6}" dt="2024-02-07T02:54:35.093" v="538" actId="14100"/>
+          <ac:spMkLst>
+            <pc:docMk/>
+            <pc:sldMk cId="1879463264" sldId="764"/>
+            <ac:spMk id="2" creationId="{219F4681-3E05-3370-3E46-11417BFE0CA3}"/>
+          </ac:spMkLst>
+        </pc:spChg>
         <pc:spChg chg="mod">
           <ac:chgData name="Matthieu De Mari" userId="dfb708c9-d8dc-439f-9a3b-c772bf4a311c" providerId="ADAL" clId="{3C5169EE-A97A-435D-9C7E-3653962501C6}" dt="2024-02-02T09:10:08.851" v="97" actId="5793"/>
           <ac:spMkLst>
@@ -424,8 +449,23 @@
           </ac:picMkLst>
         </pc:picChg>
       </pc:sldChg>
+      <pc:sldChg chg="modSp mod">
+        <pc:chgData name="Matthieu De Mari" userId="dfb708c9-d8dc-439f-9a3b-c772bf4a311c" providerId="ADAL" clId="{3C5169EE-A97A-435D-9C7E-3653962501C6}" dt="2024-02-07T02:59:22.033" v="1066" actId="207"/>
+        <pc:sldMkLst>
+          <pc:docMk/>
+          <pc:sldMk cId="639852900" sldId="783"/>
+        </pc:sldMkLst>
+        <pc:spChg chg="mod">
+          <ac:chgData name="Matthieu De Mari" userId="dfb708c9-d8dc-439f-9a3b-c772bf4a311c" providerId="ADAL" clId="{3C5169EE-A97A-435D-9C7E-3653962501C6}" dt="2024-02-07T02:59:22.033" v="1066" actId="207"/>
+          <ac:spMkLst>
+            <pc:docMk/>
+            <pc:sldMk cId="639852900" sldId="783"/>
+            <ac:spMk id="3" creationId="{65B58308-C101-BC04-E972-00C74DE5080B}"/>
+          </ac:spMkLst>
+        </pc:spChg>
+      </pc:sldChg>
       <pc:sldChg chg="addSp delSp modSp new mod modClrScheme chgLayout">
-        <pc:chgData name="Matthieu De Mari" userId="dfb708c9-d8dc-439f-9a3b-c772bf4a311c" providerId="ADAL" clId="{3C5169EE-A97A-435D-9C7E-3653962501C6}" dt="2024-02-06T09:37:12.215" v="518" actId="1076"/>
+        <pc:chgData name="Matthieu De Mari" userId="dfb708c9-d8dc-439f-9a3b-c772bf4a311c" providerId="ADAL" clId="{3C5169EE-A97A-435D-9C7E-3653962501C6}" dt="2024-02-07T02:58:48.139" v="1065" actId="12"/>
         <pc:sldMkLst>
           <pc:docMk/>
           <pc:sldMk cId="2116083586" sldId="786"/>
@@ -447,7 +487,7 @@
           </ac:spMkLst>
         </pc:spChg>
         <pc:spChg chg="add mod ord">
-          <ac:chgData name="Matthieu De Mari" userId="dfb708c9-d8dc-439f-9a3b-c772bf4a311c" providerId="ADAL" clId="{3C5169EE-A97A-435D-9C7E-3653962501C6}" dt="2024-02-06T09:29:07.644" v="510" actId="20577"/>
+          <ac:chgData name="Matthieu De Mari" userId="dfb708c9-d8dc-439f-9a3b-c772bf4a311c" providerId="ADAL" clId="{3C5169EE-A97A-435D-9C7E-3653962501C6}" dt="2024-02-07T02:58:48.139" v="1065" actId="12"/>
           <ac:spMkLst>
             <pc:docMk/>
             <pc:sldMk cId="2116083586" sldId="786"/>
@@ -478,6 +518,21 @@
             <ac:picMk id="9" creationId="{8EB51A59-EDBF-04FF-A358-04B81894FD97}"/>
           </ac:picMkLst>
         </pc:picChg>
+      </pc:sldChg>
+      <pc:sldChg chg="modSp add mod">
+        <pc:chgData name="Matthieu De Mari" userId="dfb708c9-d8dc-439f-9a3b-c772bf4a311c" providerId="ADAL" clId="{3C5169EE-A97A-435D-9C7E-3653962501C6}" dt="2024-02-07T02:57:41.537" v="971" actId="113"/>
+        <pc:sldMkLst>
+          <pc:docMk/>
+          <pc:sldMk cId="1002846102" sldId="787"/>
+        </pc:sldMkLst>
+        <pc:spChg chg="mod">
+          <ac:chgData name="Matthieu De Mari" userId="dfb708c9-d8dc-439f-9a3b-c772bf4a311c" providerId="ADAL" clId="{3C5169EE-A97A-435D-9C7E-3653962501C6}" dt="2024-02-07T02:57:41.537" v="971" actId="113"/>
+          <ac:spMkLst>
+            <pc:docMk/>
+            <pc:sldMk cId="1002846102" sldId="787"/>
+            <ac:spMk id="11" creationId="{982DA01D-CDF4-6F03-220D-18E06E9ABA89}"/>
+          </ac:spMkLst>
+        </pc:spChg>
       </pc:sldChg>
     </pc:docChg>
   </pc:docChgLst>
@@ -5332,7 +5387,7 @@
           <a:p>
             <a:fld id="{61478373-EB31-4867-8CF0-FA31364748A5}" type="datetimeFigureOut">
               <a:rPr lang="en-GB" smtClean="0"/>
-              <a:t>06/02/2024</a:t>
+              <a:t>07/02/2024</a:t>
             </a:fld>
             <a:endParaRPr lang="en-GB"/>
           </a:p>
@@ -5749,7 +5804,7 @@
           <a:p>
             <a:fld id="{E85DF616-B21E-4EF6-A6A5-95E2FB3EB1A1}" type="datetimeFigureOut">
               <a:rPr lang="en-GB" smtClean="0"/>
-              <a:t>06/02/2024</a:t>
+              <a:t>07/02/2024</a:t>
             </a:fld>
             <a:endParaRPr lang="en-GB"/>
           </a:p>
@@ -5949,7 +6004,7 @@
           <a:p>
             <a:fld id="{E85DF616-B21E-4EF6-A6A5-95E2FB3EB1A1}" type="datetimeFigureOut">
               <a:rPr lang="en-GB" smtClean="0"/>
-              <a:t>06/02/2024</a:t>
+              <a:t>07/02/2024</a:t>
             </a:fld>
             <a:endParaRPr lang="en-GB"/>
           </a:p>
@@ -6159,7 +6214,7 @@
           <a:p>
             <a:fld id="{E85DF616-B21E-4EF6-A6A5-95E2FB3EB1A1}" type="datetimeFigureOut">
               <a:rPr lang="en-GB" smtClean="0"/>
-              <a:t>06/02/2024</a:t>
+              <a:t>07/02/2024</a:t>
             </a:fld>
             <a:endParaRPr lang="en-GB"/>
           </a:p>
@@ -6359,7 +6414,7 @@
           <a:p>
             <a:fld id="{E85DF616-B21E-4EF6-A6A5-95E2FB3EB1A1}" type="datetimeFigureOut">
               <a:rPr lang="en-GB" smtClean="0"/>
-              <a:t>06/02/2024</a:t>
+              <a:t>07/02/2024</a:t>
             </a:fld>
             <a:endParaRPr lang="en-GB"/>
           </a:p>
@@ -6635,7 +6690,7 @@
           <a:p>
             <a:fld id="{E85DF616-B21E-4EF6-A6A5-95E2FB3EB1A1}" type="datetimeFigureOut">
               <a:rPr lang="en-GB" smtClean="0"/>
-              <a:t>06/02/2024</a:t>
+              <a:t>07/02/2024</a:t>
             </a:fld>
             <a:endParaRPr lang="en-GB"/>
           </a:p>
@@ -6903,7 +6958,7 @@
           <a:p>
             <a:fld id="{E85DF616-B21E-4EF6-A6A5-95E2FB3EB1A1}" type="datetimeFigureOut">
               <a:rPr lang="en-GB" smtClean="0"/>
-              <a:t>06/02/2024</a:t>
+              <a:t>07/02/2024</a:t>
             </a:fld>
             <a:endParaRPr lang="en-GB"/>
           </a:p>
@@ -7318,7 +7373,7 @@
           <a:p>
             <a:fld id="{E85DF616-B21E-4EF6-A6A5-95E2FB3EB1A1}" type="datetimeFigureOut">
               <a:rPr lang="en-GB" smtClean="0"/>
-              <a:t>06/02/2024</a:t>
+              <a:t>07/02/2024</a:t>
             </a:fld>
             <a:endParaRPr lang="en-GB"/>
           </a:p>
@@ -7460,7 +7515,7 @@
           <a:p>
             <a:fld id="{E85DF616-B21E-4EF6-A6A5-95E2FB3EB1A1}" type="datetimeFigureOut">
               <a:rPr lang="en-GB" smtClean="0"/>
-              <a:t>06/02/2024</a:t>
+              <a:t>07/02/2024</a:t>
             </a:fld>
             <a:endParaRPr lang="en-GB"/>
           </a:p>
@@ -7573,7 +7628,7 @@
           <a:p>
             <a:fld id="{E85DF616-B21E-4EF6-A6A5-95E2FB3EB1A1}" type="datetimeFigureOut">
               <a:rPr lang="en-GB" smtClean="0"/>
-              <a:t>06/02/2024</a:t>
+              <a:t>07/02/2024</a:t>
             </a:fld>
             <a:endParaRPr lang="en-GB"/>
           </a:p>
@@ -7886,7 +7941,7 @@
           <a:p>
             <a:fld id="{E85DF616-B21E-4EF6-A6A5-95E2FB3EB1A1}" type="datetimeFigureOut">
               <a:rPr lang="en-GB" smtClean="0"/>
-              <a:t>06/02/2024</a:t>
+              <a:t>07/02/2024</a:t>
             </a:fld>
             <a:endParaRPr lang="en-GB"/>
           </a:p>
@@ -8175,7 +8230,7 @@
           <a:p>
             <a:fld id="{E85DF616-B21E-4EF6-A6A5-95E2FB3EB1A1}" type="datetimeFigureOut">
               <a:rPr lang="en-GB" smtClean="0"/>
-              <a:t>06/02/2024</a:t>
+              <a:t>07/02/2024</a:t>
             </a:fld>
             <a:endParaRPr lang="en-GB"/>
           </a:p>
@@ -8418,7 +8473,7 @@
           <a:p>
             <a:fld id="{E85DF616-B21E-4EF6-A6A5-95E2FB3EB1A1}" type="datetimeFigureOut">
               <a:rPr lang="en-GB" smtClean="0"/>
-              <a:t>06/02/2024</a:t>
+              <a:t>07/02/2024</a:t>
             </a:fld>
             <a:endParaRPr lang="en-GB"/>
           </a:p>
@@ -9111,428 +9166,119 @@
               <a:rPr lang="en-GB" dirty="0" err="1"/>
               <a:t>Autograd</a:t>
             </a:r>
-            <a:br>
-              <a:rPr lang="en-GB" dirty="0"/>
-            </a:br>
-            <a:r>
-              <a:rPr lang="en-GB" dirty="0"/>
-              <a:t>intuition</a:t>
+            <a:r>
+              <a:rPr lang="en-GB" dirty="0"/>
+              <a:t>, in short</a:t>
             </a:r>
             <a:endParaRPr lang="en-SG" dirty="0"/>
-          </a:p>
-        </p:txBody>
-      </p:sp>
-      <mc:AlternateContent xmlns:mc="http://schemas.openxmlformats.org/markup-compatibility/2006" xmlns:a14="http://schemas.microsoft.com/office/drawing/2010/main">
-        <mc:Choice Requires="a14">
-          <p:sp>
-            <p:nvSpPr>
-              <p:cNvPr id="5" name="Content Placeholder 4">
-                <a:extLst>
-                  <a:ext uri="{FF2B5EF4-FFF2-40B4-BE49-F238E27FC236}">
-                    <a16:creationId xmlns:a16="http://schemas.microsoft.com/office/drawing/2014/main" id="{1A87BA25-5926-816A-6E16-0F90D4B62FB8}"/>
-                  </a:ext>
-                </a:extLst>
-              </p:cNvPr>
-              <p:cNvSpPr>
-                <a:spLocks noGrp="1"/>
-              </p:cNvSpPr>
-              <p:nvPr>
-                <p:ph idx="1"/>
-              </p:nvPr>
-            </p:nvSpPr>
-            <p:spPr>
-              <a:xfrm>
-                <a:off x="508000" y="1825624"/>
-                <a:ext cx="4726487" cy="5032375"/>
-              </a:xfrm>
-            </p:spPr>
-            <p:txBody>
-              <a:bodyPr>
-                <a:normAutofit lnSpcReduction="10000"/>
-              </a:bodyPr>
-              <a:lstStyle/>
-              <a:p>
-                <a:pPr marL="0" indent="0">
-                  <a:buNone/>
-                </a:pPr>
-                <a:r>
-                  <a:rPr lang="en-GB" dirty="0"/>
-                  <a:t>Recall Week 2 Notebook 8, our three-layers model.</a:t>
-                </a:r>
-              </a:p>
-              <a:p>
-                <a:r>
-                  <a:rPr lang="en-GB" dirty="0"/>
-                  <a:t>We can </a:t>
-                </a:r>
-                <a:r>
-                  <a:rPr lang="en-GB" b="1" dirty="0"/>
-                  <a:t>recognize</a:t>
-                </a:r>
-                <a:r>
-                  <a:rPr lang="en-GB" dirty="0"/>
-                  <a:t> </a:t>
-                </a:r>
-                <a:r>
-                  <a:rPr lang="en-GB" b="1" dirty="0"/>
-                  <a:t>patterns</a:t>
-                </a:r>
-                <a:r>
-                  <a:rPr lang="en-GB" dirty="0"/>
-                  <a:t> in the way to calculate derivatives and gradient descent update rules.</a:t>
-                </a:r>
-              </a:p>
-              <a:p>
-                <a:r>
-                  <a:rPr lang="en-GB" b="1" dirty="0"/>
-                  <a:t>Hints that there should be a way to automate differentiation!</a:t>
-                </a:r>
-                <a:endParaRPr lang="en-GB" b="1" dirty="0">
-                  <a:solidFill>
-                    <a:srgbClr val="7030A0"/>
-                  </a:solidFill>
-                </a:endParaRPr>
-              </a:p>
-              <a:p>
-                <a:pPr marL="0" indent="0">
-                  <a:buNone/>
-                </a:pPr>
-                <a:r>
-                  <a:rPr lang="en-GB" b="1" dirty="0">
-                    <a:solidFill>
-                      <a:srgbClr val="7030A0"/>
-                    </a:solidFill>
-                  </a:rPr>
-                  <a:t>Practice: </a:t>
-                </a:r>
-                <a:r>
-                  <a:rPr lang="en-GB" dirty="0">
-                    <a:solidFill>
-                      <a:srgbClr val="7030A0"/>
-                    </a:solidFill>
-                  </a:rPr>
-                  <a:t>automate the gradient descent rule process for any number </a:t>
-                </a:r>
-                <a14:m>
-                  <m:oMath xmlns:m="http://schemas.openxmlformats.org/officeDocument/2006/math">
-                    <m:r>
-                      <a:rPr lang="en-GB" i="1" dirty="0" smtClean="0">
-                        <a:solidFill>
-                          <a:srgbClr val="7030A0"/>
-                        </a:solidFill>
-                        <a:latin typeface="Cambria Math" panose="02040503050406030204" pitchFamily="18" charset="0"/>
-                      </a:rPr>
-                      <m:t>𝑁</m:t>
-                    </m:r>
-                  </m:oMath>
-                </a14:m>
-                <a:r>
-                  <a:rPr lang="en-GB" dirty="0">
-                    <a:solidFill>
-                      <a:srgbClr val="7030A0"/>
-                    </a:solidFill>
-                  </a:rPr>
-                  <a:t> of layers?</a:t>
-                </a:r>
-                <a:endParaRPr lang="en-SG" dirty="0">
-                  <a:solidFill>
-                    <a:srgbClr val="7030A0"/>
-                  </a:solidFill>
-                </a:endParaRPr>
-              </a:p>
-            </p:txBody>
-          </p:sp>
-        </mc:Choice>
-        <mc:Fallback xmlns="">
-          <p:sp>
-            <p:nvSpPr>
-              <p:cNvPr id="5" name="Content Placeholder 4">
-                <a:extLst>
-                  <a:ext uri="{FF2B5EF4-FFF2-40B4-BE49-F238E27FC236}">
-                    <a16:creationId xmlns:a16="http://schemas.microsoft.com/office/drawing/2014/main" id="{1A87BA25-5926-816A-6E16-0F90D4B62FB8}"/>
-                  </a:ext>
-                </a:extLst>
-              </p:cNvPr>
-              <p:cNvSpPr>
-                <a:spLocks noGrp="1" noRot="1" noChangeAspect="1" noMove="1" noResize="1" noEditPoints="1" noAdjustHandles="1" noChangeArrowheads="1" noChangeShapeType="1" noTextEdit="1"/>
-              </p:cNvSpPr>
-              <p:nvPr>
-                <p:ph idx="1"/>
-              </p:nvPr>
-            </p:nvSpPr>
-            <p:spPr>
-              <a:xfrm>
-                <a:off x="508000" y="1825624"/>
-                <a:ext cx="4726487" cy="5032375"/>
-              </a:xfrm>
-              <a:blipFill>
-                <a:blip r:embed="rId2"/>
-                <a:stretch>
-                  <a:fillRect l="-2577" t="-2663" r="-2320"/>
-                </a:stretch>
-              </a:blipFill>
-            </p:spPr>
-            <p:txBody>
-              <a:bodyPr/>
-              <a:lstStyle/>
-              <a:p>
-                <a:r>
-                  <a:rPr lang="en-GB">
-                    <a:noFill/>
-                  </a:rPr>
-                  <a:t> </a:t>
-                </a:r>
-              </a:p>
-            </p:txBody>
-          </p:sp>
-        </mc:Fallback>
-      </mc:AlternateContent>
-      <p:pic>
-        <p:nvPicPr>
-          <p:cNvPr id="4" name="Picture 3">
-            <a:extLst>
-              <a:ext uri="{FF2B5EF4-FFF2-40B4-BE49-F238E27FC236}">
-                <a16:creationId xmlns:a16="http://schemas.microsoft.com/office/drawing/2014/main" id="{11D096F0-0255-2417-C5F6-A8EFB107AF87}"/>
-              </a:ext>
-            </a:extLst>
-          </p:cNvPr>
-          <p:cNvPicPr>
-            <a:picLocks noChangeAspect="1"/>
-          </p:cNvPicPr>
-          <p:nvPr/>
-        </p:nvPicPr>
-        <p:blipFill>
-          <a:blip r:embed="rId3"/>
-          <a:stretch>
-            <a:fillRect/>
-          </a:stretch>
-        </p:blipFill>
-        <p:spPr>
-          <a:xfrm>
-            <a:off x="5234489" y="577024"/>
-            <a:ext cx="6916115" cy="5915851"/>
-          </a:xfrm>
-          <a:prstGeom prst="rect">
-            <a:avLst/>
-          </a:prstGeom>
-        </p:spPr>
-      </p:pic>
-      <p:sp>
-        <p:nvSpPr>
-          <p:cNvPr id="6" name="Rectangle 5">
-            <a:extLst>
-              <a:ext uri="{FF2B5EF4-FFF2-40B4-BE49-F238E27FC236}">
-                <a16:creationId xmlns:a16="http://schemas.microsoft.com/office/drawing/2014/main" id="{B71B8432-2941-E985-296B-548380048287}"/>
-              </a:ext>
-            </a:extLst>
-          </p:cNvPr>
-          <p:cNvSpPr/>
-          <p:nvPr/>
-        </p:nvSpPr>
-        <p:spPr>
-          <a:xfrm>
-            <a:off x="6347930" y="5830278"/>
-            <a:ext cx="5802673" cy="662598"/>
-          </a:xfrm>
-          <a:prstGeom prst="rect">
-            <a:avLst/>
-          </a:prstGeom>
-          <a:noFill/>
-          <a:ln w="38100">
-            <a:solidFill>
-              <a:schemeClr val="accent2"/>
-            </a:solidFill>
-            <a:prstDash val="sysDash"/>
-          </a:ln>
-        </p:spPr>
-        <p:style>
-          <a:lnRef idx="2">
-            <a:schemeClr val="accent1">
-              <a:shade val="50000"/>
-            </a:schemeClr>
-          </a:lnRef>
-          <a:fillRef idx="1">
-            <a:schemeClr val="accent1"/>
-          </a:fillRef>
-          <a:effectRef idx="0">
-            <a:schemeClr val="accent1"/>
-          </a:effectRef>
-          <a:fontRef idx="minor">
-            <a:schemeClr val="lt1"/>
-          </a:fontRef>
-        </p:style>
-        <p:txBody>
-          <a:bodyPr rtlCol="0" anchor="ctr"/>
-          <a:lstStyle/>
-          <a:p>
-            <a:pPr algn="ctr"/>
-            <a:endParaRPr lang="en-SG"/>
           </a:p>
         </p:txBody>
       </p:sp>
       <p:sp>
         <p:nvSpPr>
-          <p:cNvPr id="7" name="Rectangle 6">
+          <p:cNvPr id="5" name="Content Placeholder 4">
             <a:extLst>
               <a:ext uri="{FF2B5EF4-FFF2-40B4-BE49-F238E27FC236}">
-                <a16:creationId xmlns:a16="http://schemas.microsoft.com/office/drawing/2014/main" id="{6F218B3D-3CEC-F710-D995-1AFFD1565B4A}"/>
+                <a16:creationId xmlns:a16="http://schemas.microsoft.com/office/drawing/2014/main" id="{1A87BA25-5926-816A-6E16-0F90D4B62FB8}"/>
               </a:ext>
             </a:extLst>
           </p:cNvPr>
-          <p:cNvSpPr/>
-          <p:nvPr/>
-        </p:nvSpPr>
-        <p:spPr>
-          <a:xfrm flipV="1">
-            <a:off x="6347930" y="5212862"/>
-            <a:ext cx="5802673" cy="617416"/>
-          </a:xfrm>
-          <a:prstGeom prst="rect">
-            <a:avLst/>
-          </a:prstGeom>
-          <a:noFill/>
-          <a:ln w="38100">
-            <a:solidFill>
-              <a:schemeClr val="accent2"/>
-            </a:solidFill>
-            <a:prstDash val="sysDash"/>
-          </a:ln>
-        </p:spPr>
-        <p:style>
-          <a:lnRef idx="2">
-            <a:schemeClr val="accent1">
-              <a:shade val="50000"/>
-            </a:schemeClr>
-          </a:lnRef>
-          <a:fillRef idx="1">
-            <a:schemeClr val="accent1"/>
-          </a:fillRef>
-          <a:effectRef idx="0">
-            <a:schemeClr val="accent1"/>
-          </a:effectRef>
-          <a:fontRef idx="minor">
-            <a:schemeClr val="lt1"/>
-          </a:fontRef>
-        </p:style>
-        <p:txBody>
-          <a:bodyPr rtlCol="0" anchor="ctr"/>
-          <a:lstStyle/>
-          <a:p>
-            <a:pPr algn="ctr"/>
-            <a:endParaRPr lang="en-SG"/>
-          </a:p>
-        </p:txBody>
-      </p:sp>
-      <p:sp>
-        <p:nvSpPr>
-          <p:cNvPr id="8" name="Rectangle 7">
-            <a:extLst>
-              <a:ext uri="{FF2B5EF4-FFF2-40B4-BE49-F238E27FC236}">
-                <a16:creationId xmlns:a16="http://schemas.microsoft.com/office/drawing/2014/main" id="{48FBEB34-F974-353C-F986-6F7C897CC38D}"/>
-              </a:ext>
-            </a:extLst>
-          </p:cNvPr>
-          <p:cNvSpPr/>
-          <p:nvPr/>
+          <p:cNvSpPr>
+            <a:spLocks noGrp="1"/>
+          </p:cNvSpPr>
+          <p:nvPr>
+            <p:ph idx="1"/>
+          </p:nvPr>
         </p:nvSpPr>
         <p:spPr>
           <a:xfrm>
-            <a:off x="6347930" y="4064000"/>
-            <a:ext cx="4134339" cy="812800"/>
+            <a:off x="838200" y="1825624"/>
+            <a:ext cx="10515600" cy="5032375"/>
           </a:xfrm>
-          <a:prstGeom prst="rect">
-            <a:avLst/>
-          </a:prstGeom>
-          <a:noFill/>
-          <a:ln w="38100">
-            <a:solidFill>
-              <a:schemeClr val="accent2"/>
-            </a:solidFill>
-            <a:prstDash val="sysDash"/>
-          </a:ln>
         </p:spPr>
-        <p:style>
-          <a:lnRef idx="2">
-            <a:schemeClr val="accent1">
-              <a:shade val="50000"/>
-            </a:schemeClr>
-          </a:lnRef>
-          <a:fillRef idx="1">
-            <a:schemeClr val="accent1"/>
-          </a:fillRef>
-          <a:effectRef idx="0">
-            <a:schemeClr val="accent1"/>
-          </a:effectRef>
-          <a:fontRef idx="minor">
-            <a:schemeClr val="lt1"/>
-          </a:fontRef>
-        </p:style>
         <p:txBody>
-          <a:bodyPr rtlCol="0" anchor="ctr"/>
+          <a:bodyPr>
+            <a:normAutofit/>
+          </a:bodyPr>
           <a:lstStyle/>
           <a:p>
-            <a:pPr algn="ctr"/>
-            <a:endParaRPr lang="en-SG"/>
-          </a:p>
-        </p:txBody>
-      </p:sp>
-      <p:sp>
-        <p:nvSpPr>
-          <p:cNvPr id="9" name="Rectangle 8">
-            <a:extLst>
-              <a:ext uri="{FF2B5EF4-FFF2-40B4-BE49-F238E27FC236}">
-                <a16:creationId xmlns:a16="http://schemas.microsoft.com/office/drawing/2014/main" id="{EA98C24F-C098-48AA-2AEA-65A891013313}"/>
-              </a:ext>
-            </a:extLst>
-          </p:cNvPr>
-          <p:cNvSpPr/>
-          <p:nvPr/>
-        </p:nvSpPr>
-        <p:spPr>
-          <a:xfrm>
-            <a:off x="6347930" y="3493477"/>
-            <a:ext cx="4134339" cy="570523"/>
-          </a:xfrm>
-          <a:prstGeom prst="rect">
-            <a:avLst/>
-          </a:prstGeom>
-          <a:noFill/>
-          <a:ln w="38100">
-            <a:solidFill>
-              <a:schemeClr val="accent2"/>
-            </a:solidFill>
-            <a:prstDash val="sysDash"/>
-          </a:ln>
-        </p:spPr>
-        <p:style>
-          <a:lnRef idx="2">
-            <a:schemeClr val="accent1">
-              <a:shade val="50000"/>
-            </a:schemeClr>
-          </a:lnRef>
-          <a:fillRef idx="1">
-            <a:schemeClr val="accent1"/>
-          </a:fillRef>
-          <a:effectRef idx="0">
-            <a:schemeClr val="accent1"/>
-          </a:effectRef>
-          <a:fontRef idx="minor">
-            <a:schemeClr val="lt1"/>
-          </a:fontRef>
-        </p:style>
-        <p:txBody>
-          <a:bodyPr rtlCol="0" anchor="ctr"/>
-          <a:lstStyle/>
-          <a:p>
-            <a:pPr algn="ctr"/>
-            <a:endParaRPr lang="en-SG"/>
+            <a:pPr marL="0" indent="0">
+              <a:buNone/>
+            </a:pPr>
+            <a:r>
+              <a:rPr lang="en-GB" dirty="0"/>
+              <a:t>The </a:t>
+            </a:r>
+            <a:r>
+              <a:rPr lang="en-GB" b="1" dirty="0" err="1"/>
+              <a:t>autograd</a:t>
+            </a:r>
+            <a:r>
+              <a:rPr lang="en-GB" dirty="0"/>
+              <a:t> is one of the most powerful features of the </a:t>
+            </a:r>
+            <a:r>
+              <a:rPr lang="en-GB" dirty="0" err="1"/>
+              <a:t>PyTorch</a:t>
+            </a:r>
+            <a:r>
+              <a:rPr lang="en-GB" dirty="0"/>
+              <a:t> framework, and why we like it so much for training Neural Networks.</a:t>
+            </a:r>
+          </a:p>
+          <a:p>
+            <a:r>
+              <a:rPr lang="en-GB" b="1" dirty="0"/>
+              <a:t>Thanks to </a:t>
+            </a:r>
+            <a:r>
+              <a:rPr lang="en-GB" b="1" dirty="0" err="1"/>
+              <a:t>autograd</a:t>
+            </a:r>
+            <a:r>
+              <a:rPr lang="en-GB" b="1" dirty="0"/>
+              <a:t>, we do not need to calculate the gradients for any of our future gradient descent rules, manually again! (yay!)</a:t>
+            </a:r>
+          </a:p>
+          <a:p>
+            <a:r>
+              <a:rPr lang="en-GB" dirty="0"/>
+              <a:t>The counterpart however is that all operation must involve tensors and must use </a:t>
+            </a:r>
+            <a:r>
+              <a:rPr lang="en-GB" dirty="0" err="1"/>
+              <a:t>PyTorch</a:t>
+            </a:r>
+            <a:r>
+              <a:rPr lang="en-GB" dirty="0"/>
+              <a:t> functions and methods... (but that is ok).</a:t>
+            </a:r>
+          </a:p>
+          <a:p>
+            <a:r>
+              <a:rPr lang="en-GB" dirty="0"/>
+              <a:t>You do not need to know how it implements the computation of all gradients in the background, but if you are curious, have a look at: </a:t>
+            </a:r>
+            <a:r>
+              <a:rPr lang="en-GB" dirty="0">
+                <a:hlinkClick r:id="rId2"/>
+              </a:rPr>
+              <a:t>https://pytorch.org/blog/computational-graphs-constructed-in-pytorch/</a:t>
+            </a:r>
+            <a:r>
+              <a:rPr lang="en-GB" dirty="0"/>
+              <a:t>.</a:t>
+            </a:r>
+          </a:p>
+          <a:p>
+            <a:endParaRPr lang="en-SG" dirty="0"/>
           </a:p>
         </p:txBody>
       </p:sp>
     </p:spTree>
     <p:extLst>
       <p:ext uri="{BB962C8B-B14F-4D97-AF65-F5344CB8AC3E}">
-        <p14:creationId xmlns:p14="http://schemas.microsoft.com/office/powerpoint/2010/main" val="1879463264"/>
+        <p14:creationId xmlns:p14="http://schemas.microsoft.com/office/powerpoint/2010/main" val="2580175991"/>
       </p:ext>
     </p:extLst>
   </p:cSld>
@@ -10633,7 +10379,7 @@
           <p:cNvPr id="2" name="Title 1">
             <a:extLst>
               <a:ext uri="{FF2B5EF4-FFF2-40B4-BE49-F238E27FC236}">
-                <a16:creationId xmlns:a16="http://schemas.microsoft.com/office/drawing/2014/main" id="{62DF8571-F31A-11B4-26C7-2C202A57B4A3}"/>
+                <a16:creationId xmlns:a16="http://schemas.microsoft.com/office/drawing/2014/main" id="{219F4681-3E05-3370-3E46-11417BFE0CA3}"/>
               </a:ext>
             </a:extLst>
           </p:cNvPr>
@@ -10644,172 +10390,435 @@
             <p:ph type="title"/>
           </p:nvPr>
         </p:nvSpPr>
-        <p:spPr/>
+        <p:spPr>
+          <a:xfrm>
+            <a:off x="508000" y="365125"/>
+            <a:ext cx="10845800" cy="1325563"/>
+          </a:xfrm>
+        </p:spPr>
         <p:txBody>
           <a:bodyPr/>
           <a:lstStyle/>
           <a:p>
             <a:r>
               <a:rPr lang="en-GB" dirty="0"/>
-              <a:t>Rewriting our backpropagation</a:t>
+              <a:t>Intuition for our NN</a:t>
             </a:r>
             <a:endParaRPr lang="en-SG" dirty="0"/>
+          </a:p>
+        </p:txBody>
+      </p:sp>
+      <mc:AlternateContent xmlns:mc="http://schemas.openxmlformats.org/markup-compatibility/2006" xmlns:a14="http://schemas.microsoft.com/office/drawing/2010/main">
+        <mc:Choice Requires="a14">
+          <p:sp>
+            <p:nvSpPr>
+              <p:cNvPr id="5" name="Content Placeholder 4">
+                <a:extLst>
+                  <a:ext uri="{FF2B5EF4-FFF2-40B4-BE49-F238E27FC236}">
+                    <a16:creationId xmlns:a16="http://schemas.microsoft.com/office/drawing/2014/main" id="{1A87BA25-5926-816A-6E16-0F90D4B62FB8}"/>
+                  </a:ext>
+                </a:extLst>
+              </p:cNvPr>
+              <p:cNvSpPr>
+                <a:spLocks noGrp="1"/>
+              </p:cNvSpPr>
+              <p:nvPr>
+                <p:ph idx="1"/>
+              </p:nvPr>
+            </p:nvSpPr>
+            <p:spPr>
+              <a:xfrm>
+                <a:off x="508000" y="1825624"/>
+                <a:ext cx="4726487" cy="5032375"/>
+              </a:xfrm>
+            </p:spPr>
+            <p:txBody>
+              <a:bodyPr>
+                <a:normAutofit lnSpcReduction="10000"/>
+              </a:bodyPr>
+              <a:lstStyle/>
+              <a:p>
+                <a:pPr marL="0" indent="0">
+                  <a:buNone/>
+                </a:pPr>
+                <a:r>
+                  <a:rPr lang="en-GB" dirty="0"/>
+                  <a:t>Recall Week 2 Notebook 8, our three-layers model.</a:t>
+                </a:r>
+              </a:p>
+              <a:p>
+                <a:r>
+                  <a:rPr lang="en-GB" dirty="0"/>
+                  <a:t>We can </a:t>
+                </a:r>
+                <a:r>
+                  <a:rPr lang="en-GB" b="1" dirty="0"/>
+                  <a:t>recognize</a:t>
+                </a:r>
+                <a:r>
+                  <a:rPr lang="en-GB" dirty="0"/>
+                  <a:t> </a:t>
+                </a:r>
+                <a:r>
+                  <a:rPr lang="en-GB" b="1" dirty="0"/>
+                  <a:t>patterns</a:t>
+                </a:r>
+                <a:r>
+                  <a:rPr lang="en-GB" dirty="0"/>
+                  <a:t> in the way to calculate derivatives and gradient descent update rules.</a:t>
+                </a:r>
+              </a:p>
+              <a:p>
+                <a:r>
+                  <a:rPr lang="en-GB" b="1" dirty="0"/>
+                  <a:t>Hints that there should be a way to automate differentiation!</a:t>
+                </a:r>
+                <a:endParaRPr lang="en-GB" b="1" dirty="0">
+                  <a:solidFill>
+                    <a:srgbClr val="7030A0"/>
+                  </a:solidFill>
+                </a:endParaRPr>
+              </a:p>
+              <a:p>
+                <a:pPr marL="0" indent="0">
+                  <a:buNone/>
+                </a:pPr>
+                <a:r>
+                  <a:rPr lang="en-GB" b="1" dirty="0">
+                    <a:solidFill>
+                      <a:srgbClr val="7030A0"/>
+                    </a:solidFill>
+                  </a:rPr>
+                  <a:t>Practice: </a:t>
+                </a:r>
+                <a:r>
+                  <a:rPr lang="en-GB" dirty="0">
+                    <a:solidFill>
+                      <a:srgbClr val="7030A0"/>
+                    </a:solidFill>
+                  </a:rPr>
+                  <a:t>automate the gradient descent rule process for any number </a:t>
+                </a:r>
+                <a14:m>
+                  <m:oMath xmlns:m="http://schemas.openxmlformats.org/officeDocument/2006/math">
+                    <m:r>
+                      <a:rPr lang="en-GB" i="1" dirty="0" smtClean="0">
+                        <a:solidFill>
+                          <a:srgbClr val="7030A0"/>
+                        </a:solidFill>
+                        <a:latin typeface="Cambria Math" panose="02040503050406030204" pitchFamily="18" charset="0"/>
+                      </a:rPr>
+                      <m:t>𝑁</m:t>
+                    </m:r>
+                  </m:oMath>
+                </a14:m>
+                <a:r>
+                  <a:rPr lang="en-GB" dirty="0">
+                    <a:solidFill>
+                      <a:srgbClr val="7030A0"/>
+                    </a:solidFill>
+                  </a:rPr>
+                  <a:t> of layers?</a:t>
+                </a:r>
+                <a:endParaRPr lang="en-SG" dirty="0">
+                  <a:solidFill>
+                    <a:srgbClr val="7030A0"/>
+                  </a:solidFill>
+                </a:endParaRPr>
+              </a:p>
+            </p:txBody>
+          </p:sp>
+        </mc:Choice>
+        <mc:Fallback xmlns="">
+          <p:sp>
+            <p:nvSpPr>
+              <p:cNvPr id="5" name="Content Placeholder 4">
+                <a:extLst>
+                  <a:ext uri="{FF2B5EF4-FFF2-40B4-BE49-F238E27FC236}">
+                    <a16:creationId xmlns:a16="http://schemas.microsoft.com/office/drawing/2014/main" id="{1A87BA25-5926-816A-6E16-0F90D4B62FB8}"/>
+                  </a:ext>
+                </a:extLst>
+              </p:cNvPr>
+              <p:cNvSpPr>
+                <a:spLocks noGrp="1" noRot="1" noChangeAspect="1" noMove="1" noResize="1" noEditPoints="1" noAdjustHandles="1" noChangeArrowheads="1" noChangeShapeType="1" noTextEdit="1"/>
+              </p:cNvSpPr>
+              <p:nvPr>
+                <p:ph idx="1"/>
+              </p:nvPr>
+            </p:nvSpPr>
+            <p:spPr>
+              <a:xfrm>
+                <a:off x="508000" y="1825624"/>
+                <a:ext cx="4726487" cy="5032375"/>
+              </a:xfrm>
+              <a:blipFill>
+                <a:blip r:embed="rId2"/>
+                <a:stretch>
+                  <a:fillRect l="-2577" t="-2663" r="-2320"/>
+                </a:stretch>
+              </a:blipFill>
+            </p:spPr>
+            <p:txBody>
+              <a:bodyPr/>
+              <a:lstStyle/>
+              <a:p>
+                <a:r>
+                  <a:rPr lang="en-GB">
+                    <a:noFill/>
+                  </a:rPr>
+                  <a:t> </a:t>
+                </a:r>
+              </a:p>
+            </p:txBody>
+          </p:sp>
+        </mc:Fallback>
+      </mc:AlternateContent>
+      <p:pic>
+        <p:nvPicPr>
+          <p:cNvPr id="4" name="Picture 3">
+            <a:extLst>
+              <a:ext uri="{FF2B5EF4-FFF2-40B4-BE49-F238E27FC236}">
+                <a16:creationId xmlns:a16="http://schemas.microsoft.com/office/drawing/2014/main" id="{11D096F0-0255-2417-C5F6-A8EFB107AF87}"/>
+              </a:ext>
+            </a:extLst>
+          </p:cNvPr>
+          <p:cNvPicPr>
+            <a:picLocks noChangeAspect="1"/>
+          </p:cNvPicPr>
+          <p:nvPr/>
+        </p:nvPicPr>
+        <p:blipFill>
+          <a:blip r:embed="rId3"/>
+          <a:stretch>
+            <a:fillRect/>
+          </a:stretch>
+        </p:blipFill>
+        <p:spPr>
+          <a:xfrm>
+            <a:off x="5234489" y="577024"/>
+            <a:ext cx="6916115" cy="5915851"/>
+          </a:xfrm>
+          <a:prstGeom prst="rect">
+            <a:avLst/>
+          </a:prstGeom>
+        </p:spPr>
+      </p:pic>
+      <p:sp>
+        <p:nvSpPr>
+          <p:cNvPr id="6" name="Rectangle 5">
+            <a:extLst>
+              <a:ext uri="{FF2B5EF4-FFF2-40B4-BE49-F238E27FC236}">
+                <a16:creationId xmlns:a16="http://schemas.microsoft.com/office/drawing/2014/main" id="{B71B8432-2941-E985-296B-548380048287}"/>
+              </a:ext>
+            </a:extLst>
+          </p:cNvPr>
+          <p:cNvSpPr/>
+          <p:nvPr/>
+        </p:nvSpPr>
+        <p:spPr>
+          <a:xfrm>
+            <a:off x="6347930" y="5830278"/>
+            <a:ext cx="5802673" cy="662598"/>
+          </a:xfrm>
+          <a:prstGeom prst="rect">
+            <a:avLst/>
+          </a:prstGeom>
+          <a:noFill/>
+          <a:ln w="38100">
+            <a:solidFill>
+              <a:schemeClr val="accent2"/>
+            </a:solidFill>
+            <a:prstDash val="sysDash"/>
+          </a:ln>
+        </p:spPr>
+        <p:style>
+          <a:lnRef idx="2">
+            <a:schemeClr val="accent1">
+              <a:shade val="50000"/>
+            </a:schemeClr>
+          </a:lnRef>
+          <a:fillRef idx="1">
+            <a:schemeClr val="accent1"/>
+          </a:fillRef>
+          <a:effectRef idx="0">
+            <a:schemeClr val="accent1"/>
+          </a:effectRef>
+          <a:fontRef idx="minor">
+            <a:schemeClr val="lt1"/>
+          </a:fontRef>
+        </p:style>
+        <p:txBody>
+          <a:bodyPr rtlCol="0" anchor="ctr"/>
+          <a:lstStyle/>
+          <a:p>
+            <a:pPr algn="ctr"/>
+            <a:endParaRPr lang="en-SG"/>
           </a:p>
         </p:txBody>
       </p:sp>
       <p:sp>
         <p:nvSpPr>
-          <p:cNvPr id="3" name="Content Placeholder 2">
+          <p:cNvPr id="7" name="Rectangle 6">
             <a:extLst>
               <a:ext uri="{FF2B5EF4-FFF2-40B4-BE49-F238E27FC236}">
-                <a16:creationId xmlns:a16="http://schemas.microsoft.com/office/drawing/2014/main" id="{6C4142A3-3578-C842-742A-3495AD72B776}"/>
+                <a16:creationId xmlns:a16="http://schemas.microsoft.com/office/drawing/2014/main" id="{6F218B3D-3CEC-F710-D995-1AFFD1565B4A}"/>
               </a:ext>
             </a:extLst>
           </p:cNvPr>
-          <p:cNvSpPr>
-            <a:spLocks noGrp="1"/>
-          </p:cNvSpPr>
-          <p:nvPr>
-            <p:ph idx="1"/>
-          </p:nvPr>
+          <p:cNvSpPr/>
+          <p:nvPr/>
+        </p:nvSpPr>
+        <p:spPr>
+          <a:xfrm flipV="1">
+            <a:off x="6347930" y="5212862"/>
+            <a:ext cx="5802673" cy="617416"/>
+          </a:xfrm>
+          <a:prstGeom prst="rect">
+            <a:avLst/>
+          </a:prstGeom>
+          <a:noFill/>
+          <a:ln w="38100">
+            <a:solidFill>
+              <a:schemeClr val="accent2"/>
+            </a:solidFill>
+            <a:prstDash val="sysDash"/>
+          </a:ln>
+        </p:spPr>
+        <p:style>
+          <a:lnRef idx="2">
+            <a:schemeClr val="accent1">
+              <a:shade val="50000"/>
+            </a:schemeClr>
+          </a:lnRef>
+          <a:fillRef idx="1">
+            <a:schemeClr val="accent1"/>
+          </a:fillRef>
+          <a:effectRef idx="0">
+            <a:schemeClr val="accent1"/>
+          </a:effectRef>
+          <a:fontRef idx="minor">
+            <a:schemeClr val="lt1"/>
+          </a:fontRef>
+        </p:style>
+        <p:txBody>
+          <a:bodyPr rtlCol="0" anchor="ctr"/>
+          <a:lstStyle/>
+          <a:p>
+            <a:pPr algn="ctr"/>
+            <a:endParaRPr lang="en-SG"/>
+          </a:p>
+        </p:txBody>
+      </p:sp>
+      <p:sp>
+        <p:nvSpPr>
+          <p:cNvPr id="8" name="Rectangle 7">
+            <a:extLst>
+              <a:ext uri="{FF2B5EF4-FFF2-40B4-BE49-F238E27FC236}">
+                <a16:creationId xmlns:a16="http://schemas.microsoft.com/office/drawing/2014/main" id="{48FBEB34-F974-353C-F986-6F7C897CC38D}"/>
+              </a:ext>
+            </a:extLst>
+          </p:cNvPr>
+          <p:cNvSpPr/>
+          <p:nvPr/>
         </p:nvSpPr>
         <p:spPr>
           <a:xfrm>
-            <a:off x="838200" y="1825624"/>
-            <a:ext cx="10515600" cy="5032375"/>
+            <a:off x="6347930" y="4064000"/>
+            <a:ext cx="4134339" cy="812800"/>
           </a:xfrm>
+          <a:prstGeom prst="rect">
+            <a:avLst/>
+          </a:prstGeom>
+          <a:noFill/>
+          <a:ln w="38100">
+            <a:solidFill>
+              <a:schemeClr val="accent2"/>
+            </a:solidFill>
+            <a:prstDash val="sysDash"/>
+          </a:ln>
         </p:spPr>
+        <p:style>
+          <a:lnRef idx="2">
+            <a:schemeClr val="accent1">
+              <a:shade val="50000"/>
+            </a:schemeClr>
+          </a:lnRef>
+          <a:fillRef idx="1">
+            <a:schemeClr val="accent1"/>
+          </a:fillRef>
+          <a:effectRef idx="0">
+            <a:schemeClr val="accent1"/>
+          </a:effectRef>
+          <a:fontRef idx="minor">
+            <a:schemeClr val="lt1"/>
+          </a:fontRef>
+        </p:style>
         <p:txBody>
-          <a:bodyPr>
-            <a:normAutofit/>
-          </a:bodyPr>
+          <a:bodyPr rtlCol="0" anchor="ctr"/>
           <a:lstStyle/>
           <a:p>
-            <a:pPr marL="0" indent="0">
-              <a:buNone/>
-            </a:pPr>
-            <a:r>
-              <a:rPr lang="en-GB" dirty="0"/>
-              <a:t>In order to train our Neural Network using backprop, we rely on </a:t>
-            </a:r>
-            <a:r>
-              <a:rPr lang="en-GB" dirty="0" err="1"/>
-              <a:t>autograd</a:t>
-            </a:r>
-            <a:r>
-              <a:rPr lang="en-GB" dirty="0"/>
-              <a:t> to compute the gradient updates for us automatically.</a:t>
-            </a:r>
-          </a:p>
-          <a:p>
-            <a:pPr marL="0" indent="0">
-              <a:buNone/>
-            </a:pPr>
-            <a:r>
-              <a:rPr lang="en-GB" dirty="0"/>
-              <a:t>For this reason,</a:t>
-            </a:r>
-          </a:p>
-          <a:p>
-            <a:r>
-              <a:rPr lang="en-GB" dirty="0"/>
-              <a:t>There is no need for a </a:t>
-            </a:r>
-            <a:r>
-              <a:rPr lang="en-GB" b="1" dirty="0"/>
-              <a:t>backward() </a:t>
-            </a:r>
-            <a:r>
-              <a:rPr lang="en-GB" dirty="0"/>
-              <a:t>method as before to compute gradients and gradient descent update rules (built-in method for </a:t>
-            </a:r>
-            <a:r>
-              <a:rPr lang="en-GB" dirty="0" err="1"/>
-              <a:t>nn.Module</a:t>
-            </a:r>
-            <a:r>
-              <a:rPr lang="en-GB" dirty="0"/>
-              <a:t> classes, covered automatically by </a:t>
-            </a:r>
-            <a:r>
-              <a:rPr lang="en-GB" dirty="0" err="1"/>
-              <a:t>PyTorch</a:t>
-            </a:r>
-            <a:r>
-              <a:rPr lang="en-GB" dirty="0"/>
-              <a:t> </a:t>
-            </a:r>
-            <a:r>
-              <a:rPr lang="en-GB" dirty="0" err="1"/>
-              <a:t>autograd</a:t>
-            </a:r>
-            <a:r>
-              <a:rPr lang="en-GB" dirty="0"/>
-              <a:t>, yay!).</a:t>
-            </a:r>
-          </a:p>
-          <a:p>
-            <a:r>
-              <a:rPr lang="en-GB" dirty="0"/>
-              <a:t>Our </a:t>
-            </a:r>
-            <a:r>
-              <a:rPr lang="en-GB" b="1" dirty="0"/>
-              <a:t>train() </a:t>
-            </a:r>
-            <a:r>
-              <a:rPr lang="en-GB" dirty="0"/>
-              <a:t>method will now consist of several iterations of</a:t>
-            </a:r>
-          </a:p>
-          <a:p>
-            <a:pPr lvl="1"/>
-            <a:r>
-              <a:rPr lang="en-GB" sz="2800" b="1" dirty="0"/>
-              <a:t>forward()</a:t>
-            </a:r>
-            <a:r>
-              <a:rPr lang="en-GB" sz="2800" dirty="0"/>
-              <a:t> pass and loss calculation,</a:t>
-            </a:r>
-          </a:p>
-          <a:p>
-            <a:pPr lvl="1"/>
-            <a:r>
-              <a:rPr lang="en-GB" sz="2800" dirty="0"/>
-              <a:t>gradient computation with the </a:t>
-            </a:r>
-            <a:r>
-              <a:rPr lang="en-GB" sz="2800" b="1" dirty="0"/>
-              <a:t>backward() </a:t>
-            </a:r>
-            <a:r>
-              <a:rPr lang="en-GB" sz="2800" dirty="0"/>
-              <a:t>method, used on loss,</a:t>
-            </a:r>
-          </a:p>
-          <a:p>
-            <a:pPr lvl="1"/>
-            <a:r>
-              <a:rPr lang="en-GB" sz="2800" dirty="0"/>
-              <a:t>and </a:t>
-            </a:r>
-            <a:r>
-              <a:rPr lang="en-GB" sz="2800" b="1" dirty="0"/>
-              <a:t>gradient descent updates </a:t>
-            </a:r>
-            <a:r>
-              <a:rPr lang="en-GB" sz="2800" dirty="0"/>
-              <a:t>on trainable parameters.</a:t>
-            </a:r>
-            <a:endParaRPr lang="en-SG" sz="2800" dirty="0"/>
+            <a:pPr algn="ctr"/>
+            <a:endParaRPr lang="en-SG"/>
+          </a:p>
+        </p:txBody>
+      </p:sp>
+      <p:sp>
+        <p:nvSpPr>
+          <p:cNvPr id="9" name="Rectangle 8">
+            <a:extLst>
+              <a:ext uri="{FF2B5EF4-FFF2-40B4-BE49-F238E27FC236}">
+                <a16:creationId xmlns:a16="http://schemas.microsoft.com/office/drawing/2014/main" id="{EA98C24F-C098-48AA-2AEA-65A891013313}"/>
+              </a:ext>
+            </a:extLst>
+          </p:cNvPr>
+          <p:cNvSpPr/>
+          <p:nvPr/>
+        </p:nvSpPr>
+        <p:spPr>
+          <a:xfrm>
+            <a:off x="6347930" y="3493477"/>
+            <a:ext cx="4134339" cy="570523"/>
+          </a:xfrm>
+          <a:prstGeom prst="rect">
+            <a:avLst/>
+          </a:prstGeom>
+          <a:noFill/>
+          <a:ln w="38100">
+            <a:solidFill>
+              <a:schemeClr val="accent2"/>
+            </a:solidFill>
+            <a:prstDash val="sysDash"/>
+          </a:ln>
+        </p:spPr>
+        <p:style>
+          <a:lnRef idx="2">
+            <a:schemeClr val="accent1">
+              <a:shade val="50000"/>
+            </a:schemeClr>
+          </a:lnRef>
+          <a:fillRef idx="1">
+            <a:schemeClr val="accent1"/>
+          </a:fillRef>
+          <a:effectRef idx="0">
+            <a:schemeClr val="accent1"/>
+          </a:effectRef>
+          <a:fontRef idx="minor">
+            <a:schemeClr val="lt1"/>
+          </a:fontRef>
+        </p:style>
+        <p:txBody>
+          <a:bodyPr rtlCol="0" anchor="ctr"/>
+          <a:lstStyle/>
+          <a:p>
+            <a:pPr algn="ctr"/>
+            <a:endParaRPr lang="en-SG"/>
           </a:p>
         </p:txBody>
       </p:sp>
     </p:spTree>
     <p:extLst>
       <p:ext uri="{BB962C8B-B14F-4D97-AF65-F5344CB8AC3E}">
-        <p14:creationId xmlns:p14="http://schemas.microsoft.com/office/powerpoint/2010/main" val="481628505"/>
+        <p14:creationId xmlns:p14="http://schemas.microsoft.com/office/powerpoint/2010/main" val="1879463264"/>
       </p:ext>
     </p:extLst>
   </p:cSld>
@@ -10859,6 +10868,214 @@
           <a:p>
             <a:r>
               <a:rPr lang="en-GB" dirty="0"/>
+              <a:t>Rewriting our backpropagation</a:t>
+            </a:r>
+            <a:endParaRPr lang="en-SG" dirty="0"/>
+          </a:p>
+        </p:txBody>
+      </p:sp>
+      <p:sp>
+        <p:nvSpPr>
+          <p:cNvPr id="3" name="Content Placeholder 2">
+            <a:extLst>
+              <a:ext uri="{FF2B5EF4-FFF2-40B4-BE49-F238E27FC236}">
+                <a16:creationId xmlns:a16="http://schemas.microsoft.com/office/drawing/2014/main" id="{6C4142A3-3578-C842-742A-3495AD72B776}"/>
+              </a:ext>
+            </a:extLst>
+          </p:cNvPr>
+          <p:cNvSpPr>
+            <a:spLocks noGrp="1"/>
+          </p:cNvSpPr>
+          <p:nvPr>
+            <p:ph idx="1"/>
+          </p:nvPr>
+        </p:nvSpPr>
+        <p:spPr>
+          <a:xfrm>
+            <a:off x="838200" y="1825624"/>
+            <a:ext cx="10515600" cy="5032375"/>
+          </a:xfrm>
+        </p:spPr>
+        <p:txBody>
+          <a:bodyPr>
+            <a:normAutofit/>
+          </a:bodyPr>
+          <a:lstStyle/>
+          <a:p>
+            <a:pPr marL="0" indent="0">
+              <a:buNone/>
+            </a:pPr>
+            <a:r>
+              <a:rPr lang="en-GB" dirty="0"/>
+              <a:t>In order to train our Neural Network using backprop, we rely on </a:t>
+            </a:r>
+            <a:r>
+              <a:rPr lang="en-GB" dirty="0" err="1"/>
+              <a:t>autograd</a:t>
+            </a:r>
+            <a:r>
+              <a:rPr lang="en-GB" dirty="0"/>
+              <a:t> to compute the gradient updates for us automatically.</a:t>
+            </a:r>
+          </a:p>
+          <a:p>
+            <a:pPr marL="0" indent="0">
+              <a:buNone/>
+            </a:pPr>
+            <a:r>
+              <a:rPr lang="en-GB" dirty="0"/>
+              <a:t>For this reason,</a:t>
+            </a:r>
+          </a:p>
+          <a:p>
+            <a:r>
+              <a:rPr lang="en-GB" dirty="0"/>
+              <a:t>There is no need for a </a:t>
+            </a:r>
+            <a:r>
+              <a:rPr lang="en-GB" b="1" dirty="0"/>
+              <a:t>backward() </a:t>
+            </a:r>
+            <a:r>
+              <a:rPr lang="en-GB" dirty="0"/>
+              <a:t>method as before to compute gradients and gradient descent update rules (built-in method for </a:t>
+            </a:r>
+            <a:r>
+              <a:rPr lang="en-GB" dirty="0" err="1"/>
+              <a:t>nn.Module</a:t>
+            </a:r>
+            <a:r>
+              <a:rPr lang="en-GB" dirty="0"/>
+              <a:t> classes, covered automatically by </a:t>
+            </a:r>
+            <a:r>
+              <a:rPr lang="en-GB" dirty="0" err="1"/>
+              <a:t>PyTorch</a:t>
+            </a:r>
+            <a:r>
+              <a:rPr lang="en-GB" dirty="0"/>
+              <a:t> </a:t>
+            </a:r>
+            <a:r>
+              <a:rPr lang="en-GB" dirty="0" err="1"/>
+              <a:t>autograd</a:t>
+            </a:r>
+            <a:r>
+              <a:rPr lang="en-GB" dirty="0"/>
+              <a:t>, yay!).</a:t>
+            </a:r>
+          </a:p>
+          <a:p>
+            <a:r>
+              <a:rPr lang="en-GB" dirty="0"/>
+              <a:t>Our </a:t>
+            </a:r>
+            <a:r>
+              <a:rPr lang="en-GB" b="1" dirty="0"/>
+              <a:t>train() </a:t>
+            </a:r>
+            <a:r>
+              <a:rPr lang="en-GB" dirty="0"/>
+              <a:t>method will now consist of several iterations of</a:t>
+            </a:r>
+          </a:p>
+          <a:p>
+            <a:pPr lvl="1"/>
+            <a:r>
+              <a:rPr lang="en-GB" sz="2800" b="1" dirty="0"/>
+              <a:t>forward()</a:t>
+            </a:r>
+            <a:r>
+              <a:rPr lang="en-GB" sz="2800" dirty="0"/>
+              <a:t> pass and loss calculation,</a:t>
+            </a:r>
+          </a:p>
+          <a:p>
+            <a:pPr lvl="1"/>
+            <a:r>
+              <a:rPr lang="en-GB" sz="2800" dirty="0"/>
+              <a:t>gradient computation with the </a:t>
+            </a:r>
+            <a:r>
+              <a:rPr lang="en-GB" sz="2800" b="1" dirty="0"/>
+              <a:t>backward() </a:t>
+            </a:r>
+            <a:r>
+              <a:rPr lang="en-GB" sz="2800" dirty="0"/>
+              <a:t>method, used on loss,</a:t>
+            </a:r>
+          </a:p>
+          <a:p>
+            <a:pPr lvl="1"/>
+            <a:r>
+              <a:rPr lang="en-GB" sz="2800" dirty="0"/>
+              <a:t>and </a:t>
+            </a:r>
+            <a:r>
+              <a:rPr lang="en-GB" sz="2800" b="1" dirty="0"/>
+              <a:t>gradient descent updates </a:t>
+            </a:r>
+            <a:r>
+              <a:rPr lang="en-GB" sz="2800" dirty="0"/>
+              <a:t>on trainable parameters.</a:t>
+            </a:r>
+            <a:endParaRPr lang="en-SG" sz="2800" dirty="0"/>
+          </a:p>
+        </p:txBody>
+      </p:sp>
+    </p:spTree>
+    <p:extLst>
+      <p:ext uri="{BB962C8B-B14F-4D97-AF65-F5344CB8AC3E}">
+        <p14:creationId xmlns:p14="http://schemas.microsoft.com/office/powerpoint/2010/main" val="481628505"/>
+      </p:ext>
+    </p:extLst>
+  </p:cSld>
+  <p:clrMapOvr>
+    <a:masterClrMapping/>
+  </p:clrMapOvr>
+</p:sld>
+</file>
+
+<file path=ppt/slides/slide15.xml><?xml version="1.0" encoding="utf-8"?>
+<p:sld xmlns:a="http://schemas.openxmlformats.org/drawingml/2006/main" xmlns:r="http://schemas.openxmlformats.org/officeDocument/2006/relationships" xmlns:p="http://schemas.openxmlformats.org/presentationml/2006/main">
+  <p:cSld>
+    <p:spTree>
+      <p:nvGrpSpPr>
+        <p:cNvPr id="1" name=""/>
+        <p:cNvGrpSpPr/>
+        <p:nvPr/>
+      </p:nvGrpSpPr>
+      <p:grpSpPr>
+        <a:xfrm>
+          <a:off x="0" y="0"/>
+          <a:ext cx="0" cy="0"/>
+          <a:chOff x="0" y="0"/>
+          <a:chExt cx="0" cy="0"/>
+        </a:xfrm>
+      </p:grpSpPr>
+      <p:sp>
+        <p:nvSpPr>
+          <p:cNvPr id="2" name="Title 1">
+            <a:extLst>
+              <a:ext uri="{FF2B5EF4-FFF2-40B4-BE49-F238E27FC236}">
+                <a16:creationId xmlns:a16="http://schemas.microsoft.com/office/drawing/2014/main" id="{62DF8571-F31A-11B4-26C7-2C202A57B4A3}"/>
+              </a:ext>
+            </a:extLst>
+          </p:cNvPr>
+          <p:cNvSpPr>
+            <a:spLocks noGrp="1"/>
+          </p:cNvSpPr>
+          <p:nvPr>
+            <p:ph type="title"/>
+          </p:nvPr>
+        </p:nvSpPr>
+        <p:spPr/>
+        <p:txBody>
+          <a:bodyPr/>
+          <a:lstStyle/>
+          <a:p>
+            <a:r>
+              <a:rPr lang="en-GB" dirty="0"/>
               <a:t>Backpropagation</a:t>
             </a:r>
             <a:endParaRPr lang="en-SG" dirty="0"/>
@@ -10993,7 +11210,7 @@
 </p:sld>
 </file>
 
-<file path=ppt/slides/slide15.xml><?xml version="1.0" encoding="utf-8"?>
+<file path=ppt/slides/slide16.xml><?xml version="1.0" encoding="utf-8"?>
 <p:sld xmlns:a="http://schemas.openxmlformats.org/drawingml/2006/main" xmlns:r="http://schemas.openxmlformats.org/officeDocument/2006/relationships" xmlns:p="http://schemas.openxmlformats.org/presentationml/2006/main">
   <p:cSld>
     <p:spTree>
@@ -11229,7 +11446,7 @@
 </p:sld>
 </file>
 
-<file path=ppt/slides/slide16.xml><?xml version="1.0" encoding="utf-8"?>
+<file path=ppt/slides/slide17.xml><?xml version="1.0" encoding="utf-8"?>
 <p:sld xmlns:a="http://schemas.openxmlformats.org/drawingml/2006/main" xmlns:r="http://schemas.openxmlformats.org/officeDocument/2006/relationships" xmlns:p="http://schemas.openxmlformats.org/presentationml/2006/main">
   <p:cSld>
     <p:spTree>
@@ -11453,98 +11670,6 @@
 </p:sld>
 </file>
 
-<file path=ppt/slides/slide17.xml><?xml version="1.0" encoding="utf-8"?>
-<p:sld xmlns:a="http://schemas.openxmlformats.org/drawingml/2006/main" xmlns:r="http://schemas.openxmlformats.org/officeDocument/2006/relationships" xmlns:p="http://schemas.openxmlformats.org/presentationml/2006/main">
-  <p:cSld>
-    <p:spTree>
-      <p:nvGrpSpPr>
-        <p:cNvPr id="1" name=""/>
-        <p:cNvGrpSpPr/>
-        <p:nvPr/>
-      </p:nvGrpSpPr>
-      <p:grpSpPr>
-        <a:xfrm>
-          <a:off x="0" y="0"/>
-          <a:ext cx="0" cy="0"/>
-          <a:chOff x="0" y="0"/>
-          <a:chExt cx="0" cy="0"/>
-        </a:xfrm>
-      </p:grpSpPr>
-      <p:sp>
-        <p:nvSpPr>
-          <p:cNvPr id="2" name="Title 1">
-            <a:extLst>
-              <a:ext uri="{FF2B5EF4-FFF2-40B4-BE49-F238E27FC236}">
-                <a16:creationId xmlns:a16="http://schemas.microsoft.com/office/drawing/2014/main" id="{C902DDAE-7B18-E047-726C-A4619D106A2D}"/>
-              </a:ext>
-            </a:extLst>
-          </p:cNvPr>
-          <p:cNvSpPr>
-            <a:spLocks noGrp="1"/>
-          </p:cNvSpPr>
-          <p:nvPr>
-            <p:ph type="title"/>
-          </p:nvPr>
-        </p:nvSpPr>
-        <p:spPr/>
-        <p:txBody>
-          <a:bodyPr/>
-          <a:lstStyle/>
-          <a:p>
-            <a:r>
-              <a:rPr lang="en-GB" dirty="0"/>
-              <a:t>Trying our trainer function… Works!</a:t>
-            </a:r>
-            <a:br>
-              <a:rPr lang="en-GB" dirty="0"/>
-            </a:br>
-            <a:endParaRPr lang="en-SG" dirty="0"/>
-          </a:p>
-        </p:txBody>
-      </p:sp>
-      <p:pic>
-        <p:nvPicPr>
-          <p:cNvPr id="5" name="Picture 4">
-            <a:extLst>
-              <a:ext uri="{FF2B5EF4-FFF2-40B4-BE49-F238E27FC236}">
-                <a16:creationId xmlns:a16="http://schemas.microsoft.com/office/drawing/2014/main" id="{4A8B1291-A554-8B80-6FA0-9146AA644C29}"/>
-              </a:ext>
-            </a:extLst>
-          </p:cNvPr>
-          <p:cNvPicPr>
-            <a:picLocks noChangeAspect="1"/>
-          </p:cNvPicPr>
-          <p:nvPr/>
-        </p:nvPicPr>
-        <p:blipFill>
-          <a:blip r:embed="rId2"/>
-          <a:stretch>
-            <a:fillRect/>
-          </a:stretch>
-        </p:blipFill>
-        <p:spPr>
-          <a:xfrm>
-            <a:off x="2272294" y="1402086"/>
-            <a:ext cx="7647411" cy="5455914"/>
-          </a:xfrm>
-          <a:prstGeom prst="rect">
-            <a:avLst/>
-          </a:prstGeom>
-        </p:spPr>
-      </p:pic>
-    </p:spTree>
-    <p:extLst>
-      <p:ext uri="{BB962C8B-B14F-4D97-AF65-F5344CB8AC3E}">
-        <p14:creationId xmlns:p14="http://schemas.microsoft.com/office/powerpoint/2010/main" val="2128707751"/>
-      </p:ext>
-    </p:extLst>
-  </p:cSld>
-  <p:clrMapOvr>
-    <a:masterClrMapping/>
-  </p:clrMapOvr>
-</p:sld>
-</file>
-
 <file path=ppt/slides/slide18.xml><?xml version="1.0" encoding="utf-8"?>
 <p:sld xmlns:a="http://schemas.openxmlformats.org/drawingml/2006/main" xmlns:r="http://schemas.openxmlformats.org/officeDocument/2006/relationships" xmlns:p="http://schemas.openxmlformats.org/presentationml/2006/main">
   <p:cSld>
@@ -11596,10 +11721,10 @@
       </p:sp>
       <p:pic>
         <p:nvPicPr>
-          <p:cNvPr id="4" name="Picture 3">
+          <p:cNvPr id="5" name="Picture 4">
             <a:extLst>
               <a:ext uri="{FF2B5EF4-FFF2-40B4-BE49-F238E27FC236}">
-                <a16:creationId xmlns:a16="http://schemas.microsoft.com/office/drawing/2014/main" id="{DB513CD6-1CBE-A3B1-1E6F-41F285705A04}"/>
+                <a16:creationId xmlns:a16="http://schemas.microsoft.com/office/drawing/2014/main" id="{4A8B1291-A554-8B80-6FA0-9146AA644C29}"/>
               </a:ext>
             </a:extLst>
           </p:cNvPr>
@@ -11616,8 +11741,8 @@
         </p:blipFill>
         <p:spPr>
           <a:xfrm>
-            <a:off x="1799283" y="1410982"/>
-            <a:ext cx="8593433" cy="5447018"/>
+            <a:off x="2272294" y="1402086"/>
+            <a:ext cx="7647411" cy="5455914"/>
           </a:xfrm>
           <a:prstGeom prst="rect">
             <a:avLst/>
@@ -11627,7 +11752,7 @@
     </p:spTree>
     <p:extLst>
       <p:ext uri="{BB962C8B-B14F-4D97-AF65-F5344CB8AC3E}">
-        <p14:creationId xmlns:p14="http://schemas.microsoft.com/office/powerpoint/2010/main" val="581091786"/>
+        <p14:creationId xmlns:p14="http://schemas.microsoft.com/office/powerpoint/2010/main" val="2128707751"/>
       </p:ext>
     </p:extLst>
   </p:cSld>
@@ -11688,10 +11813,10 @@
       </p:sp>
       <p:pic>
         <p:nvPicPr>
-          <p:cNvPr id="5" name="Picture 4">
+          <p:cNvPr id="4" name="Picture 3">
             <a:extLst>
               <a:ext uri="{FF2B5EF4-FFF2-40B4-BE49-F238E27FC236}">
-                <a16:creationId xmlns:a16="http://schemas.microsoft.com/office/drawing/2014/main" id="{0B55E7AB-B38B-DC28-57B5-D4F3CA5543A9}"/>
+                <a16:creationId xmlns:a16="http://schemas.microsoft.com/office/drawing/2014/main" id="{DB513CD6-1CBE-A3B1-1E6F-41F285705A04}"/>
               </a:ext>
             </a:extLst>
           </p:cNvPr>
@@ -11708,8 +11833,8 @@
         </p:blipFill>
         <p:spPr>
           <a:xfrm>
-            <a:off x="2123542" y="1473715"/>
-            <a:ext cx="7944915" cy="5384285"/>
+            <a:off x="1799283" y="1410982"/>
+            <a:ext cx="8593433" cy="5447018"/>
           </a:xfrm>
           <a:prstGeom prst="rect">
             <a:avLst/>
@@ -11719,7 +11844,7 @@
     </p:spTree>
     <p:extLst>
       <p:ext uri="{BB962C8B-B14F-4D97-AF65-F5344CB8AC3E}">
-        <p14:creationId xmlns:p14="http://schemas.microsoft.com/office/powerpoint/2010/main" val="2768410648"/>
+        <p14:creationId xmlns:p14="http://schemas.microsoft.com/office/powerpoint/2010/main" val="581091786"/>
       </p:ext>
     </p:extLst>
   </p:cSld>
@@ -11806,31 +11931,73 @@
               <a:buAutoNum type="arabicPeriod"/>
             </a:pPr>
             <a:r>
-              <a:rPr lang="en-GB" dirty="0"/>
+              <a:rPr lang="en-GB" dirty="0">
+                <a:solidFill>
+                  <a:schemeClr val="bg1">
+                    <a:lumMod val="65000"/>
+                  </a:schemeClr>
+                </a:solidFill>
+              </a:rPr>
               <a:t>What is the </a:t>
             </a:r>
             <a:r>
-              <a:rPr lang="en-GB" b="1" dirty="0" err="1"/>
+              <a:rPr lang="en-GB" b="1" dirty="0" err="1">
+                <a:solidFill>
+                  <a:schemeClr val="bg1">
+                    <a:lumMod val="65000"/>
+                  </a:schemeClr>
+                </a:solidFill>
+              </a:rPr>
               <a:t>PyTorch</a:t>
             </a:r>
             <a:r>
-              <a:rPr lang="en-GB" dirty="0"/>
+              <a:rPr lang="en-GB" dirty="0">
+                <a:solidFill>
+                  <a:schemeClr val="bg1">
+                    <a:lumMod val="65000"/>
+                  </a:schemeClr>
+                </a:solidFill>
+              </a:rPr>
               <a:t> </a:t>
             </a:r>
             <a:r>
-              <a:rPr lang="en-GB" b="1" dirty="0"/>
+              <a:rPr lang="en-GB" b="1" dirty="0">
+                <a:solidFill>
+                  <a:schemeClr val="bg1">
+                    <a:lumMod val="65000"/>
+                  </a:schemeClr>
+                </a:solidFill>
+              </a:rPr>
               <a:t>library</a:t>
             </a:r>
             <a:r>
-              <a:rPr lang="en-GB" dirty="0"/>
+              <a:rPr lang="en-GB" dirty="0">
+                <a:solidFill>
+                  <a:schemeClr val="bg1">
+                    <a:lumMod val="65000"/>
+                  </a:schemeClr>
+                </a:solidFill>
+              </a:rPr>
               <a:t> and its </a:t>
             </a:r>
             <a:r>
-              <a:rPr lang="en-GB" b="1" dirty="0"/>
+              <a:rPr lang="en-GB" b="1" dirty="0">
+                <a:solidFill>
+                  <a:schemeClr val="bg1">
+                    <a:lumMod val="65000"/>
+                  </a:schemeClr>
+                </a:solidFill>
+              </a:rPr>
               <a:t>benefits</a:t>
             </a:r>
             <a:r>
-              <a:rPr lang="en-GB" dirty="0"/>
+              <a:rPr lang="en-GB" dirty="0">
+                <a:solidFill>
+                  <a:schemeClr val="bg1">
+                    <a:lumMod val="65000"/>
+                  </a:schemeClr>
+                </a:solidFill>
+              </a:rPr>
               <a:t>?</a:t>
             </a:r>
           </a:p>
@@ -11840,39 +12007,93 @@
               <a:buAutoNum type="arabicPeriod"/>
             </a:pPr>
             <a:r>
-              <a:rPr lang="en-GB" dirty="0"/>
+              <a:rPr lang="en-GB" dirty="0">
+                <a:solidFill>
+                  <a:schemeClr val="bg1">
+                    <a:lumMod val="65000"/>
+                  </a:schemeClr>
+                </a:solidFill>
+              </a:rPr>
               <a:t>What is a </a:t>
             </a:r>
             <a:r>
-              <a:rPr lang="en-GB" b="1" dirty="0" err="1"/>
+              <a:rPr lang="en-GB" b="1" dirty="0" err="1">
+                <a:solidFill>
+                  <a:schemeClr val="bg1">
+                    <a:lumMod val="65000"/>
+                  </a:schemeClr>
+                </a:solidFill>
+              </a:rPr>
               <a:t>PyTorch</a:t>
             </a:r>
             <a:r>
-              <a:rPr lang="en-GB" dirty="0"/>
+              <a:rPr lang="en-GB" dirty="0">
+                <a:solidFill>
+                  <a:schemeClr val="bg1">
+                    <a:lumMod val="65000"/>
+                  </a:schemeClr>
+                </a:solidFill>
+              </a:rPr>
               <a:t> </a:t>
             </a:r>
             <a:r>
-              <a:rPr lang="en-GB" b="1" dirty="0"/>
+              <a:rPr lang="en-GB" b="1" dirty="0">
+                <a:solidFill>
+                  <a:schemeClr val="bg1">
+                    <a:lumMod val="65000"/>
+                  </a:schemeClr>
+                </a:solidFill>
+              </a:rPr>
               <a:t>tensor</a:t>
             </a:r>
             <a:r>
-              <a:rPr lang="en-GB" dirty="0"/>
+              <a:rPr lang="en-GB" dirty="0">
+                <a:solidFill>
+                  <a:schemeClr val="bg1">
+                    <a:lumMod val="65000"/>
+                  </a:schemeClr>
+                </a:solidFill>
+              </a:rPr>
               <a:t> </a:t>
             </a:r>
             <a:r>
-              <a:rPr lang="en-GB" b="1" dirty="0"/>
+              <a:rPr lang="en-GB" b="1" dirty="0">
+                <a:solidFill>
+                  <a:schemeClr val="bg1">
+                    <a:lumMod val="65000"/>
+                  </a:schemeClr>
+                </a:solidFill>
+              </a:rPr>
               <a:t>object</a:t>
             </a:r>
             <a:r>
-              <a:rPr lang="en-GB" dirty="0"/>
+              <a:rPr lang="en-GB" dirty="0">
+                <a:solidFill>
+                  <a:schemeClr val="bg1">
+                    <a:lumMod val="65000"/>
+                  </a:schemeClr>
+                </a:solidFill>
+              </a:rPr>
               <a:t> and its typical </a:t>
             </a:r>
             <a:r>
-              <a:rPr lang="en-GB" b="1" dirty="0"/>
+              <a:rPr lang="en-GB" b="1" dirty="0">
+                <a:solidFill>
+                  <a:schemeClr val="bg1">
+                    <a:lumMod val="65000"/>
+                  </a:schemeClr>
+                </a:solidFill>
+              </a:rPr>
               <a:t>attributes</a:t>
             </a:r>
             <a:r>
-              <a:rPr lang="en-GB" dirty="0"/>
+              <a:rPr lang="en-GB" dirty="0">
+                <a:solidFill>
+                  <a:schemeClr val="bg1">
+                    <a:lumMod val="65000"/>
+                  </a:schemeClr>
+                </a:solidFill>
+              </a:rPr>
               <a:t>?</a:t>
             </a:r>
           </a:p>
@@ -11882,23 +12103,53 @@
               <a:buAutoNum type="arabicPeriod"/>
             </a:pPr>
             <a:r>
-              <a:rPr lang="en-GB" dirty="0"/>
+              <a:rPr lang="en-GB" dirty="0">
+                <a:solidFill>
+                  <a:schemeClr val="bg1">
+                    <a:lumMod val="65000"/>
+                  </a:schemeClr>
+                </a:solidFill>
+              </a:rPr>
               <a:t>How to implement some typical </a:t>
             </a:r>
             <a:r>
-              <a:rPr lang="en-GB" b="1" dirty="0"/>
+              <a:rPr lang="en-GB" b="1" dirty="0">
+                <a:solidFill>
+                  <a:schemeClr val="bg1">
+                    <a:lumMod val="65000"/>
+                  </a:schemeClr>
+                </a:solidFill>
+              </a:rPr>
               <a:t>tensor</a:t>
             </a:r>
             <a:r>
-              <a:rPr lang="en-GB" dirty="0"/>
+              <a:rPr lang="en-GB" dirty="0">
+                <a:solidFill>
+                  <a:schemeClr val="bg1">
+                    <a:lumMod val="65000"/>
+                  </a:schemeClr>
+                </a:solidFill>
+              </a:rPr>
               <a:t> </a:t>
             </a:r>
             <a:r>
-              <a:rPr lang="en-GB" b="1" dirty="0"/>
+              <a:rPr lang="en-GB" b="1" dirty="0">
+                <a:solidFill>
+                  <a:schemeClr val="bg1">
+                    <a:lumMod val="65000"/>
+                  </a:schemeClr>
+                </a:solidFill>
+              </a:rPr>
               <a:t>operations</a:t>
             </a:r>
             <a:r>
-              <a:rPr lang="en-GB" dirty="0"/>
+              <a:rPr lang="en-GB" dirty="0">
+                <a:solidFill>
+                  <a:schemeClr val="bg1">
+                    <a:lumMod val="65000"/>
+                  </a:schemeClr>
+                </a:solidFill>
+              </a:rPr>
               <a:t>?</a:t>
             </a:r>
           </a:p>
@@ -11908,15 +12159,33 @@
               <a:buAutoNum type="arabicPeriod"/>
             </a:pPr>
             <a:r>
-              <a:rPr lang="en-GB" dirty="0"/>
+              <a:rPr lang="en-GB" dirty="0">
+                <a:solidFill>
+                  <a:schemeClr val="bg1">
+                    <a:lumMod val="65000"/>
+                  </a:schemeClr>
+                </a:solidFill>
+              </a:rPr>
               <a:t>What is </a:t>
             </a:r>
             <a:r>
-              <a:rPr lang="en-GB" b="1" dirty="0"/>
+              <a:rPr lang="en-GB" b="1" dirty="0">
+                <a:solidFill>
+                  <a:schemeClr val="bg1">
+                    <a:lumMod val="65000"/>
+                  </a:schemeClr>
+                </a:solidFill>
+              </a:rPr>
               <a:t>broadcasting</a:t>
             </a:r>
             <a:r>
-              <a:rPr lang="en-GB" dirty="0"/>
+              <a:rPr lang="en-GB" dirty="0">
+                <a:solidFill>
+                  <a:schemeClr val="bg1">
+                    <a:lumMod val="65000"/>
+                  </a:schemeClr>
+                </a:solidFill>
+              </a:rPr>
               <a:t> on tensors?</a:t>
             </a:r>
           </a:p>
@@ -11926,23 +12195,53 @@
               <a:buAutoNum type="arabicPeriod"/>
             </a:pPr>
             <a:r>
-              <a:rPr lang="en-GB" dirty="0"/>
+              <a:rPr lang="en-GB" dirty="0">
+                <a:solidFill>
+                  <a:schemeClr val="bg1">
+                    <a:lumMod val="65000"/>
+                  </a:schemeClr>
+                </a:solidFill>
+              </a:rPr>
               <a:t>What are </a:t>
             </a:r>
             <a:r>
-              <a:rPr lang="en-GB" b="1" dirty="0"/>
+              <a:rPr lang="en-GB" b="1" dirty="0">
+                <a:solidFill>
+                  <a:schemeClr val="bg1">
+                    <a:lumMod val="65000"/>
+                  </a:schemeClr>
+                </a:solidFill>
+              </a:rPr>
               <a:t>tensor</a:t>
             </a:r>
             <a:r>
-              <a:rPr lang="en-GB" dirty="0"/>
+              <a:rPr lang="en-GB" dirty="0">
+                <a:solidFill>
+                  <a:schemeClr val="bg1">
+                    <a:lumMod val="65000"/>
+                  </a:schemeClr>
+                </a:solidFill>
+              </a:rPr>
               <a:t> </a:t>
             </a:r>
             <a:r>
-              <a:rPr lang="en-GB" b="1" dirty="0"/>
+              <a:rPr lang="en-GB" b="1" dirty="0">
+                <a:solidFill>
+                  <a:schemeClr val="bg1">
+                    <a:lumMod val="65000"/>
+                  </a:schemeClr>
+                </a:solidFill>
+              </a:rPr>
               <a:t>locations</a:t>
             </a:r>
             <a:r>
-              <a:rPr lang="en-GB" dirty="0"/>
+              <a:rPr lang="en-GB" dirty="0">
+                <a:solidFill>
+                  <a:schemeClr val="bg1">
+                    <a:lumMod val="65000"/>
+                  </a:schemeClr>
+                </a:solidFill>
+              </a:rPr>
               <a:t> in terms of computation?</a:t>
             </a:r>
           </a:p>
@@ -11952,71 +12251,173 @@
               <a:buAutoNum type="arabicPeriod"/>
             </a:pPr>
             <a:r>
-              <a:rPr lang="en-GB" dirty="0"/>
+              <a:rPr lang="en-GB" dirty="0">
+                <a:solidFill>
+                  <a:schemeClr val="bg1">
+                    <a:lumMod val="65000"/>
+                  </a:schemeClr>
+                </a:solidFill>
+              </a:rPr>
               <a:t>How to </a:t>
             </a:r>
             <a:r>
-              <a:rPr lang="en-GB" b="1" dirty="0"/>
+              <a:rPr lang="en-GB" b="1" dirty="0">
+                <a:solidFill>
+                  <a:schemeClr val="bg1">
+                    <a:lumMod val="65000"/>
+                  </a:schemeClr>
+                </a:solidFill>
+              </a:rPr>
               <a:t>transform</a:t>
             </a:r>
             <a:r>
-              <a:rPr lang="en-GB" dirty="0"/>
+              <a:rPr lang="en-GB" dirty="0">
+                <a:solidFill>
+                  <a:schemeClr val="bg1">
+                    <a:lumMod val="65000"/>
+                  </a:schemeClr>
+                </a:solidFill>
+              </a:rPr>
               <a:t> </a:t>
             </a:r>
             <a:r>
-              <a:rPr lang="en-GB" b="1" dirty="0"/>
+              <a:rPr lang="en-GB" b="1" dirty="0">
+                <a:solidFill>
+                  <a:schemeClr val="bg1">
+                    <a:lumMod val="65000"/>
+                  </a:schemeClr>
+                </a:solidFill>
+              </a:rPr>
               <a:t>our</a:t>
             </a:r>
             <a:r>
-              <a:rPr lang="en-GB" dirty="0"/>
+              <a:rPr lang="en-GB" dirty="0">
+                <a:solidFill>
+                  <a:schemeClr val="bg1">
+                    <a:lumMod val="65000"/>
+                  </a:schemeClr>
+                </a:solidFill>
+              </a:rPr>
               <a:t> </a:t>
             </a:r>
             <a:r>
-              <a:rPr lang="en-GB" b="1" dirty="0"/>
+              <a:rPr lang="en-GB" b="1" dirty="0">
+                <a:solidFill>
+                  <a:schemeClr val="bg1">
+                    <a:lumMod val="65000"/>
+                  </a:schemeClr>
+                </a:solidFill>
+              </a:rPr>
               <a:t>original</a:t>
             </a:r>
             <a:r>
-              <a:rPr lang="en-GB" dirty="0"/>
+              <a:rPr lang="en-GB" dirty="0">
+                <a:solidFill>
+                  <a:schemeClr val="bg1">
+                    <a:lumMod val="65000"/>
+                  </a:schemeClr>
+                </a:solidFill>
+              </a:rPr>
               <a:t> </a:t>
             </a:r>
             <a:r>
-              <a:rPr lang="en-GB" b="1" dirty="0"/>
+              <a:rPr lang="en-GB" b="1" dirty="0">
+                <a:solidFill>
+                  <a:schemeClr val="bg1">
+                    <a:lumMod val="65000"/>
+                  </a:schemeClr>
+                </a:solidFill>
+              </a:rPr>
               <a:t>NumPy</a:t>
             </a:r>
             <a:r>
-              <a:rPr lang="en-GB" dirty="0"/>
+              <a:rPr lang="en-GB" dirty="0">
+                <a:solidFill>
+                  <a:schemeClr val="bg1">
+                    <a:lumMod val="65000"/>
+                  </a:schemeClr>
+                </a:solidFill>
+              </a:rPr>
               <a:t> </a:t>
             </a:r>
             <a:r>
-              <a:rPr lang="en-GB" b="1" dirty="0"/>
+              <a:rPr lang="en-GB" b="1" dirty="0">
+                <a:solidFill>
+                  <a:schemeClr val="bg1">
+                    <a:lumMod val="65000"/>
+                  </a:schemeClr>
+                </a:solidFill>
+              </a:rPr>
               <a:t>shallow</a:t>
             </a:r>
             <a:r>
-              <a:rPr lang="en-GB" dirty="0"/>
+              <a:rPr lang="en-GB" dirty="0">
+                <a:solidFill>
+                  <a:schemeClr val="bg1">
+                    <a:lumMod val="65000"/>
+                  </a:schemeClr>
+                </a:solidFill>
+              </a:rPr>
               <a:t> </a:t>
             </a:r>
             <a:r>
-              <a:rPr lang="en-GB" b="1" dirty="0"/>
+              <a:rPr lang="en-GB" b="1" dirty="0">
+                <a:solidFill>
+                  <a:schemeClr val="bg1">
+                    <a:lumMod val="65000"/>
+                  </a:schemeClr>
+                </a:solidFill>
+              </a:rPr>
               <a:t>Neural</a:t>
             </a:r>
             <a:r>
-              <a:rPr lang="en-GB" dirty="0"/>
+              <a:rPr lang="en-GB" dirty="0">
+                <a:solidFill>
+                  <a:schemeClr val="bg1">
+                    <a:lumMod val="65000"/>
+                  </a:schemeClr>
+                </a:solidFill>
+              </a:rPr>
               <a:t> </a:t>
             </a:r>
             <a:r>
-              <a:rPr lang="en-GB" b="1" dirty="0"/>
+              <a:rPr lang="en-GB" b="1" dirty="0">
+                <a:solidFill>
+                  <a:schemeClr val="bg1">
+                    <a:lumMod val="65000"/>
+                  </a:schemeClr>
+                </a:solidFill>
+              </a:rPr>
               <a:t>Network</a:t>
             </a:r>
             <a:r>
-              <a:rPr lang="en-GB" dirty="0"/>
+              <a:rPr lang="en-GB" dirty="0">
+                <a:solidFill>
+                  <a:schemeClr val="bg1">
+                    <a:lumMod val="65000"/>
+                  </a:schemeClr>
+                </a:solidFill>
+              </a:rPr>
               <a:t> class so it uses </a:t>
             </a:r>
             <a:r>
-              <a:rPr lang="en-GB" b="1" dirty="0" err="1"/>
+              <a:rPr lang="en-GB" b="1" dirty="0" err="1">
+                <a:solidFill>
+                  <a:schemeClr val="bg1">
+                    <a:lumMod val="65000"/>
+                  </a:schemeClr>
+                </a:solidFill>
+              </a:rPr>
               <a:t>PyTorch</a:t>
             </a:r>
             <a:r>
-              <a:rPr lang="en-GB" dirty="0"/>
+              <a:rPr lang="en-GB" dirty="0">
+                <a:solidFill>
+                  <a:schemeClr val="bg1">
+                    <a:lumMod val="65000"/>
+                  </a:schemeClr>
+                </a:solidFill>
+              </a:rPr>
               <a:t> now instead?</a:t>
             </a:r>
           </a:p>
@@ -12026,39 +12427,93 @@
               <a:buAutoNum type="arabicPeriod"/>
             </a:pPr>
             <a:r>
-              <a:rPr lang="en-GB" dirty="0"/>
+              <a:rPr lang="en-GB" dirty="0">
+                <a:solidFill>
+                  <a:schemeClr val="bg1">
+                    <a:lumMod val="65000"/>
+                  </a:schemeClr>
+                </a:solidFill>
+              </a:rPr>
               <a:t>How to implement a </a:t>
             </a:r>
             <a:r>
-              <a:rPr lang="en-GB" b="1" dirty="0"/>
+              <a:rPr lang="en-GB" b="1" dirty="0">
+                <a:solidFill>
+                  <a:schemeClr val="bg1">
+                    <a:lumMod val="65000"/>
+                  </a:schemeClr>
+                </a:solidFill>
+              </a:rPr>
               <a:t>forward</a:t>
             </a:r>
             <a:r>
-              <a:rPr lang="en-GB" dirty="0"/>
+              <a:rPr lang="en-GB" dirty="0">
+                <a:solidFill>
+                  <a:schemeClr val="bg1">
+                    <a:lumMod val="65000"/>
+                  </a:schemeClr>
+                </a:solidFill>
+              </a:rPr>
               <a:t>, </a:t>
             </a:r>
             <a:r>
-              <a:rPr lang="en-GB" b="1" dirty="0"/>
+              <a:rPr lang="en-GB" b="1" dirty="0">
+                <a:solidFill>
+                  <a:schemeClr val="bg1">
+                    <a:lumMod val="65000"/>
+                  </a:schemeClr>
+                </a:solidFill>
+              </a:rPr>
               <a:t>loss</a:t>
             </a:r>
             <a:r>
-              <a:rPr lang="en-GB" dirty="0"/>
+              <a:rPr lang="en-GB" dirty="0">
+                <a:solidFill>
+                  <a:schemeClr val="bg1">
+                    <a:lumMod val="65000"/>
+                  </a:schemeClr>
+                </a:solidFill>
+              </a:rPr>
               <a:t> and </a:t>
             </a:r>
             <a:r>
-              <a:rPr lang="en-GB" b="1" dirty="0"/>
+              <a:rPr lang="en-GB" b="1" dirty="0">
+                <a:solidFill>
+                  <a:schemeClr val="bg1">
+                    <a:lumMod val="65000"/>
+                  </a:schemeClr>
+                </a:solidFill>
+              </a:rPr>
               <a:t>accuracy</a:t>
             </a:r>
             <a:r>
-              <a:rPr lang="en-GB" dirty="0"/>
+              <a:rPr lang="en-GB" dirty="0">
+                <a:solidFill>
+                  <a:schemeClr val="bg1">
+                    <a:lumMod val="65000"/>
+                  </a:schemeClr>
+                </a:solidFill>
+              </a:rPr>
               <a:t> metric in </a:t>
             </a:r>
             <a:r>
-              <a:rPr lang="en-GB" dirty="0" err="1"/>
+              <a:rPr lang="en-GB" dirty="0" err="1">
+                <a:solidFill>
+                  <a:schemeClr val="bg1">
+                    <a:lumMod val="65000"/>
+                  </a:schemeClr>
+                </a:solidFill>
+              </a:rPr>
               <a:t>PyTorch</a:t>
             </a:r>
             <a:r>
-              <a:rPr lang="en-GB" dirty="0"/>
+              <a:rPr lang="en-GB" dirty="0">
+                <a:solidFill>
+                  <a:schemeClr val="bg1">
+                    <a:lumMod val="65000"/>
+                  </a:schemeClr>
+                </a:solidFill>
+              </a:rPr>
               <a:t>?</a:t>
             </a:r>
           </a:p>
@@ -12068,39 +12523,93 @@
               <a:buAutoNum type="arabicPeriod"/>
             </a:pPr>
             <a:r>
-              <a:rPr lang="en-GB" dirty="0"/>
+              <a:rPr lang="en-GB" dirty="0">
+                <a:solidFill>
+                  <a:schemeClr val="bg1">
+                    <a:lumMod val="65000"/>
+                  </a:schemeClr>
+                </a:solidFill>
+              </a:rPr>
               <a:t>What are some measurable </a:t>
             </a:r>
             <a:r>
-              <a:rPr lang="en-GB" b="1" dirty="0"/>
+              <a:rPr lang="en-GB" b="1" dirty="0">
+                <a:solidFill>
+                  <a:schemeClr val="bg1">
+                    <a:lumMod val="65000"/>
+                  </a:schemeClr>
+                </a:solidFill>
+              </a:rPr>
               <a:t>performance</a:t>
             </a:r>
             <a:r>
-              <a:rPr lang="en-GB" dirty="0"/>
+              <a:rPr lang="en-GB" dirty="0">
+                <a:solidFill>
+                  <a:schemeClr val="bg1">
+                    <a:lumMod val="65000"/>
+                  </a:schemeClr>
+                </a:solidFill>
+              </a:rPr>
               <a:t> </a:t>
             </a:r>
             <a:r>
-              <a:rPr lang="en-GB" b="1" dirty="0"/>
+              <a:rPr lang="en-GB" b="1" dirty="0">
+                <a:solidFill>
+                  <a:schemeClr val="bg1">
+                    <a:lumMod val="65000"/>
+                  </a:schemeClr>
+                </a:solidFill>
+              </a:rPr>
               <a:t>benefits</a:t>
             </a:r>
             <a:r>
-              <a:rPr lang="en-GB" dirty="0"/>
+              <a:rPr lang="en-GB" dirty="0">
+                <a:solidFill>
+                  <a:schemeClr val="bg1">
+                    <a:lumMod val="65000"/>
+                  </a:schemeClr>
+                </a:solidFill>
+              </a:rPr>
               <a:t> of using </a:t>
             </a:r>
             <a:r>
-              <a:rPr lang="en-GB" b="1" dirty="0" err="1"/>
+              <a:rPr lang="en-GB" b="1" dirty="0" err="1">
+                <a:solidFill>
+                  <a:schemeClr val="bg1">
+                    <a:lumMod val="65000"/>
+                  </a:schemeClr>
+                </a:solidFill>
+              </a:rPr>
               <a:t>PyTorch</a:t>
             </a:r>
             <a:r>
-              <a:rPr lang="en-GB" dirty="0"/>
+              <a:rPr lang="en-GB" dirty="0">
+                <a:solidFill>
+                  <a:schemeClr val="bg1">
+                    <a:lumMod val="65000"/>
+                  </a:schemeClr>
+                </a:solidFill>
+              </a:rPr>
               <a:t> over NumPy and </a:t>
             </a:r>
             <a:r>
-              <a:rPr lang="en-GB" b="1" dirty="0"/>
+              <a:rPr lang="en-GB" b="1" dirty="0">
+                <a:solidFill>
+                  <a:schemeClr val="bg1">
+                    <a:lumMod val="65000"/>
+                  </a:schemeClr>
+                </a:solidFill>
+              </a:rPr>
               <a:t>GPUs</a:t>
             </a:r>
             <a:r>
-              <a:rPr lang="en-GB" dirty="0"/>
+              <a:rPr lang="en-GB" dirty="0">
+                <a:solidFill>
+                  <a:schemeClr val="bg1">
+                    <a:lumMod val="65000"/>
+                  </a:schemeClr>
+                </a:solidFill>
+              </a:rPr>
               <a:t> over CPUs?</a:t>
             </a:r>
           </a:p>
@@ -12109,7 +12618,13 @@
               <a:buFont typeface="+mj-lt"/>
               <a:buAutoNum type="arabicPeriod"/>
             </a:pPr>
-            <a:endParaRPr lang="en-SG" dirty="0"/>
+            <a:endParaRPr lang="en-SG" dirty="0">
+              <a:solidFill>
+                <a:schemeClr val="bg1">
+                  <a:lumMod val="65000"/>
+                </a:schemeClr>
+              </a:solidFill>
+            </a:endParaRPr>
           </a:p>
         </p:txBody>
       </p:sp>
@@ -12148,6 +12663,98 @@
           <p:cNvPr id="2" name="Title 1">
             <a:extLst>
               <a:ext uri="{FF2B5EF4-FFF2-40B4-BE49-F238E27FC236}">
+                <a16:creationId xmlns:a16="http://schemas.microsoft.com/office/drawing/2014/main" id="{C902DDAE-7B18-E047-726C-A4619D106A2D}"/>
+              </a:ext>
+            </a:extLst>
+          </p:cNvPr>
+          <p:cNvSpPr>
+            <a:spLocks noGrp="1"/>
+          </p:cNvSpPr>
+          <p:nvPr>
+            <p:ph type="title"/>
+          </p:nvPr>
+        </p:nvSpPr>
+        <p:spPr/>
+        <p:txBody>
+          <a:bodyPr/>
+          <a:lstStyle/>
+          <a:p>
+            <a:r>
+              <a:rPr lang="en-GB" dirty="0"/>
+              <a:t>Trying our trainer function… Works!</a:t>
+            </a:r>
+            <a:br>
+              <a:rPr lang="en-GB" dirty="0"/>
+            </a:br>
+            <a:endParaRPr lang="en-SG" dirty="0"/>
+          </a:p>
+        </p:txBody>
+      </p:sp>
+      <p:pic>
+        <p:nvPicPr>
+          <p:cNvPr id="5" name="Picture 4">
+            <a:extLst>
+              <a:ext uri="{FF2B5EF4-FFF2-40B4-BE49-F238E27FC236}">
+                <a16:creationId xmlns:a16="http://schemas.microsoft.com/office/drawing/2014/main" id="{0B55E7AB-B38B-DC28-57B5-D4F3CA5543A9}"/>
+              </a:ext>
+            </a:extLst>
+          </p:cNvPr>
+          <p:cNvPicPr>
+            <a:picLocks noChangeAspect="1"/>
+          </p:cNvPicPr>
+          <p:nvPr/>
+        </p:nvPicPr>
+        <p:blipFill>
+          <a:blip r:embed="rId2"/>
+          <a:stretch>
+            <a:fillRect/>
+          </a:stretch>
+        </p:blipFill>
+        <p:spPr>
+          <a:xfrm>
+            <a:off x="2123542" y="1473715"/>
+            <a:ext cx="7944915" cy="5384285"/>
+          </a:xfrm>
+          <a:prstGeom prst="rect">
+            <a:avLst/>
+          </a:prstGeom>
+        </p:spPr>
+      </p:pic>
+    </p:spTree>
+    <p:extLst>
+      <p:ext uri="{BB962C8B-B14F-4D97-AF65-F5344CB8AC3E}">
+        <p14:creationId xmlns:p14="http://schemas.microsoft.com/office/powerpoint/2010/main" val="2768410648"/>
+      </p:ext>
+    </p:extLst>
+  </p:cSld>
+  <p:clrMapOvr>
+    <a:masterClrMapping/>
+  </p:clrMapOvr>
+</p:sld>
+</file>
+
+<file path=ppt/slides/slide21.xml><?xml version="1.0" encoding="utf-8"?>
+<p:sld xmlns:a="http://schemas.openxmlformats.org/drawingml/2006/main" xmlns:r="http://schemas.openxmlformats.org/officeDocument/2006/relationships" xmlns:p="http://schemas.openxmlformats.org/presentationml/2006/main">
+  <p:cSld>
+    <p:spTree>
+      <p:nvGrpSpPr>
+        <p:cNvPr id="1" name=""/>
+        <p:cNvGrpSpPr/>
+        <p:nvPr/>
+      </p:nvGrpSpPr>
+      <p:grpSpPr>
+        <a:xfrm>
+          <a:off x="0" y="0"/>
+          <a:ext cx="0" cy="0"/>
+          <a:chOff x="0" y="0"/>
+          <a:chExt cx="0" cy="0"/>
+        </a:xfrm>
+      </p:grpSpPr>
+      <p:sp>
+        <p:nvSpPr>
+          <p:cNvPr id="2" name="Title 1">
+            <a:extLst>
+              <a:ext uri="{FF2B5EF4-FFF2-40B4-BE49-F238E27FC236}">
                 <a16:creationId xmlns:a16="http://schemas.microsoft.com/office/drawing/2014/main" id="{F73E479C-D045-DD74-CA6E-A60F94A36E18}"/>
               </a:ext>
             </a:extLst>
@@ -12366,7 +12973,7 @@
 </p:sld>
 </file>
 
-<file path=ppt/slides/slide21.xml><?xml version="1.0" encoding="utf-8"?>
+<file path=ppt/slides/slide22.xml><?xml version="1.0" encoding="utf-8"?>
 <p:sld xmlns:a="http://schemas.openxmlformats.org/drawingml/2006/main" xmlns:r="http://schemas.openxmlformats.org/officeDocument/2006/relationships" xmlns:p="http://schemas.openxmlformats.org/presentationml/2006/main">
   <p:cSld>
     <p:spTree>
@@ -12479,7 +13086,7 @@
 </p:sld>
 </file>
 
-<file path=ppt/slides/slide22.xml><?xml version="1.0" encoding="utf-8"?>
+<file path=ppt/slides/slide23.xml><?xml version="1.0" encoding="utf-8"?>
 <p:sld xmlns:a="http://schemas.openxmlformats.org/drawingml/2006/main" xmlns:r="http://schemas.openxmlformats.org/officeDocument/2006/relationships" xmlns:p="http://schemas.openxmlformats.org/presentationml/2006/main">
   <p:cSld>
     <p:spTree>
@@ -12645,7 +13252,7 @@
 </p:sld>
 </file>
 
-<file path=ppt/slides/slide23.xml><?xml version="1.0" encoding="utf-8"?>
+<file path=ppt/slides/slide24.xml><?xml version="1.0" encoding="utf-8"?>
 <p:sld xmlns:a="http://schemas.openxmlformats.org/drawingml/2006/main" xmlns:r="http://schemas.openxmlformats.org/officeDocument/2006/relationships" xmlns:p="http://schemas.openxmlformats.org/presentationml/2006/main">
   <p:cSld>
     <p:spTree>
@@ -12705,206 +13312,6 @@
 </p:sld>
 </file>
 
-<file path=ppt/slides/slide24.xml><?xml version="1.0" encoding="utf-8"?>
-<p:sld xmlns:a="http://schemas.openxmlformats.org/drawingml/2006/main" xmlns:r="http://schemas.openxmlformats.org/officeDocument/2006/relationships" xmlns:p="http://schemas.openxmlformats.org/presentationml/2006/main">
-  <p:cSld>
-    <p:spTree>
-      <p:nvGrpSpPr>
-        <p:cNvPr id="1" name=""/>
-        <p:cNvGrpSpPr/>
-        <p:nvPr/>
-      </p:nvGrpSpPr>
-      <p:grpSpPr>
-        <a:xfrm>
-          <a:off x="0" y="0"/>
-          <a:ext cx="0" cy="0"/>
-          <a:chOff x="0" y="0"/>
-          <a:chExt cx="0" cy="0"/>
-        </a:xfrm>
-      </p:grpSpPr>
-      <p:sp>
-        <p:nvSpPr>
-          <p:cNvPr id="2" name="Title 1">
-            <a:extLst>
-              <a:ext uri="{FF2B5EF4-FFF2-40B4-BE49-F238E27FC236}">
-                <a16:creationId xmlns:a16="http://schemas.microsoft.com/office/drawing/2014/main" id="{9E92E9E4-1AEF-6408-1465-D1DC917DE2AF}"/>
-              </a:ext>
-            </a:extLst>
-          </p:cNvPr>
-          <p:cNvSpPr>
-            <a:spLocks noGrp="1"/>
-          </p:cNvSpPr>
-          <p:nvPr>
-            <p:ph type="title"/>
-          </p:nvPr>
-        </p:nvSpPr>
-        <p:spPr/>
-        <p:txBody>
-          <a:bodyPr/>
-          <a:lstStyle/>
-          <a:p>
-            <a:r>
-              <a:rPr lang="en-GB" dirty="0"/>
-              <a:t>Using advanced optimizers (Adam, etc.)</a:t>
-            </a:r>
-            <a:endParaRPr lang="en-SG" dirty="0"/>
-          </a:p>
-        </p:txBody>
-      </p:sp>
-      <p:sp>
-        <p:nvSpPr>
-          <p:cNvPr id="3" name="Content Placeholder 2">
-            <a:extLst>
-              <a:ext uri="{FF2B5EF4-FFF2-40B4-BE49-F238E27FC236}">
-                <a16:creationId xmlns:a16="http://schemas.microsoft.com/office/drawing/2014/main" id="{EDC87932-752D-FABC-76EF-38023409D8D8}"/>
-              </a:ext>
-            </a:extLst>
-          </p:cNvPr>
-          <p:cNvSpPr>
-            <a:spLocks noGrp="1"/>
-          </p:cNvSpPr>
-          <p:nvPr>
-            <p:ph idx="1"/>
-          </p:nvPr>
-        </p:nvSpPr>
-        <p:spPr>
-          <a:xfrm>
-            <a:off x="838200" y="1825624"/>
-            <a:ext cx="10515600" cy="5032375"/>
-          </a:xfrm>
-        </p:spPr>
-        <p:txBody>
-          <a:bodyPr/>
-          <a:lstStyle/>
-          <a:p>
-            <a:pPr marL="0" indent="0">
-              <a:buNone/>
-            </a:pPr>
-            <a:r>
-              <a:rPr lang="en-GB" dirty="0"/>
-              <a:t>Our next step is logically to </a:t>
-            </a:r>
-            <a:r>
-              <a:rPr lang="en-GB" b="1" dirty="0"/>
-              <a:t>replace our vanilla gradient descent with some more advanced optimizers</a:t>
-            </a:r>
-            <a:r>
-              <a:rPr lang="en-GB" dirty="0"/>
-              <a:t>, e.g. Adam, </a:t>
-            </a:r>
-            <a:r>
-              <a:rPr lang="en-GB" dirty="0" err="1"/>
-              <a:t>AdaGrad</a:t>
-            </a:r>
-            <a:r>
-              <a:rPr lang="en-GB" dirty="0"/>
-              <a:t>, </a:t>
-            </a:r>
-            <a:r>
-              <a:rPr lang="en-GB" dirty="0" err="1"/>
-              <a:t>RMSProp</a:t>
-            </a:r>
-            <a:r>
-              <a:rPr lang="en-GB" dirty="0"/>
-              <a:t>, etc.</a:t>
-            </a:r>
-          </a:p>
-          <a:p>
-            <a:pPr marL="0" indent="0">
-              <a:buNone/>
-            </a:pPr>
-            <a:r>
-              <a:rPr lang="en-GB" dirty="0"/>
-              <a:t>Again, we will be relying on </a:t>
-            </a:r>
-            <a:r>
-              <a:rPr lang="en-GB" dirty="0" err="1"/>
-              <a:t>PyTorch</a:t>
-            </a:r>
-            <a:r>
-              <a:rPr lang="en-GB" dirty="0"/>
-              <a:t> as much as possible.</a:t>
-            </a:r>
-          </a:p>
-          <a:p>
-            <a:pPr marL="0" indent="0">
-              <a:buNone/>
-            </a:pPr>
-            <a:endParaRPr lang="en-GB" dirty="0"/>
-          </a:p>
-          <a:p>
-            <a:pPr marL="0" indent="0">
-              <a:buNone/>
-            </a:pPr>
-            <a:r>
-              <a:rPr lang="en-GB" dirty="0"/>
-              <a:t>Feel free to have a look at all the available </a:t>
-            </a:r>
-            <a:r>
-              <a:rPr lang="en-GB" b="1" dirty="0"/>
-              <a:t>built-in</a:t>
-            </a:r>
-            <a:r>
-              <a:rPr lang="en-GB" dirty="0"/>
-              <a:t> </a:t>
-            </a:r>
-            <a:r>
-              <a:rPr lang="en-GB" b="1" dirty="0"/>
-              <a:t>optimizers</a:t>
-            </a:r>
-            <a:r>
-              <a:rPr lang="en-GB" dirty="0"/>
-              <a:t>, available in </a:t>
-            </a:r>
-            <a:r>
-              <a:rPr lang="en-GB" dirty="0" err="1"/>
-              <a:t>PyTorch</a:t>
-            </a:r>
-            <a:r>
-              <a:rPr lang="en-GB" dirty="0"/>
-              <a:t>, here: </a:t>
-            </a:r>
-            <a:r>
-              <a:rPr lang="en-GB" dirty="0">
-                <a:hlinkClick r:id="rId2"/>
-              </a:rPr>
-              <a:t>https://pytorch.org/docs/stable/optim.html</a:t>
-            </a:r>
-            <a:endParaRPr lang="en-GB" dirty="0"/>
-          </a:p>
-          <a:p>
-            <a:pPr marL="0" indent="0">
-              <a:buNone/>
-            </a:pPr>
-            <a:endParaRPr lang="en-GB" dirty="0"/>
-          </a:p>
-          <a:p>
-            <a:pPr marL="0" indent="0">
-              <a:buNone/>
-            </a:pPr>
-            <a:r>
-              <a:rPr lang="en-GB" dirty="0"/>
-              <a:t>Let us now demonstrate how to use them in our Neural Network!</a:t>
-            </a:r>
-          </a:p>
-          <a:p>
-            <a:endParaRPr lang="en-GB" dirty="0"/>
-          </a:p>
-        </p:txBody>
-      </p:sp>
-    </p:spTree>
-    <p:extLst>
-      <p:ext uri="{BB962C8B-B14F-4D97-AF65-F5344CB8AC3E}">
-        <p14:creationId xmlns:p14="http://schemas.microsoft.com/office/powerpoint/2010/main" val="1283478655"/>
-      </p:ext>
-    </p:extLst>
-  </p:cSld>
-  <p:clrMapOvr>
-    <a:masterClrMapping/>
-  </p:clrMapOvr>
-</p:sld>
-</file>
-
 <file path=ppt/slides/slide25.xml><?xml version="1.0" encoding="utf-8"?>
 <p:sld xmlns:a="http://schemas.openxmlformats.org/drawingml/2006/main" xmlns:r="http://schemas.openxmlformats.org/officeDocument/2006/relationships" xmlns:p="http://schemas.openxmlformats.org/presentationml/2006/main">
   <p:cSld>
@@ -12970,6 +13377,206 @@
         <p:spPr>
           <a:xfrm>
             <a:off x="838200" y="1825624"/>
+            <a:ext cx="10515600" cy="5032375"/>
+          </a:xfrm>
+        </p:spPr>
+        <p:txBody>
+          <a:bodyPr/>
+          <a:lstStyle/>
+          <a:p>
+            <a:pPr marL="0" indent="0">
+              <a:buNone/>
+            </a:pPr>
+            <a:r>
+              <a:rPr lang="en-GB" dirty="0"/>
+              <a:t>Our next step is logically to </a:t>
+            </a:r>
+            <a:r>
+              <a:rPr lang="en-GB" b="1" dirty="0"/>
+              <a:t>replace our vanilla gradient descent with some more advanced optimizers</a:t>
+            </a:r>
+            <a:r>
+              <a:rPr lang="en-GB" dirty="0"/>
+              <a:t>, e.g. Adam, </a:t>
+            </a:r>
+            <a:r>
+              <a:rPr lang="en-GB" dirty="0" err="1"/>
+              <a:t>AdaGrad</a:t>
+            </a:r>
+            <a:r>
+              <a:rPr lang="en-GB" dirty="0"/>
+              <a:t>, </a:t>
+            </a:r>
+            <a:r>
+              <a:rPr lang="en-GB" dirty="0" err="1"/>
+              <a:t>RMSProp</a:t>
+            </a:r>
+            <a:r>
+              <a:rPr lang="en-GB" dirty="0"/>
+              <a:t>, etc.</a:t>
+            </a:r>
+          </a:p>
+          <a:p>
+            <a:pPr marL="0" indent="0">
+              <a:buNone/>
+            </a:pPr>
+            <a:r>
+              <a:rPr lang="en-GB" dirty="0"/>
+              <a:t>Again, we will be relying on </a:t>
+            </a:r>
+            <a:r>
+              <a:rPr lang="en-GB" dirty="0" err="1"/>
+              <a:t>PyTorch</a:t>
+            </a:r>
+            <a:r>
+              <a:rPr lang="en-GB" dirty="0"/>
+              <a:t> as much as possible.</a:t>
+            </a:r>
+          </a:p>
+          <a:p>
+            <a:pPr marL="0" indent="0">
+              <a:buNone/>
+            </a:pPr>
+            <a:endParaRPr lang="en-GB" dirty="0"/>
+          </a:p>
+          <a:p>
+            <a:pPr marL="0" indent="0">
+              <a:buNone/>
+            </a:pPr>
+            <a:r>
+              <a:rPr lang="en-GB" dirty="0"/>
+              <a:t>Feel free to have a look at all the available </a:t>
+            </a:r>
+            <a:r>
+              <a:rPr lang="en-GB" b="1" dirty="0"/>
+              <a:t>built-in</a:t>
+            </a:r>
+            <a:r>
+              <a:rPr lang="en-GB" dirty="0"/>
+              <a:t> </a:t>
+            </a:r>
+            <a:r>
+              <a:rPr lang="en-GB" b="1" dirty="0"/>
+              <a:t>optimizers</a:t>
+            </a:r>
+            <a:r>
+              <a:rPr lang="en-GB" dirty="0"/>
+              <a:t>, available in </a:t>
+            </a:r>
+            <a:r>
+              <a:rPr lang="en-GB" dirty="0" err="1"/>
+              <a:t>PyTorch</a:t>
+            </a:r>
+            <a:r>
+              <a:rPr lang="en-GB" dirty="0"/>
+              <a:t>, here: </a:t>
+            </a:r>
+            <a:r>
+              <a:rPr lang="en-GB" dirty="0">
+                <a:hlinkClick r:id="rId2"/>
+              </a:rPr>
+              <a:t>https://pytorch.org/docs/stable/optim.html</a:t>
+            </a:r>
+            <a:endParaRPr lang="en-GB" dirty="0"/>
+          </a:p>
+          <a:p>
+            <a:pPr marL="0" indent="0">
+              <a:buNone/>
+            </a:pPr>
+            <a:endParaRPr lang="en-GB" dirty="0"/>
+          </a:p>
+          <a:p>
+            <a:pPr marL="0" indent="0">
+              <a:buNone/>
+            </a:pPr>
+            <a:r>
+              <a:rPr lang="en-GB" dirty="0"/>
+              <a:t>Let us now demonstrate how to use them in our Neural Network!</a:t>
+            </a:r>
+          </a:p>
+          <a:p>
+            <a:endParaRPr lang="en-GB" dirty="0"/>
+          </a:p>
+        </p:txBody>
+      </p:sp>
+    </p:spTree>
+    <p:extLst>
+      <p:ext uri="{BB962C8B-B14F-4D97-AF65-F5344CB8AC3E}">
+        <p14:creationId xmlns:p14="http://schemas.microsoft.com/office/powerpoint/2010/main" val="1283478655"/>
+      </p:ext>
+    </p:extLst>
+  </p:cSld>
+  <p:clrMapOvr>
+    <a:masterClrMapping/>
+  </p:clrMapOvr>
+</p:sld>
+</file>
+
+<file path=ppt/slides/slide26.xml><?xml version="1.0" encoding="utf-8"?>
+<p:sld xmlns:a="http://schemas.openxmlformats.org/drawingml/2006/main" xmlns:r="http://schemas.openxmlformats.org/officeDocument/2006/relationships" xmlns:p="http://schemas.openxmlformats.org/presentationml/2006/main">
+  <p:cSld>
+    <p:spTree>
+      <p:nvGrpSpPr>
+        <p:cNvPr id="1" name=""/>
+        <p:cNvGrpSpPr/>
+        <p:nvPr/>
+      </p:nvGrpSpPr>
+      <p:grpSpPr>
+        <a:xfrm>
+          <a:off x="0" y="0"/>
+          <a:ext cx="0" cy="0"/>
+          <a:chOff x="0" y="0"/>
+          <a:chExt cx="0" cy="0"/>
+        </a:xfrm>
+      </p:grpSpPr>
+      <p:sp>
+        <p:nvSpPr>
+          <p:cNvPr id="2" name="Title 1">
+            <a:extLst>
+              <a:ext uri="{FF2B5EF4-FFF2-40B4-BE49-F238E27FC236}">
+                <a16:creationId xmlns:a16="http://schemas.microsoft.com/office/drawing/2014/main" id="{9E92E9E4-1AEF-6408-1465-D1DC917DE2AF}"/>
+              </a:ext>
+            </a:extLst>
+          </p:cNvPr>
+          <p:cNvSpPr>
+            <a:spLocks noGrp="1"/>
+          </p:cNvSpPr>
+          <p:nvPr>
+            <p:ph type="title"/>
+          </p:nvPr>
+        </p:nvSpPr>
+        <p:spPr/>
+        <p:txBody>
+          <a:bodyPr/>
+          <a:lstStyle/>
+          <a:p>
+            <a:r>
+              <a:rPr lang="en-GB" dirty="0"/>
+              <a:t>Using advanced optimizers (Adam, etc.)</a:t>
+            </a:r>
+            <a:endParaRPr lang="en-SG" dirty="0"/>
+          </a:p>
+        </p:txBody>
+      </p:sp>
+      <p:sp>
+        <p:nvSpPr>
+          <p:cNvPr id="3" name="Content Placeholder 2">
+            <a:extLst>
+              <a:ext uri="{FF2B5EF4-FFF2-40B4-BE49-F238E27FC236}">
+                <a16:creationId xmlns:a16="http://schemas.microsoft.com/office/drawing/2014/main" id="{EDC87932-752D-FABC-76EF-38023409D8D8}"/>
+              </a:ext>
+            </a:extLst>
+          </p:cNvPr>
+          <p:cNvSpPr>
+            <a:spLocks noGrp="1"/>
+          </p:cNvSpPr>
+          <p:nvPr>
+            <p:ph idx="1"/>
+          </p:nvPr>
+        </p:nvSpPr>
+        <p:spPr>
+          <a:xfrm>
+            <a:off x="838200" y="1825624"/>
             <a:ext cx="10923954" cy="5032375"/>
           </a:xfrm>
         </p:spPr>
@@ -13134,7 +13741,7 @@
 </p:sld>
 </file>
 
-<file path=ppt/slides/slide26.xml><?xml version="1.0" encoding="utf-8"?>
+<file path=ppt/slides/slide27.xml><?xml version="1.0" encoding="utf-8"?>
 <p:sld xmlns:a="http://schemas.openxmlformats.org/drawingml/2006/main" xmlns:r="http://schemas.openxmlformats.org/officeDocument/2006/relationships" xmlns:p="http://schemas.openxmlformats.org/presentationml/2006/main">
   <p:cSld>
     <p:spTree>
@@ -13406,7 +14013,7 @@
 </p:sld>
 </file>
 
-<file path=ppt/slides/slide27.xml><?xml version="1.0" encoding="utf-8"?>
+<file path=ppt/slides/slide28.xml><?xml version="1.0" encoding="utf-8"?>
 <p:sld xmlns:a="http://schemas.openxmlformats.org/drawingml/2006/main" xmlns:r="http://schemas.openxmlformats.org/officeDocument/2006/relationships" xmlns:p="http://schemas.openxmlformats.org/presentationml/2006/main">
   <p:cSld>
     <p:spTree>
@@ -13560,7 +14167,7 @@
 </p:sld>
 </file>
 
-<file path=ppt/slides/slide28.xml><?xml version="1.0" encoding="utf-8"?>
+<file path=ppt/slides/slide29.xml><?xml version="1.0" encoding="utf-8"?>
 <p:sld xmlns:a="http://schemas.openxmlformats.org/drawingml/2006/main" xmlns:r="http://schemas.openxmlformats.org/officeDocument/2006/relationships" xmlns:p="http://schemas.openxmlformats.org/presentationml/2006/main">
   <p:cSld>
     <p:spTree>
@@ -13768,7 +14375,396 @@
 </p:sld>
 </file>
 
-<file path=ppt/slides/slide29.xml><?xml version="1.0" encoding="utf-8"?>
+<file path=ppt/slides/slide3.xml><?xml version="1.0" encoding="utf-8"?>
+<p:sld xmlns:a="http://schemas.openxmlformats.org/drawingml/2006/main" xmlns:r="http://schemas.openxmlformats.org/officeDocument/2006/relationships" xmlns:p="http://schemas.openxmlformats.org/presentationml/2006/main">
+  <p:cSld>
+    <p:spTree>
+      <p:nvGrpSpPr>
+        <p:cNvPr id="1" name=""/>
+        <p:cNvGrpSpPr/>
+        <p:nvPr/>
+      </p:nvGrpSpPr>
+      <p:grpSpPr>
+        <a:xfrm>
+          <a:off x="0" y="0"/>
+          <a:ext cx="0" cy="0"/>
+          <a:chOff x="0" y="0"/>
+          <a:chExt cx="0" cy="0"/>
+        </a:xfrm>
+      </p:grpSpPr>
+      <p:sp>
+        <p:nvSpPr>
+          <p:cNvPr id="2" name="Title 1">
+            <a:extLst>
+              <a:ext uri="{FF2B5EF4-FFF2-40B4-BE49-F238E27FC236}">
+                <a16:creationId xmlns:a16="http://schemas.microsoft.com/office/drawing/2014/main" id="{3F88AB3E-DF60-4411-7415-7A8708334829}"/>
+              </a:ext>
+            </a:extLst>
+          </p:cNvPr>
+          <p:cNvSpPr>
+            <a:spLocks noGrp="1"/>
+          </p:cNvSpPr>
+          <p:nvPr>
+            <p:ph type="title"/>
+          </p:nvPr>
+        </p:nvSpPr>
+        <p:spPr/>
+        <p:txBody>
+          <a:bodyPr/>
+          <a:lstStyle/>
+          <a:p>
+            <a:r>
+              <a:rPr lang="en-GB" dirty="0"/>
+              <a:t>Introduction (Week 3)</a:t>
+            </a:r>
+            <a:endParaRPr lang="en-SG" dirty="0"/>
+          </a:p>
+        </p:txBody>
+      </p:sp>
+      <p:sp>
+        <p:nvSpPr>
+          <p:cNvPr id="3" name="Content Placeholder 2">
+            <a:extLst>
+              <a:ext uri="{FF2B5EF4-FFF2-40B4-BE49-F238E27FC236}">
+                <a16:creationId xmlns:a16="http://schemas.microsoft.com/office/drawing/2014/main" id="{65B58308-C101-BC04-E972-00C74DE5080B}"/>
+              </a:ext>
+            </a:extLst>
+          </p:cNvPr>
+          <p:cNvSpPr>
+            <a:spLocks noGrp="1"/>
+          </p:cNvSpPr>
+          <p:nvPr>
+            <p:ph idx="1"/>
+          </p:nvPr>
+        </p:nvSpPr>
+        <p:spPr>
+          <a:xfrm>
+            <a:off x="838200" y="1825624"/>
+            <a:ext cx="10515600" cy="5032375"/>
+          </a:xfrm>
+        </p:spPr>
+        <p:txBody>
+          <a:bodyPr>
+            <a:normAutofit lnSpcReduction="10000"/>
+          </a:bodyPr>
+          <a:lstStyle/>
+          <a:p>
+            <a:pPr marL="514350" indent="-514350">
+              <a:buFont typeface="+mj-lt"/>
+              <a:buAutoNum type="arabicPeriod" startAt="9"/>
+            </a:pPr>
+            <a:r>
+              <a:rPr lang="en-GB" dirty="0"/>
+              <a:t>What is the </a:t>
+            </a:r>
+            <a:r>
+              <a:rPr lang="en-GB" b="1" dirty="0" err="1"/>
+              <a:t>autograd</a:t>
+            </a:r>
+            <a:r>
+              <a:rPr lang="en-GB" dirty="0"/>
+              <a:t>/</a:t>
+            </a:r>
+            <a:r>
+              <a:rPr lang="en-GB" b="1" dirty="0"/>
+              <a:t>backprop</a:t>
+            </a:r>
+            <a:r>
+              <a:rPr lang="en-GB" dirty="0"/>
+              <a:t> module in </a:t>
+            </a:r>
+            <a:r>
+              <a:rPr lang="en-GB" dirty="0" err="1"/>
+              <a:t>PyTorch</a:t>
+            </a:r>
+            <a:r>
+              <a:rPr lang="en-GB" dirty="0"/>
+              <a:t>, and how does it use a </a:t>
+            </a:r>
+            <a:r>
+              <a:rPr lang="en-GB" b="1" dirty="0"/>
+              <a:t>computational</a:t>
+            </a:r>
+            <a:r>
+              <a:rPr lang="en-GB" dirty="0"/>
+              <a:t> </a:t>
+            </a:r>
+            <a:r>
+              <a:rPr lang="en-GB" b="1" dirty="0"/>
+              <a:t>graph</a:t>
+            </a:r>
+            <a:r>
+              <a:rPr lang="en-GB" dirty="0"/>
+              <a:t> to </a:t>
+            </a:r>
+            <a:r>
+              <a:rPr lang="en-GB" b="1" dirty="0"/>
+              <a:t>compute</a:t>
+            </a:r>
+            <a:r>
+              <a:rPr lang="en-GB" dirty="0"/>
+              <a:t> </a:t>
+            </a:r>
+            <a:r>
+              <a:rPr lang="en-GB" b="1" dirty="0"/>
+              <a:t>all</a:t>
+            </a:r>
+            <a:r>
+              <a:rPr lang="en-GB" dirty="0"/>
+              <a:t> </a:t>
+            </a:r>
+            <a:r>
+              <a:rPr lang="en-GB" b="1" dirty="0"/>
+              <a:t>derivatives</a:t>
+            </a:r>
+            <a:r>
+              <a:rPr lang="en-GB" dirty="0"/>
+              <a:t>? </a:t>
+            </a:r>
+          </a:p>
+          <a:p>
+            <a:pPr marL="514350" indent="-514350">
+              <a:buFont typeface="+mj-lt"/>
+              <a:buAutoNum type="arabicPeriod" startAt="9"/>
+            </a:pPr>
+            <a:r>
+              <a:rPr lang="en-GB" dirty="0"/>
+              <a:t>How to use the </a:t>
+            </a:r>
+            <a:r>
+              <a:rPr lang="en-GB" b="1" dirty="0" err="1"/>
+              <a:t>autograd</a:t>
+            </a:r>
+            <a:r>
+              <a:rPr lang="en-GB" dirty="0"/>
+              <a:t> to implement </a:t>
+            </a:r>
+            <a:r>
+              <a:rPr lang="en-GB" b="1" dirty="0"/>
+              <a:t>derivatives</a:t>
+            </a:r>
+            <a:r>
+              <a:rPr lang="en-GB" dirty="0"/>
+              <a:t> and a </a:t>
+            </a:r>
+            <a:r>
+              <a:rPr lang="en-GB" b="1" dirty="0"/>
+              <a:t>vanilla</a:t>
+            </a:r>
+            <a:r>
+              <a:rPr lang="en-GB" dirty="0"/>
+              <a:t> </a:t>
+            </a:r>
+            <a:r>
+              <a:rPr lang="en-GB" b="1" dirty="0"/>
+              <a:t>gradient</a:t>
+            </a:r>
+            <a:r>
+              <a:rPr lang="en-GB" dirty="0"/>
+              <a:t> </a:t>
+            </a:r>
+            <a:r>
+              <a:rPr lang="en-GB" b="1" dirty="0"/>
+              <a:t>descent</a:t>
+            </a:r>
+            <a:r>
+              <a:rPr lang="en-GB" dirty="0"/>
+              <a:t>?</a:t>
+            </a:r>
+          </a:p>
+          <a:p>
+            <a:pPr marL="514350" indent="-514350">
+              <a:buFont typeface="+mj-lt"/>
+              <a:buAutoNum type="arabicPeriod" startAt="9"/>
+            </a:pPr>
+            <a:r>
+              <a:rPr lang="en-GB" dirty="0"/>
+              <a:t>How to implement </a:t>
+            </a:r>
+            <a:r>
+              <a:rPr lang="en-GB" b="1" dirty="0"/>
+              <a:t>backprop</a:t>
+            </a:r>
+            <a:r>
+              <a:rPr lang="en-GB" dirty="0"/>
+              <a:t> in </a:t>
+            </a:r>
+            <a:r>
+              <a:rPr lang="en-GB" dirty="0" err="1"/>
+              <a:t>PyTorch</a:t>
+            </a:r>
+            <a:r>
+              <a:rPr lang="en-GB" dirty="0"/>
+              <a:t> for our </a:t>
+            </a:r>
+            <a:r>
+              <a:rPr lang="en-GB" b="1" dirty="0"/>
+              <a:t>shallow</a:t>
+            </a:r>
+            <a:r>
+              <a:rPr lang="en-GB" dirty="0"/>
+              <a:t> </a:t>
+            </a:r>
+            <a:r>
+              <a:rPr lang="en-GB" b="1" dirty="0"/>
+              <a:t>Neural</a:t>
+            </a:r>
+            <a:r>
+              <a:rPr lang="en-GB" dirty="0"/>
+              <a:t> </a:t>
+            </a:r>
+            <a:r>
+              <a:rPr lang="en-GB" b="1" dirty="0"/>
+              <a:t>Network</a:t>
+            </a:r>
+            <a:r>
+              <a:rPr lang="en-GB" dirty="0"/>
+              <a:t> class?</a:t>
+            </a:r>
+          </a:p>
+          <a:p>
+            <a:pPr marL="514350" indent="-514350">
+              <a:buFont typeface="+mj-lt"/>
+              <a:buAutoNum type="arabicPeriod" startAt="9"/>
+            </a:pPr>
+            <a:r>
+              <a:rPr lang="en-GB" dirty="0"/>
+              <a:t>How to use </a:t>
+            </a:r>
+            <a:r>
+              <a:rPr lang="en-GB" b="1" dirty="0" err="1"/>
+              <a:t>PyTorch</a:t>
+            </a:r>
+            <a:r>
+              <a:rPr lang="en-GB" dirty="0"/>
+              <a:t> to implement </a:t>
+            </a:r>
+            <a:r>
+              <a:rPr lang="en-GB" b="1" dirty="0"/>
+              <a:t>advanced</a:t>
+            </a:r>
+            <a:r>
+              <a:rPr lang="en-GB" dirty="0"/>
+              <a:t> </a:t>
+            </a:r>
+            <a:r>
+              <a:rPr lang="en-GB" b="1" dirty="0"/>
+              <a:t>optimizers</a:t>
+            </a:r>
+            <a:r>
+              <a:rPr lang="en-GB" dirty="0"/>
+              <a:t>?</a:t>
+            </a:r>
+          </a:p>
+          <a:p>
+            <a:pPr marL="514350" indent="-514350">
+              <a:buFont typeface="+mj-lt"/>
+              <a:buAutoNum type="arabicPeriod" startAt="9"/>
+            </a:pPr>
+            <a:r>
+              <a:rPr lang="en-GB" dirty="0"/>
+              <a:t>How to use </a:t>
+            </a:r>
+            <a:r>
+              <a:rPr lang="en-GB" b="1" dirty="0" err="1"/>
+              <a:t>PyTorch</a:t>
+            </a:r>
+            <a:r>
+              <a:rPr lang="en-GB" dirty="0"/>
+              <a:t> to implement </a:t>
+            </a:r>
+            <a:r>
+              <a:rPr lang="en-GB" b="1" dirty="0"/>
+              <a:t>advanced</a:t>
+            </a:r>
+            <a:r>
+              <a:rPr lang="en-GB" dirty="0"/>
+              <a:t> </a:t>
+            </a:r>
+            <a:r>
+              <a:rPr lang="en-GB" b="1" dirty="0"/>
+              <a:t>initializers</a:t>
+            </a:r>
+            <a:r>
+              <a:rPr lang="en-GB" dirty="0"/>
+              <a:t>?</a:t>
+            </a:r>
+          </a:p>
+          <a:p>
+            <a:pPr marL="514350" indent="-514350">
+              <a:buFont typeface="+mj-lt"/>
+              <a:buAutoNum type="arabicPeriod" startAt="9"/>
+            </a:pPr>
+            <a:r>
+              <a:rPr lang="en-GB" dirty="0"/>
+              <a:t>How to use </a:t>
+            </a:r>
+            <a:r>
+              <a:rPr lang="en-GB" b="1" dirty="0" err="1"/>
+              <a:t>PyTorch</a:t>
+            </a:r>
+            <a:r>
+              <a:rPr lang="en-GB" dirty="0"/>
+              <a:t> to implement </a:t>
+            </a:r>
+            <a:r>
+              <a:rPr lang="en-GB" b="1" dirty="0"/>
+              <a:t>regularization</a:t>
+            </a:r>
+            <a:r>
+              <a:rPr lang="en-GB" dirty="0"/>
+              <a:t>?</a:t>
+            </a:r>
+          </a:p>
+          <a:p>
+            <a:pPr marL="514350" indent="-514350">
+              <a:buFont typeface="+mj-lt"/>
+              <a:buAutoNum type="arabicPeriod" startAt="9"/>
+            </a:pPr>
+            <a:r>
+              <a:rPr lang="en-GB" dirty="0"/>
+              <a:t>How to finally revise our </a:t>
+            </a:r>
+            <a:r>
+              <a:rPr lang="en-GB" b="1" dirty="0"/>
+              <a:t>trainer</a:t>
+            </a:r>
+            <a:r>
+              <a:rPr lang="en-GB" dirty="0"/>
+              <a:t> function to obtain a minimal, yet complete Neural Network in </a:t>
+            </a:r>
+            <a:r>
+              <a:rPr lang="en-GB" dirty="0" err="1"/>
+              <a:t>PyTorch</a:t>
+            </a:r>
+            <a:r>
+              <a:rPr lang="en-GB" dirty="0"/>
+              <a:t>?</a:t>
+            </a:r>
+          </a:p>
+          <a:p>
+            <a:pPr marL="514350" indent="-514350">
+              <a:buFont typeface="+mj-lt"/>
+              <a:buAutoNum type="arabicPeriod" startAt="9"/>
+            </a:pPr>
+            <a:endParaRPr lang="en-SG" dirty="0"/>
+          </a:p>
+        </p:txBody>
+      </p:sp>
+    </p:spTree>
+    <p:extLst>
+      <p:ext uri="{BB962C8B-B14F-4D97-AF65-F5344CB8AC3E}">
+        <p14:creationId xmlns:p14="http://schemas.microsoft.com/office/powerpoint/2010/main" val="2670805330"/>
+      </p:ext>
+    </p:extLst>
+  </p:cSld>
+  <p:clrMapOvr>
+    <a:masterClrMapping/>
+  </p:clrMapOvr>
+</p:sld>
+</file>
+
+<file path=ppt/slides/slide30.xml><?xml version="1.0" encoding="utf-8"?>
 <p:sld xmlns:a="http://schemas.openxmlformats.org/drawingml/2006/main" xmlns:r="http://schemas.openxmlformats.org/officeDocument/2006/relationships" xmlns:p="http://schemas.openxmlformats.org/presentationml/2006/main">
   <p:cSld>
     <p:spTree>
@@ -14040,396 +15036,7 @@
 </p:sld>
 </file>
 
-<file path=ppt/slides/slide3.xml><?xml version="1.0" encoding="utf-8"?>
-<p:sld xmlns:a="http://schemas.openxmlformats.org/drawingml/2006/main" xmlns:r="http://schemas.openxmlformats.org/officeDocument/2006/relationships" xmlns:p="http://schemas.openxmlformats.org/presentationml/2006/main">
-  <p:cSld>
-    <p:spTree>
-      <p:nvGrpSpPr>
-        <p:cNvPr id="1" name=""/>
-        <p:cNvGrpSpPr/>
-        <p:nvPr/>
-      </p:nvGrpSpPr>
-      <p:grpSpPr>
-        <a:xfrm>
-          <a:off x="0" y="0"/>
-          <a:ext cx="0" cy="0"/>
-          <a:chOff x="0" y="0"/>
-          <a:chExt cx="0" cy="0"/>
-        </a:xfrm>
-      </p:grpSpPr>
-      <p:sp>
-        <p:nvSpPr>
-          <p:cNvPr id="2" name="Title 1">
-            <a:extLst>
-              <a:ext uri="{FF2B5EF4-FFF2-40B4-BE49-F238E27FC236}">
-                <a16:creationId xmlns:a16="http://schemas.microsoft.com/office/drawing/2014/main" id="{3F88AB3E-DF60-4411-7415-7A8708334829}"/>
-              </a:ext>
-            </a:extLst>
-          </p:cNvPr>
-          <p:cNvSpPr>
-            <a:spLocks noGrp="1"/>
-          </p:cNvSpPr>
-          <p:nvPr>
-            <p:ph type="title"/>
-          </p:nvPr>
-        </p:nvSpPr>
-        <p:spPr/>
-        <p:txBody>
-          <a:bodyPr/>
-          <a:lstStyle/>
-          <a:p>
-            <a:r>
-              <a:rPr lang="en-GB" dirty="0"/>
-              <a:t>Introduction (Week 3)</a:t>
-            </a:r>
-            <a:endParaRPr lang="en-SG" dirty="0"/>
-          </a:p>
-        </p:txBody>
-      </p:sp>
-      <p:sp>
-        <p:nvSpPr>
-          <p:cNvPr id="3" name="Content Placeholder 2">
-            <a:extLst>
-              <a:ext uri="{FF2B5EF4-FFF2-40B4-BE49-F238E27FC236}">
-                <a16:creationId xmlns:a16="http://schemas.microsoft.com/office/drawing/2014/main" id="{65B58308-C101-BC04-E972-00C74DE5080B}"/>
-              </a:ext>
-            </a:extLst>
-          </p:cNvPr>
-          <p:cNvSpPr>
-            <a:spLocks noGrp="1"/>
-          </p:cNvSpPr>
-          <p:nvPr>
-            <p:ph idx="1"/>
-          </p:nvPr>
-        </p:nvSpPr>
-        <p:spPr>
-          <a:xfrm>
-            <a:off x="838200" y="1825624"/>
-            <a:ext cx="10515600" cy="5032375"/>
-          </a:xfrm>
-        </p:spPr>
-        <p:txBody>
-          <a:bodyPr>
-            <a:normAutofit lnSpcReduction="10000"/>
-          </a:bodyPr>
-          <a:lstStyle/>
-          <a:p>
-            <a:pPr marL="514350" indent="-514350">
-              <a:buFont typeface="+mj-lt"/>
-              <a:buAutoNum type="arabicPeriod" startAt="9"/>
-            </a:pPr>
-            <a:r>
-              <a:rPr lang="en-GB" dirty="0"/>
-              <a:t>What is the </a:t>
-            </a:r>
-            <a:r>
-              <a:rPr lang="en-GB" b="1" dirty="0" err="1"/>
-              <a:t>autograd</a:t>
-            </a:r>
-            <a:r>
-              <a:rPr lang="en-GB" dirty="0"/>
-              <a:t>/</a:t>
-            </a:r>
-            <a:r>
-              <a:rPr lang="en-GB" b="1" dirty="0"/>
-              <a:t>backprop</a:t>
-            </a:r>
-            <a:r>
-              <a:rPr lang="en-GB" dirty="0"/>
-              <a:t> module in </a:t>
-            </a:r>
-            <a:r>
-              <a:rPr lang="en-GB" dirty="0" err="1"/>
-              <a:t>PyTorch</a:t>
-            </a:r>
-            <a:r>
-              <a:rPr lang="en-GB" dirty="0"/>
-              <a:t>, and how does it use a </a:t>
-            </a:r>
-            <a:r>
-              <a:rPr lang="en-GB" b="1" dirty="0"/>
-              <a:t>computational</a:t>
-            </a:r>
-            <a:r>
-              <a:rPr lang="en-GB" dirty="0"/>
-              <a:t> </a:t>
-            </a:r>
-            <a:r>
-              <a:rPr lang="en-GB" b="1" dirty="0"/>
-              <a:t>graph</a:t>
-            </a:r>
-            <a:r>
-              <a:rPr lang="en-GB" dirty="0"/>
-              <a:t> to </a:t>
-            </a:r>
-            <a:r>
-              <a:rPr lang="en-GB" b="1" dirty="0"/>
-              <a:t>compute</a:t>
-            </a:r>
-            <a:r>
-              <a:rPr lang="en-GB" dirty="0"/>
-              <a:t> </a:t>
-            </a:r>
-            <a:r>
-              <a:rPr lang="en-GB" b="1" dirty="0"/>
-              <a:t>all</a:t>
-            </a:r>
-            <a:r>
-              <a:rPr lang="en-GB" dirty="0"/>
-              <a:t> </a:t>
-            </a:r>
-            <a:r>
-              <a:rPr lang="en-GB" b="1" dirty="0"/>
-              <a:t>derivatives</a:t>
-            </a:r>
-            <a:r>
-              <a:rPr lang="en-GB" dirty="0"/>
-              <a:t>? </a:t>
-            </a:r>
-          </a:p>
-          <a:p>
-            <a:pPr marL="514350" indent="-514350">
-              <a:buFont typeface="+mj-lt"/>
-              <a:buAutoNum type="arabicPeriod" startAt="9"/>
-            </a:pPr>
-            <a:r>
-              <a:rPr lang="en-GB" dirty="0"/>
-              <a:t>How to use the </a:t>
-            </a:r>
-            <a:r>
-              <a:rPr lang="en-GB" b="1" dirty="0" err="1"/>
-              <a:t>autograd</a:t>
-            </a:r>
-            <a:r>
-              <a:rPr lang="en-GB" dirty="0"/>
-              <a:t> to implement </a:t>
-            </a:r>
-            <a:r>
-              <a:rPr lang="en-GB" b="1" dirty="0"/>
-              <a:t>derivatives</a:t>
-            </a:r>
-            <a:r>
-              <a:rPr lang="en-GB" dirty="0"/>
-              <a:t> and a </a:t>
-            </a:r>
-            <a:r>
-              <a:rPr lang="en-GB" b="1" dirty="0"/>
-              <a:t>vanilla</a:t>
-            </a:r>
-            <a:r>
-              <a:rPr lang="en-GB" dirty="0"/>
-              <a:t> </a:t>
-            </a:r>
-            <a:r>
-              <a:rPr lang="en-GB" b="1" dirty="0"/>
-              <a:t>gradient</a:t>
-            </a:r>
-            <a:r>
-              <a:rPr lang="en-GB" dirty="0"/>
-              <a:t> </a:t>
-            </a:r>
-            <a:r>
-              <a:rPr lang="en-GB" b="1" dirty="0"/>
-              <a:t>descent</a:t>
-            </a:r>
-            <a:r>
-              <a:rPr lang="en-GB" dirty="0"/>
-              <a:t>?</a:t>
-            </a:r>
-          </a:p>
-          <a:p>
-            <a:pPr marL="514350" indent="-514350">
-              <a:buFont typeface="+mj-lt"/>
-              <a:buAutoNum type="arabicPeriod" startAt="9"/>
-            </a:pPr>
-            <a:r>
-              <a:rPr lang="en-GB" dirty="0"/>
-              <a:t>How to implement </a:t>
-            </a:r>
-            <a:r>
-              <a:rPr lang="en-GB" b="1" dirty="0"/>
-              <a:t>backprop</a:t>
-            </a:r>
-            <a:r>
-              <a:rPr lang="en-GB" dirty="0"/>
-              <a:t> in </a:t>
-            </a:r>
-            <a:r>
-              <a:rPr lang="en-GB" dirty="0" err="1"/>
-              <a:t>PyTorch</a:t>
-            </a:r>
-            <a:r>
-              <a:rPr lang="en-GB" dirty="0"/>
-              <a:t> for our </a:t>
-            </a:r>
-            <a:r>
-              <a:rPr lang="en-GB" b="1" dirty="0"/>
-              <a:t>shallow</a:t>
-            </a:r>
-            <a:r>
-              <a:rPr lang="en-GB" dirty="0"/>
-              <a:t> </a:t>
-            </a:r>
-            <a:r>
-              <a:rPr lang="en-GB" b="1" dirty="0"/>
-              <a:t>Neural</a:t>
-            </a:r>
-            <a:r>
-              <a:rPr lang="en-GB" dirty="0"/>
-              <a:t> </a:t>
-            </a:r>
-            <a:r>
-              <a:rPr lang="en-GB" b="1" dirty="0"/>
-              <a:t>Network</a:t>
-            </a:r>
-            <a:r>
-              <a:rPr lang="en-GB" dirty="0"/>
-              <a:t> class?</a:t>
-            </a:r>
-          </a:p>
-          <a:p>
-            <a:pPr marL="514350" indent="-514350">
-              <a:buFont typeface="+mj-lt"/>
-              <a:buAutoNum type="arabicPeriod" startAt="9"/>
-            </a:pPr>
-            <a:r>
-              <a:rPr lang="en-GB" dirty="0"/>
-              <a:t>How to use </a:t>
-            </a:r>
-            <a:r>
-              <a:rPr lang="en-GB" b="1" dirty="0" err="1"/>
-              <a:t>PyTorch</a:t>
-            </a:r>
-            <a:r>
-              <a:rPr lang="en-GB" dirty="0"/>
-              <a:t> to implement </a:t>
-            </a:r>
-            <a:r>
-              <a:rPr lang="en-GB" b="1" dirty="0"/>
-              <a:t>advanced</a:t>
-            </a:r>
-            <a:r>
-              <a:rPr lang="en-GB" dirty="0"/>
-              <a:t> </a:t>
-            </a:r>
-            <a:r>
-              <a:rPr lang="en-GB" b="1" dirty="0"/>
-              <a:t>optimizers</a:t>
-            </a:r>
-            <a:r>
-              <a:rPr lang="en-GB" dirty="0"/>
-              <a:t>?</a:t>
-            </a:r>
-          </a:p>
-          <a:p>
-            <a:pPr marL="514350" indent="-514350">
-              <a:buFont typeface="+mj-lt"/>
-              <a:buAutoNum type="arabicPeriod" startAt="9"/>
-            </a:pPr>
-            <a:r>
-              <a:rPr lang="en-GB" dirty="0"/>
-              <a:t>How to use </a:t>
-            </a:r>
-            <a:r>
-              <a:rPr lang="en-GB" b="1" dirty="0" err="1"/>
-              <a:t>PyTorch</a:t>
-            </a:r>
-            <a:r>
-              <a:rPr lang="en-GB" dirty="0"/>
-              <a:t> to implement </a:t>
-            </a:r>
-            <a:r>
-              <a:rPr lang="en-GB" b="1" dirty="0"/>
-              <a:t>advanced</a:t>
-            </a:r>
-            <a:r>
-              <a:rPr lang="en-GB" dirty="0"/>
-              <a:t> </a:t>
-            </a:r>
-            <a:r>
-              <a:rPr lang="en-GB" b="1" dirty="0"/>
-              <a:t>initializers</a:t>
-            </a:r>
-            <a:r>
-              <a:rPr lang="en-GB" dirty="0"/>
-              <a:t>?</a:t>
-            </a:r>
-          </a:p>
-          <a:p>
-            <a:pPr marL="514350" indent="-514350">
-              <a:buFont typeface="+mj-lt"/>
-              <a:buAutoNum type="arabicPeriod" startAt="9"/>
-            </a:pPr>
-            <a:r>
-              <a:rPr lang="en-GB" dirty="0"/>
-              <a:t>How to use </a:t>
-            </a:r>
-            <a:r>
-              <a:rPr lang="en-GB" b="1" dirty="0" err="1"/>
-              <a:t>PyTorch</a:t>
-            </a:r>
-            <a:r>
-              <a:rPr lang="en-GB" dirty="0"/>
-              <a:t> to implement </a:t>
-            </a:r>
-            <a:r>
-              <a:rPr lang="en-GB" b="1" dirty="0"/>
-              <a:t>regularization</a:t>
-            </a:r>
-            <a:r>
-              <a:rPr lang="en-GB" dirty="0"/>
-              <a:t>?</a:t>
-            </a:r>
-          </a:p>
-          <a:p>
-            <a:pPr marL="514350" indent="-514350">
-              <a:buFont typeface="+mj-lt"/>
-              <a:buAutoNum type="arabicPeriod" startAt="9"/>
-            </a:pPr>
-            <a:r>
-              <a:rPr lang="en-GB" dirty="0"/>
-              <a:t>How to finally revise our </a:t>
-            </a:r>
-            <a:r>
-              <a:rPr lang="en-GB" b="1" dirty="0"/>
-              <a:t>trainer</a:t>
-            </a:r>
-            <a:r>
-              <a:rPr lang="en-GB" dirty="0"/>
-              <a:t> function to obtain a minimal, yet complete Neural Network in </a:t>
-            </a:r>
-            <a:r>
-              <a:rPr lang="en-GB" dirty="0" err="1"/>
-              <a:t>PyTorch</a:t>
-            </a:r>
-            <a:r>
-              <a:rPr lang="en-GB" dirty="0"/>
-              <a:t>?</a:t>
-            </a:r>
-          </a:p>
-          <a:p>
-            <a:pPr marL="514350" indent="-514350">
-              <a:buFont typeface="+mj-lt"/>
-              <a:buAutoNum type="arabicPeriod" startAt="9"/>
-            </a:pPr>
-            <a:endParaRPr lang="en-SG" dirty="0"/>
-          </a:p>
-        </p:txBody>
-      </p:sp>
-    </p:spTree>
-    <p:extLst>
-      <p:ext uri="{BB962C8B-B14F-4D97-AF65-F5344CB8AC3E}">
-        <p14:creationId xmlns:p14="http://schemas.microsoft.com/office/powerpoint/2010/main" val="2670805330"/>
-      </p:ext>
-    </p:extLst>
-  </p:cSld>
-  <p:clrMapOvr>
-    <a:masterClrMapping/>
-  </p:clrMapOvr>
-</p:sld>
-</file>
-
-<file path=ppt/slides/slide30.xml><?xml version="1.0" encoding="utf-8"?>
+<file path=ppt/slides/slide31.xml><?xml version="1.0" encoding="utf-8"?>
 <p:sld xmlns:a="http://schemas.openxmlformats.org/drawingml/2006/main" xmlns:r="http://schemas.openxmlformats.org/officeDocument/2006/relationships" xmlns:p="http://schemas.openxmlformats.org/presentationml/2006/main">
   <p:cSld>
     <p:spTree>
@@ -14489,7 +15096,7 @@
 </p:sld>
 </file>
 
-<file path=ppt/slides/slide31.xml><?xml version="1.0" encoding="utf-8"?>
+<file path=ppt/slides/slide32.xml><?xml version="1.0" encoding="utf-8"?>
 <p:sld xmlns:a="http://schemas.openxmlformats.org/drawingml/2006/main" xmlns:r="http://schemas.openxmlformats.org/officeDocument/2006/relationships" xmlns:p="http://schemas.openxmlformats.org/presentationml/2006/main">
   <p:cSld>
     <p:spTree>
@@ -14687,7 +15294,7 @@
 </p:sld>
 </file>
 
-<file path=ppt/slides/slide32.xml><?xml version="1.0" encoding="utf-8"?>
+<file path=ppt/slides/slide33.xml><?xml version="1.0" encoding="utf-8"?>
 <p:sld xmlns:a="http://schemas.openxmlformats.org/drawingml/2006/main" xmlns:r="http://schemas.openxmlformats.org/officeDocument/2006/relationships" xmlns:p="http://schemas.openxmlformats.org/presentationml/2006/main">
   <p:cSld>
     <p:spTree>
@@ -14917,7 +15524,7 @@
 </p:sld>
 </file>
 
-<file path=ppt/slides/slide33.xml><?xml version="1.0" encoding="utf-8"?>
+<file path=ppt/slides/slide34.xml><?xml version="1.0" encoding="utf-8"?>
 <p:sld xmlns:a="http://schemas.openxmlformats.org/drawingml/2006/main" xmlns:r="http://schemas.openxmlformats.org/officeDocument/2006/relationships" xmlns:p="http://schemas.openxmlformats.org/presentationml/2006/main">
   <p:cSld>
     <p:spTree>
@@ -15234,7 +15841,7 @@
 </p:sld>
 </file>
 
-<file path=ppt/slides/slide34.xml><?xml version="1.0" encoding="utf-8"?>
+<file path=ppt/slides/slide35.xml><?xml version="1.0" encoding="utf-8"?>
 <p:sld xmlns:a="http://schemas.openxmlformats.org/drawingml/2006/main" xmlns:r="http://schemas.openxmlformats.org/officeDocument/2006/relationships" xmlns:p="http://schemas.openxmlformats.org/presentationml/2006/main">
   <p:cSld>
     <p:spTree>
@@ -15305,7 +15912,7 @@
             </p:spPr>
             <p:txBody>
               <a:bodyPr>
-                <a:normAutofit lnSpcReduction="10000"/>
+                <a:normAutofit fontScale="92500"/>
               </a:bodyPr>
               <a:lstStyle/>
               <a:p>
@@ -15314,7 +15921,7 @@
                 </a:pPr>
                 <a:r>
                   <a:rPr lang="en-GB" dirty="0"/>
-                  <a:t>We could:</a:t>
+                  <a:t>We could</a:t>
                 </a:r>
               </a:p>
               <a:p>
@@ -15379,7 +15986,7 @@
                 </a:r>
                 <a:r>
                   <a:rPr lang="en-GB" dirty="0"/>
-                  <a:t>layer prototype available in </a:t>
+                  <a:t>layer available in </a:t>
                 </a:r>
                 <a:r>
                   <a:rPr lang="en-GB" dirty="0" err="1"/>
@@ -15391,18 +15998,12 @@
                 </a:r>
               </a:p>
               <a:p>
-                <a:pPr marL="0" indent="0">
-                  <a:buNone/>
-                </a:pPr>
                 <a:r>
                   <a:rPr lang="en-GB" dirty="0"/>
-                  <a:t>We simply use the layer and call it as a function in the forward method!</a:t>
+                  <a:t>We simply use the Linear() layer and call it as a function in the forward method!</a:t>
                 </a:r>
               </a:p>
               <a:p>
-                <a:pPr marL="0" indent="0">
-                  <a:buNone/>
-                </a:pPr>
                 <a:r>
                   <a:rPr lang="en-GB" dirty="0"/>
                   <a:t>And remove the Parameter objects in our __</a:t>
@@ -15413,7 +16014,7 @@
                 </a:r>
                 <a:r>
                   <a:rPr lang="en-GB" dirty="0"/>
-                  <a:t>__!</a:t>
+                  <a:t>__, as they will now be attributes of the Linear() objects.</a:t>
                 </a:r>
               </a:p>
             </p:txBody>
@@ -15444,7 +16045,7 @@
               <a:blipFill>
                 <a:blip r:embed="rId2"/>
                 <a:stretch>
-                  <a:fillRect l="-2471" t="-2663" r="-1765"/>
+                  <a:fillRect l="-2118" t="-1816" r="-1765" b="-2663"/>
                 </a:stretch>
               </a:blipFill>
             </p:spPr>
@@ -15506,7 +16107,7 @@
 </p:sld>
 </file>
 
-<file path=ppt/slides/slide35.xml><?xml version="1.0" encoding="utf-8"?>
+<file path=ppt/slides/slide36.xml><?xml version="1.0" encoding="utf-8"?>
 <p:sld xmlns:a="http://schemas.openxmlformats.org/drawingml/2006/main" xmlns:r="http://schemas.openxmlformats.org/officeDocument/2006/relationships" xmlns:p="http://schemas.openxmlformats.org/presentationml/2006/main">
   <p:cSld>
     <p:spTree>
@@ -15676,7 +16277,7 @@
 </p:sld>
 </file>
 
-<file path=ppt/slides/slide36.xml><?xml version="1.0" encoding="utf-8"?>
+<file path=ppt/slides/slide37.xml><?xml version="1.0" encoding="utf-8"?>
 <p:sld xmlns:a="http://schemas.openxmlformats.org/drawingml/2006/main" xmlns:r="http://schemas.openxmlformats.org/officeDocument/2006/relationships" xmlns:p="http://schemas.openxmlformats.org/presentationml/2006/main">
   <p:cSld>
     <p:spTree>
@@ -16926,6 +17527,294 @@
   <p:cSld>
     <p:spTree>
       <p:nvGrpSpPr>
+        <p:cNvPr id="1" name="">
+          <a:extLst>
+            <a:ext uri="{FF2B5EF4-FFF2-40B4-BE49-F238E27FC236}">
+              <a16:creationId xmlns:a16="http://schemas.microsoft.com/office/drawing/2014/main" id="{D15D4819-3551-C8DE-D1DC-FC5DA2D3571D}"/>
+            </a:ext>
+          </a:extLst>
+        </p:cNvPr>
+        <p:cNvGrpSpPr/>
+        <p:nvPr/>
+      </p:nvGrpSpPr>
+      <p:grpSpPr>
+        <a:xfrm>
+          <a:off x="0" y="0"/>
+          <a:ext cx="0" cy="0"/>
+          <a:chOff x="0" y="0"/>
+          <a:chExt cx="0" cy="0"/>
+        </a:xfrm>
+      </p:grpSpPr>
+      <p:pic>
+        <p:nvPicPr>
+          <p:cNvPr id="9" name="Picture 8">
+            <a:extLst>
+              <a:ext uri="{FF2B5EF4-FFF2-40B4-BE49-F238E27FC236}">
+                <a16:creationId xmlns:a16="http://schemas.microsoft.com/office/drawing/2014/main" id="{152352D7-A90C-146F-10F0-764E4C01C1FE}"/>
+              </a:ext>
+            </a:extLst>
+          </p:cNvPr>
+          <p:cNvPicPr>
+            <a:picLocks noChangeAspect="1"/>
+          </p:cNvPicPr>
+          <p:nvPr/>
+        </p:nvPicPr>
+        <p:blipFill>
+          <a:blip r:embed="rId2"/>
+          <a:stretch>
+            <a:fillRect/>
+          </a:stretch>
+        </p:blipFill>
+        <p:spPr>
+          <a:xfrm>
+            <a:off x="5540306" y="1081548"/>
+            <a:ext cx="6569984" cy="5279945"/>
+          </a:xfrm>
+          <a:prstGeom prst="rect">
+            <a:avLst/>
+          </a:prstGeom>
+        </p:spPr>
+      </p:pic>
+      <p:sp>
+        <p:nvSpPr>
+          <p:cNvPr id="10" name="Title 1">
+            <a:extLst>
+              <a:ext uri="{FF2B5EF4-FFF2-40B4-BE49-F238E27FC236}">
+                <a16:creationId xmlns:a16="http://schemas.microsoft.com/office/drawing/2014/main" id="{E5D54B24-37B4-51E0-F27D-B0389537E797}"/>
+              </a:ext>
+            </a:extLst>
+          </p:cNvPr>
+          <p:cNvSpPr>
+            <a:spLocks noGrp="1"/>
+          </p:cNvSpPr>
+          <p:nvPr>
+            <p:ph type="title"/>
+          </p:nvPr>
+        </p:nvSpPr>
+        <p:spPr/>
+        <p:txBody>
+          <a:bodyPr/>
+          <a:lstStyle/>
+          <a:p>
+            <a:r>
+              <a:rPr lang="en-GB" dirty="0" err="1"/>
+              <a:t>Autograd</a:t>
+            </a:r>
+            <a:br>
+              <a:rPr lang="en-GB" dirty="0"/>
+            </a:br>
+            <a:r>
+              <a:rPr lang="en-GB" dirty="0"/>
+              <a:t>in action</a:t>
+            </a:r>
+            <a:endParaRPr lang="en-SG" dirty="0"/>
+          </a:p>
+        </p:txBody>
+      </p:sp>
+      <mc:AlternateContent xmlns:mc="http://schemas.openxmlformats.org/markup-compatibility/2006">
+        <mc:Choice xmlns:a14="http://schemas.microsoft.com/office/drawing/2010/main" Requires="a14">
+          <p:sp>
+            <p:nvSpPr>
+              <p:cNvPr id="11" name="Content Placeholder 10">
+                <a:extLst>
+                  <a:ext uri="{FF2B5EF4-FFF2-40B4-BE49-F238E27FC236}">
+                    <a16:creationId xmlns:a16="http://schemas.microsoft.com/office/drawing/2014/main" id="{982DA01D-CDF4-6F03-220D-18E06E9ABA89}"/>
+                  </a:ext>
+                </a:extLst>
+              </p:cNvPr>
+              <p:cNvSpPr>
+                <a:spLocks noGrp="1"/>
+              </p:cNvSpPr>
+              <p:nvPr>
+                <p:ph sz="half" idx="1"/>
+              </p:nvPr>
+            </p:nvSpPr>
+            <p:spPr>
+              <a:xfrm>
+                <a:off x="211015" y="1825625"/>
+                <a:ext cx="5226224" cy="4872160"/>
+              </a:xfrm>
+            </p:spPr>
+            <p:txBody>
+              <a:bodyPr>
+                <a:normAutofit lnSpcReduction="10000"/>
+              </a:bodyPr>
+              <a:lstStyle/>
+              <a:p>
+                <a:pPr marL="0" indent="0">
+                  <a:buNone/>
+                </a:pPr>
+                <a:r>
+                  <a:rPr lang="en-GB" b="1" dirty="0"/>
+                  <a:t>Whenever backward() is used:</a:t>
+                </a:r>
+              </a:p>
+              <a:p>
+                <a:r>
+                  <a:rPr lang="en-GB" dirty="0" err="1"/>
+                  <a:t>Autograd</a:t>
+                </a:r>
+                <a:r>
+                  <a:rPr lang="en-GB" dirty="0"/>
+                  <a:t> will look at the computational graph,</a:t>
+                </a:r>
+              </a:p>
+              <a:p>
+                <a:r>
+                  <a:rPr lang="en-GB" dirty="0"/>
+                  <a:t>And it will compute the partial derivatives of the variable </a:t>
+                </a:r>
+                <a14:m>
+                  <m:oMath xmlns:m="http://schemas.openxmlformats.org/officeDocument/2006/math">
+                    <m:r>
+                      <a:rPr lang="en-GB" i="1" dirty="0" smtClean="0">
+                        <a:latin typeface="Cambria Math" panose="02040503050406030204" pitchFamily="18" charset="0"/>
+                      </a:rPr>
+                      <m:t>𝑦</m:t>
+                    </m:r>
+                  </m:oMath>
+                </a14:m>
+                <a:r>
+                  <a:rPr lang="en-GB" dirty="0"/>
+                  <a:t> on which backward() is applied,</a:t>
+                </a:r>
+              </a:p>
+              <a:p>
+                <a:r>
+                  <a:rPr lang="en-GB" dirty="0"/>
+                  <a:t>With respect to all the tensors </a:t>
+                </a:r>
+                <a14:m>
+                  <m:oMath xmlns:m="http://schemas.openxmlformats.org/officeDocument/2006/math">
+                    <m:r>
+                      <a:rPr lang="en-GB" i="1" dirty="0" smtClean="0">
+                        <a:latin typeface="Cambria Math" panose="02040503050406030204" pitchFamily="18" charset="0"/>
+                      </a:rPr>
+                      <m:t>𝑥</m:t>
+                    </m:r>
+                  </m:oMath>
+                </a14:m>
+                <a:r>
+                  <a:rPr lang="en-GB" dirty="0"/>
+                  <a:t> whose </a:t>
+                </a:r>
+                <a:r>
+                  <a:rPr lang="en-GB" dirty="0" err="1"/>
+                  <a:t>requires_grad</a:t>
+                </a:r>
+                <a:r>
+                  <a:rPr lang="en-GB" dirty="0"/>
+                  <a:t> parameter was set to True,</a:t>
+                </a:r>
+              </a:p>
+              <a:p>
+                <a:r>
+                  <a:rPr lang="en-GB" dirty="0"/>
+                  <a:t>And store these derivatives </a:t>
+                </a:r>
+                <a:r>
+                  <a:rPr lang="en-GB" dirty="0" err="1"/>
+                  <a:t>wrt</a:t>
+                </a:r>
+                <a:r>
+                  <a:rPr lang="en-GB" dirty="0"/>
+                  <a:t>. to each tensor </a:t>
+                </a:r>
+                <a14:m>
+                  <m:oMath xmlns:m="http://schemas.openxmlformats.org/officeDocument/2006/math">
+                    <m:r>
+                      <a:rPr lang="en-GB" i="1" dirty="0" smtClean="0">
+                        <a:latin typeface="Cambria Math" panose="02040503050406030204" pitchFamily="18" charset="0"/>
+                      </a:rPr>
+                      <m:t>𝑥</m:t>
+                    </m:r>
+                  </m:oMath>
+                </a14:m>
+                <a:r>
+                  <a:rPr lang="en-GB" dirty="0"/>
+                  <a:t>, in said tensor </a:t>
+                </a:r>
+                <a14:m>
+                  <m:oMath xmlns:m="http://schemas.openxmlformats.org/officeDocument/2006/math">
+                    <m:r>
+                      <a:rPr lang="en-GB" i="1" dirty="0" smtClean="0">
+                        <a:latin typeface="Cambria Math" panose="02040503050406030204" pitchFamily="18" charset="0"/>
+                      </a:rPr>
+                      <m:t>𝑥</m:t>
+                    </m:r>
+                  </m:oMath>
+                </a14:m>
+                <a:r>
+                  <a:rPr lang="en-GB" dirty="0"/>
+                  <a:t>, under the grad attribute.</a:t>
+                </a:r>
+                <a:endParaRPr lang="en-SG" dirty="0"/>
+              </a:p>
+            </p:txBody>
+          </p:sp>
+        </mc:Choice>
+        <mc:Fallback>
+          <p:sp>
+            <p:nvSpPr>
+              <p:cNvPr id="11" name="Content Placeholder 10">
+                <a:extLst>
+                  <a:ext uri="{FF2B5EF4-FFF2-40B4-BE49-F238E27FC236}">
+                    <a16:creationId xmlns:a16="http://schemas.microsoft.com/office/drawing/2014/main" id="{982DA01D-CDF4-6F03-220D-18E06E9ABA89}"/>
+                  </a:ext>
+                </a:extLst>
+              </p:cNvPr>
+              <p:cNvSpPr>
+                <a:spLocks noGrp="1" noRot="1" noChangeAspect="1" noMove="1" noResize="1" noEditPoints="1" noAdjustHandles="1" noChangeArrowheads="1" noChangeShapeType="1" noTextEdit="1"/>
+              </p:cNvSpPr>
+              <p:nvPr>
+                <p:ph sz="half" idx="1"/>
+              </p:nvPr>
+            </p:nvSpPr>
+            <p:spPr>
+              <a:xfrm>
+                <a:off x="211015" y="1825625"/>
+                <a:ext cx="5226224" cy="4872160"/>
+              </a:xfrm>
+              <a:blipFill>
+                <a:blip r:embed="rId3"/>
+                <a:stretch>
+                  <a:fillRect l="-2450" t="-2750" r="-350"/>
+                </a:stretch>
+              </a:blipFill>
+            </p:spPr>
+            <p:txBody>
+              <a:bodyPr/>
+              <a:lstStyle/>
+              <a:p>
+                <a:r>
+                  <a:rPr lang="en-GB">
+                    <a:noFill/>
+                  </a:rPr>
+                  <a:t> </a:t>
+                </a:r>
+              </a:p>
+            </p:txBody>
+          </p:sp>
+        </mc:Fallback>
+      </mc:AlternateContent>
+    </p:spTree>
+    <p:extLst>
+      <p:ext uri="{BB962C8B-B14F-4D97-AF65-F5344CB8AC3E}">
+        <p14:creationId xmlns:p14="http://schemas.microsoft.com/office/powerpoint/2010/main" val="1002846102"/>
+      </p:ext>
+    </p:extLst>
+  </p:cSld>
+  <p:clrMapOvr>
+    <a:masterClrMapping/>
+  </p:clrMapOvr>
+</p:sld>
+</file>
+
+<file path=ppt/slides/slide9.xml><?xml version="1.0" encoding="utf-8"?>
+<p:sld xmlns:a="http://schemas.openxmlformats.org/drawingml/2006/main" xmlns:r="http://schemas.openxmlformats.org/officeDocument/2006/relationships" xmlns:p="http://schemas.openxmlformats.org/presentationml/2006/main">
+  <p:cSld>
+    <p:spTree>
+      <p:nvGrpSpPr>
         <p:cNvPr id="1" name=""/>
         <p:cNvGrpSpPr/>
         <p:nvPr/>
@@ -16974,8 +17863,8 @@
           </a:p>
         </p:txBody>
       </p:sp>
-      <mc:AlternateContent xmlns:mc="http://schemas.openxmlformats.org/markup-compatibility/2006" xmlns:a14="http://schemas.microsoft.com/office/drawing/2010/main">
-        <mc:Choice Requires="a14">
+      <mc:AlternateContent xmlns:mc="http://schemas.openxmlformats.org/markup-compatibility/2006">
+        <mc:Choice xmlns:a14="http://schemas.microsoft.com/office/drawing/2010/main" Requires="a14">
           <p:sp>
             <p:nvSpPr>
               <p:cNvPr id="11" name="Content Placeholder 10">
@@ -17452,7 +18341,7 @@
                         <a:rPr lang="en-GB" i="1" dirty="0" smtClean="0">
                           <a:latin typeface="Cambria Math" panose="02040503050406030204" pitchFamily="18" charset="0"/>
                         </a:rPr>
-                        <m:t>,1) = (2, </m:t>
+                        <m:t>,1) = (2, 2</m:t>
                       </m:r>
                       <m:r>
                         <a:rPr lang="en-GB" i="1" dirty="0" smtClean="0">
@@ -17474,7 +18363,7 @@
             </p:txBody>
           </p:sp>
         </mc:Choice>
-        <mc:Fallback xmlns="">
+        <mc:Fallback>
           <p:sp>
             <p:nvSpPr>
               <p:cNvPr id="11" name="Content Placeholder 10">
@@ -17508,7 +18397,7 @@
               <a:lstStyle/>
               <a:p>
                 <a:r>
-                  <a:rPr lang="en-SG">
+                  <a:rPr lang="en-GB">
                     <a:noFill/>
                   </a:rPr>
                   <a:t> </a:t>
@@ -17552,170 +18441,6 @@
     <p:extLst>
       <p:ext uri="{BB962C8B-B14F-4D97-AF65-F5344CB8AC3E}">
         <p14:creationId xmlns:p14="http://schemas.microsoft.com/office/powerpoint/2010/main" val="1546007078"/>
-      </p:ext>
-    </p:extLst>
-  </p:cSld>
-  <p:clrMapOvr>
-    <a:masterClrMapping/>
-  </p:clrMapOvr>
-</p:sld>
-</file>
-
-<file path=ppt/slides/slide9.xml><?xml version="1.0" encoding="utf-8"?>
-<p:sld xmlns:a="http://schemas.openxmlformats.org/drawingml/2006/main" xmlns:r="http://schemas.openxmlformats.org/officeDocument/2006/relationships" xmlns:p="http://schemas.openxmlformats.org/presentationml/2006/main">
-  <p:cSld>
-    <p:spTree>
-      <p:nvGrpSpPr>
-        <p:cNvPr id="1" name=""/>
-        <p:cNvGrpSpPr/>
-        <p:nvPr/>
-      </p:nvGrpSpPr>
-      <p:grpSpPr>
-        <a:xfrm>
-          <a:off x="0" y="0"/>
-          <a:ext cx="0" cy="0"/>
-          <a:chOff x="0" y="0"/>
-          <a:chExt cx="0" cy="0"/>
-        </a:xfrm>
-      </p:grpSpPr>
-      <p:sp>
-        <p:nvSpPr>
-          <p:cNvPr id="2" name="Title 1">
-            <a:extLst>
-              <a:ext uri="{FF2B5EF4-FFF2-40B4-BE49-F238E27FC236}">
-                <a16:creationId xmlns:a16="http://schemas.microsoft.com/office/drawing/2014/main" id="{219F4681-3E05-3370-3E46-11417BFE0CA3}"/>
-              </a:ext>
-            </a:extLst>
-          </p:cNvPr>
-          <p:cNvSpPr>
-            <a:spLocks noGrp="1"/>
-          </p:cNvSpPr>
-          <p:nvPr>
-            <p:ph type="title"/>
-          </p:nvPr>
-        </p:nvSpPr>
-        <p:spPr/>
-        <p:txBody>
-          <a:bodyPr/>
-          <a:lstStyle/>
-          <a:p>
-            <a:r>
-              <a:rPr lang="en-GB" dirty="0" err="1"/>
-              <a:t>Autograd</a:t>
-            </a:r>
-            <a:r>
-              <a:rPr lang="en-GB" dirty="0"/>
-              <a:t>, in short</a:t>
-            </a:r>
-            <a:endParaRPr lang="en-SG" dirty="0"/>
-          </a:p>
-        </p:txBody>
-      </p:sp>
-      <p:sp>
-        <p:nvSpPr>
-          <p:cNvPr id="5" name="Content Placeholder 4">
-            <a:extLst>
-              <a:ext uri="{FF2B5EF4-FFF2-40B4-BE49-F238E27FC236}">
-                <a16:creationId xmlns:a16="http://schemas.microsoft.com/office/drawing/2014/main" id="{1A87BA25-5926-816A-6E16-0F90D4B62FB8}"/>
-              </a:ext>
-            </a:extLst>
-          </p:cNvPr>
-          <p:cNvSpPr>
-            <a:spLocks noGrp="1"/>
-          </p:cNvSpPr>
-          <p:nvPr>
-            <p:ph idx="1"/>
-          </p:nvPr>
-        </p:nvSpPr>
-        <p:spPr>
-          <a:xfrm>
-            <a:off x="838200" y="1825624"/>
-            <a:ext cx="10515600" cy="5032375"/>
-          </a:xfrm>
-        </p:spPr>
-        <p:txBody>
-          <a:bodyPr>
-            <a:normAutofit/>
-          </a:bodyPr>
-          <a:lstStyle/>
-          <a:p>
-            <a:pPr marL="0" indent="0">
-              <a:buNone/>
-            </a:pPr>
-            <a:r>
-              <a:rPr lang="en-GB" dirty="0"/>
-              <a:t>The </a:t>
-            </a:r>
-            <a:r>
-              <a:rPr lang="en-GB" b="1" dirty="0" err="1"/>
-              <a:t>autograd</a:t>
-            </a:r>
-            <a:r>
-              <a:rPr lang="en-GB" dirty="0"/>
-              <a:t> is one of the most powerful features of the </a:t>
-            </a:r>
-            <a:r>
-              <a:rPr lang="en-GB" dirty="0" err="1"/>
-              <a:t>PyTorch</a:t>
-            </a:r>
-            <a:r>
-              <a:rPr lang="en-GB" dirty="0"/>
-              <a:t> framework, and why we like it so much for training Neural Networks.</a:t>
-            </a:r>
-          </a:p>
-          <a:p>
-            <a:r>
-              <a:rPr lang="en-GB" b="1" dirty="0"/>
-              <a:t>Thanks to </a:t>
-            </a:r>
-            <a:r>
-              <a:rPr lang="en-GB" b="1" dirty="0" err="1"/>
-              <a:t>autograd</a:t>
-            </a:r>
-            <a:r>
-              <a:rPr lang="en-GB" b="1" dirty="0"/>
-              <a:t>, we do not need to calculate the gradients for any of our future gradient descent rules, manually again! (yay!)</a:t>
-            </a:r>
-          </a:p>
-          <a:p>
-            <a:r>
-              <a:rPr lang="en-GB" dirty="0"/>
-              <a:t>The counterpart however is that all operation must involve tensors and must use </a:t>
-            </a:r>
-            <a:r>
-              <a:rPr lang="en-GB" dirty="0" err="1"/>
-              <a:t>PyTorch</a:t>
-            </a:r>
-            <a:r>
-              <a:rPr lang="en-GB" dirty="0"/>
-              <a:t> functions and methods... (but that is ok).</a:t>
-            </a:r>
-          </a:p>
-          <a:p>
-            <a:r>
-              <a:rPr lang="en-GB" dirty="0"/>
-              <a:t>You do not need to know how it implements the computation of all gradients in the background, but if you are curious, have a look at: </a:t>
-            </a:r>
-            <a:r>
-              <a:rPr lang="en-GB" dirty="0">
-                <a:hlinkClick r:id="rId2"/>
-              </a:rPr>
-              <a:t>https://pytorch.org/blog/computational-graphs-constructed-in-pytorch/</a:t>
-            </a:r>
-            <a:r>
-              <a:rPr lang="en-GB" dirty="0"/>
-              <a:t>.</a:t>
-            </a:r>
-          </a:p>
-          <a:p>
-            <a:endParaRPr lang="en-SG" dirty="0"/>
-          </a:p>
-        </p:txBody>
-      </p:sp>
-    </p:spTree>
-    <p:extLst>
-      <p:ext uri="{BB962C8B-B14F-4D97-AF65-F5344CB8AC3E}">
-        <p14:creationId xmlns:p14="http://schemas.microsoft.com/office/powerpoint/2010/main" val="2580175991"/>
       </p:ext>
     </p:extLst>
   </p:cSld>

</xml_diff>